<commit_message>
Added slide on iterators
</commit_message>
<xml_diff>
--- a/CPlusPlus/10_essential_algorithms.pptx
+++ b/CPlusPlus/10_essential_algorithms.pptx
@@ -3757,7 +3757,7 @@
         <p:spPr>
           <a:xfrm>
             <a:off x="628650" y="1953400"/>
-            <a:ext cx="5561138" cy="1477328"/>
+            <a:ext cx="7237268" cy="923330"/>
           </a:xfrm>
           <a:prstGeom prst="rect">
             <a:avLst/>
@@ -3784,39 +3784,75 @@
                 <a:latin typeface="Courier New" panose="02070309020205020404" pitchFamily="49" charset="0"/>
                 <a:cs typeface="Courier New" panose="02070309020205020404" pitchFamily="49" charset="0"/>
               </a:rPr>
-              <a:t>…</a:t>
-            </a:r>
-          </a:p>
-          <a:p>
+              <a:t>vector&lt;double&gt; v {3.5, 1.2, 5.9, -1.3, 0.6};</a:t>
+            </a:r>
+            <a:endParaRPr lang="en-US" dirty="0" smtClean="0">
+              <a:latin typeface="Courier New" panose="02070309020205020404" pitchFamily="49" charset="0"/>
+              <a:cs typeface="Courier New" panose="02070309020205020404" pitchFamily="49" charset="0"/>
+            </a:endParaRPr>
+          </a:p>
+          <a:p>
+            <a:r>
+              <a:rPr lang="en-US" dirty="0" smtClean="0">
+                <a:latin typeface="Courier New" panose="02070309020205020404" pitchFamily="49" charset="0"/>
+                <a:cs typeface="Courier New" panose="02070309020205020404" pitchFamily="49" charset="0"/>
+              </a:rPr>
+              <a:t>for (auto it = v.begin(); it != </a:t>
+            </a:r>
             <a:r>
               <a:rPr lang="en-US" dirty="0" err="1" smtClean="0">
                 <a:latin typeface="Courier New" panose="02070309020205020404" pitchFamily="49" charset="0"/>
                 <a:cs typeface="Courier New" panose="02070309020205020404" pitchFamily="49" charset="0"/>
               </a:rPr>
-              <a:t>int</a:t>
+              <a:t>v.end</a:t>
             </a:r>
             <a:r>
               <a:rPr lang="en-US" dirty="0" smtClean="0">
                 <a:latin typeface="Courier New" panose="02070309020205020404" pitchFamily="49" charset="0"/>
                 <a:cs typeface="Courier New" panose="02070309020205020404" pitchFamily="49" charset="0"/>
               </a:rPr>
-              <a:t>[] a = {3, 5, 7, 9};</a:t>
-            </a:r>
-          </a:p>
-          <a:p>
+              <a:t>(); it++)</a:t>
+            </a:r>
+            <a:endParaRPr lang="en-US" dirty="0" smtClean="0">
+              <a:latin typeface="Courier New" panose="02070309020205020404" pitchFamily="49" charset="0"/>
+              <a:cs typeface="Courier New" panose="02070309020205020404" pitchFamily="49" charset="0"/>
+            </a:endParaRPr>
+          </a:p>
+          <a:p>
+            <a:r>
+              <a:rPr lang="en-US" dirty="0">
+                <a:latin typeface="Courier New" panose="02070309020205020404" pitchFamily="49" charset="0"/>
+                <a:cs typeface="Courier New" panose="02070309020205020404" pitchFamily="49" charset="0"/>
+              </a:rPr>
+              <a:t> </a:t>
+            </a:r>
             <a:r>
               <a:rPr lang="en-US" dirty="0" smtClean="0">
                 <a:latin typeface="Courier New" panose="02070309020205020404" pitchFamily="49" charset="0"/>
                 <a:cs typeface="Courier New" panose="02070309020205020404" pitchFamily="49" charset="0"/>
               </a:rPr>
-              <a:t>for (</a:t>
+              <a:t>   </a:t>
             </a:r>
             <a:r>
               <a:rPr lang="en-US" dirty="0" err="1" smtClean="0">
                 <a:latin typeface="Courier New" panose="02070309020205020404" pitchFamily="49" charset="0"/>
                 <a:cs typeface="Courier New" panose="02070309020205020404" pitchFamily="49" charset="0"/>
               </a:rPr>
-              <a:t>int</a:t>
+              <a:t>cout</a:t>
+            </a:r>
+            <a:r>
+              <a:rPr lang="en-US" dirty="0" smtClean="0">
+                <a:latin typeface="Courier New" panose="02070309020205020404" pitchFamily="49" charset="0"/>
+                <a:cs typeface="Courier New" panose="02070309020205020404" pitchFamily="49" charset="0"/>
+              </a:rPr>
+              <a:t> &lt;&lt; </a:t>
+            </a:r>
+            <a:r>
+              <a:rPr lang="en-US" dirty="0" smtClean="0">
+                <a:latin typeface="Courier New" panose="02070309020205020404" pitchFamily="49" charset="0"/>
+                <a:cs typeface="Courier New" panose="02070309020205020404" pitchFamily="49" charset="0"/>
+              </a:rPr>
+              <a:t>*it</a:t>
             </a:r>
             <a:r>
               <a:rPr lang="en-US" dirty="0" smtClean="0">
@@ -3826,104 +3862,11 @@
               <a:t> </a:t>
             </a:r>
             <a:r>
-              <a:rPr lang="en-US" dirty="0" err="1" smtClean="0">
-                <a:latin typeface="Courier New" panose="02070309020205020404" pitchFamily="49" charset="0"/>
-                <a:cs typeface="Courier New" panose="02070309020205020404" pitchFamily="49" charset="0"/>
-              </a:rPr>
-              <a:t>i</a:t>
-            </a:r>
-            <a:r>
               <a:rPr lang="en-US" dirty="0" smtClean="0">
                 <a:latin typeface="Courier New" panose="02070309020205020404" pitchFamily="49" charset="0"/>
                 <a:cs typeface="Courier New" panose="02070309020205020404" pitchFamily="49" charset="0"/>
               </a:rPr>
-              <a:t> = 0; </a:t>
-            </a:r>
-            <a:r>
-              <a:rPr lang="en-US" dirty="0" err="1" smtClean="0">
-                <a:latin typeface="Courier New" panose="02070309020205020404" pitchFamily="49" charset="0"/>
-                <a:cs typeface="Courier New" panose="02070309020205020404" pitchFamily="49" charset="0"/>
-              </a:rPr>
-              <a:t>i</a:t>
-            </a:r>
-            <a:r>
-              <a:rPr lang="en-US" dirty="0" smtClean="0">
-                <a:latin typeface="Courier New" panose="02070309020205020404" pitchFamily="49" charset="0"/>
-                <a:cs typeface="Courier New" panose="02070309020205020404" pitchFamily="49" charset="0"/>
-              </a:rPr>
-              <a:t> &lt; 4; </a:t>
-            </a:r>
-            <a:r>
-              <a:rPr lang="en-US" dirty="0" err="1" smtClean="0">
-                <a:latin typeface="Courier New" panose="02070309020205020404" pitchFamily="49" charset="0"/>
-                <a:cs typeface="Courier New" panose="02070309020205020404" pitchFamily="49" charset="0"/>
-              </a:rPr>
-              <a:t>i</a:t>
-            </a:r>
-            <a:r>
-              <a:rPr lang="en-US" dirty="0" smtClean="0">
-                <a:latin typeface="Courier New" panose="02070309020205020404" pitchFamily="49" charset="0"/>
-                <a:cs typeface="Courier New" panose="02070309020205020404" pitchFamily="49" charset="0"/>
-              </a:rPr>
-              <a:t>++) {</a:t>
-            </a:r>
-          </a:p>
-          <a:p>
-            <a:r>
-              <a:rPr lang="en-US" dirty="0">
-                <a:latin typeface="Courier New" panose="02070309020205020404" pitchFamily="49" charset="0"/>
-                <a:cs typeface="Courier New" panose="02070309020205020404" pitchFamily="49" charset="0"/>
-              </a:rPr>
-              <a:t> </a:t>
-            </a:r>
-            <a:r>
-              <a:rPr lang="en-US" dirty="0" smtClean="0">
-                <a:latin typeface="Courier New" panose="02070309020205020404" pitchFamily="49" charset="0"/>
-                <a:cs typeface="Courier New" panose="02070309020205020404" pitchFamily="49" charset="0"/>
-              </a:rPr>
-              <a:t>   </a:t>
-            </a:r>
-            <a:r>
-              <a:rPr lang="en-US" dirty="0" err="1" smtClean="0">
-                <a:latin typeface="Courier New" panose="02070309020205020404" pitchFamily="49" charset="0"/>
-                <a:cs typeface="Courier New" panose="02070309020205020404" pitchFamily="49" charset="0"/>
-              </a:rPr>
-              <a:t>cout</a:t>
-            </a:r>
-            <a:r>
-              <a:rPr lang="en-US" dirty="0" smtClean="0">
-                <a:latin typeface="Courier New" panose="02070309020205020404" pitchFamily="49" charset="0"/>
-                <a:cs typeface="Courier New" panose="02070309020205020404" pitchFamily="49" charset="0"/>
-              </a:rPr>
-              <a:t> &lt;&lt; a[</a:t>
-            </a:r>
-            <a:r>
-              <a:rPr lang="en-US" dirty="0" err="1" smtClean="0">
-                <a:latin typeface="Courier New" panose="02070309020205020404" pitchFamily="49" charset="0"/>
-                <a:cs typeface="Courier New" panose="02070309020205020404" pitchFamily="49" charset="0"/>
-              </a:rPr>
-              <a:t>i</a:t>
-            </a:r>
-            <a:r>
-              <a:rPr lang="en-US" dirty="0" smtClean="0">
-                <a:latin typeface="Courier New" panose="02070309020205020404" pitchFamily="49" charset="0"/>
-                <a:cs typeface="Courier New" panose="02070309020205020404" pitchFamily="49" charset="0"/>
-              </a:rPr>
-              <a:t>]*a[</a:t>
-            </a:r>
-            <a:r>
-              <a:rPr lang="en-US" dirty="0" err="1" smtClean="0">
-                <a:latin typeface="Courier New" panose="02070309020205020404" pitchFamily="49" charset="0"/>
-                <a:cs typeface="Courier New" panose="02070309020205020404" pitchFamily="49" charset="0"/>
-              </a:rPr>
-              <a:t>i</a:t>
-            </a:r>
-            <a:r>
-              <a:rPr lang="en-US" dirty="0" smtClean="0">
-                <a:latin typeface="Courier New" panose="02070309020205020404" pitchFamily="49" charset="0"/>
-                <a:cs typeface="Courier New" panose="02070309020205020404" pitchFamily="49" charset="0"/>
-              </a:rPr>
-              <a:t>] &lt;&lt; </a:t>
+              <a:t>&lt;&lt; </a:t>
             </a:r>
             <a:r>
               <a:rPr lang="en-US" dirty="0" err="1" smtClean="0">
@@ -3939,37 +3882,899 @@
               </a:rPr>
               <a:t>;</a:t>
             </a:r>
-          </a:p>
-          <a:p>
-            <a:r>
-              <a:rPr lang="en-US" dirty="0" smtClean="0">
+            <a:endParaRPr lang="en-US" dirty="0" smtClean="0">
+              <a:latin typeface="Courier New" panose="02070309020205020404" pitchFamily="49" charset="0"/>
+              <a:cs typeface="Courier New" panose="02070309020205020404" pitchFamily="49" charset="0"/>
+            </a:endParaRPr>
+          </a:p>
+        </p:txBody>
+      </p:sp>
+      <p:grpSp>
+        <p:nvGrpSpPr>
+          <p:cNvPr id="21" name="Group 20"/>
+          <p:cNvGrpSpPr/>
+          <p:nvPr/>
+        </p:nvGrpSpPr>
+        <p:grpSpPr>
+          <a:xfrm>
+            <a:off x="2525915" y="4584764"/>
+            <a:ext cx="2734725" cy="369332"/>
+            <a:chOff x="2525915" y="3919743"/>
+            <a:chExt cx="2734725" cy="369332"/>
+          </a:xfrm>
+        </p:grpSpPr>
+        <p:grpSp>
+          <p:nvGrpSpPr>
+            <p:cNvPr id="6" name="Group 5"/>
+            <p:cNvGrpSpPr/>
+            <p:nvPr/>
+          </p:nvGrpSpPr>
+          <p:grpSpPr>
+            <a:xfrm>
+              <a:off x="4166750" y="3919743"/>
+              <a:ext cx="546945" cy="369332"/>
+              <a:chOff x="1839191" y="3896591"/>
+              <a:chExt cx="546945" cy="369332"/>
+            </a:xfrm>
+          </p:grpSpPr>
+          <p:sp>
+            <p:nvSpPr>
+              <p:cNvPr id="3" name="Rectangle 2"/>
+              <p:cNvSpPr/>
+              <p:nvPr/>
+            </p:nvSpPr>
+            <p:spPr>
+              <a:xfrm>
+                <a:off x="1839191" y="3906982"/>
+                <a:ext cx="546945" cy="332509"/>
+              </a:xfrm>
+              <a:prstGeom prst="rect">
+                <a:avLst/>
+              </a:prstGeom>
+              <a:noFill/>
+              <a:ln>
+                <a:solidFill>
+                  <a:schemeClr val="tx1"/>
+                </a:solidFill>
+              </a:ln>
+            </p:spPr>
+            <p:style>
+              <a:lnRef idx="2">
+                <a:schemeClr val="accent1">
+                  <a:shade val="50000"/>
+                </a:schemeClr>
+              </a:lnRef>
+              <a:fillRef idx="1">
+                <a:schemeClr val="accent1"/>
+              </a:fillRef>
+              <a:effectRef idx="0">
+                <a:schemeClr val="accent1"/>
+              </a:effectRef>
+              <a:fontRef idx="minor">
+                <a:schemeClr val="lt1"/>
+              </a:fontRef>
+            </p:style>
+            <p:txBody>
+              <a:bodyPr rtlCol="0" anchor="ctr"/>
+              <a:lstStyle/>
+              <a:p>
+                <a:pPr algn="ctr"/>
+                <a:endParaRPr lang="en-US"/>
+              </a:p>
+            </p:txBody>
+          </p:sp>
+          <p:sp>
+            <p:nvSpPr>
+              <p:cNvPr id="5" name="TextBox 4"/>
+              <p:cNvSpPr txBox="1"/>
+              <p:nvPr/>
+            </p:nvSpPr>
+            <p:spPr>
+              <a:xfrm>
+                <a:off x="1839191" y="3896591"/>
+                <a:ext cx="546945" cy="369332"/>
+              </a:xfrm>
+              <a:prstGeom prst="rect">
+                <a:avLst/>
+              </a:prstGeom>
+              <a:noFill/>
+            </p:spPr>
+            <p:txBody>
+              <a:bodyPr wrap="none" rtlCol="0">
+                <a:spAutoFit/>
+              </a:bodyPr>
+              <a:lstStyle/>
+              <a:p>
+                <a:r>
+                  <a:rPr lang="en-US" dirty="0" smtClean="0"/>
+                  <a:t>-1.3</a:t>
+                </a:r>
+                <a:endParaRPr lang="en-US" dirty="0"/>
+              </a:p>
+            </p:txBody>
+          </p:sp>
+        </p:grpSp>
+        <p:grpSp>
+          <p:nvGrpSpPr>
+            <p:cNvPr id="9" name="Group 8"/>
+            <p:cNvGrpSpPr/>
+            <p:nvPr/>
+          </p:nvGrpSpPr>
+          <p:grpSpPr>
+            <a:xfrm>
+              <a:off x="4713695" y="3919743"/>
+              <a:ext cx="546945" cy="369332"/>
+              <a:chOff x="1839191" y="3896591"/>
+              <a:chExt cx="546945" cy="369332"/>
+            </a:xfrm>
+          </p:grpSpPr>
+          <p:sp>
+            <p:nvSpPr>
+              <p:cNvPr id="10" name="Rectangle 9"/>
+              <p:cNvSpPr/>
+              <p:nvPr/>
+            </p:nvSpPr>
+            <p:spPr>
+              <a:xfrm>
+                <a:off x="1839191" y="3906982"/>
+                <a:ext cx="546945" cy="332509"/>
+              </a:xfrm>
+              <a:prstGeom prst="rect">
+                <a:avLst/>
+              </a:prstGeom>
+              <a:noFill/>
+              <a:ln>
+                <a:solidFill>
+                  <a:schemeClr val="tx1"/>
+                </a:solidFill>
+              </a:ln>
+            </p:spPr>
+            <p:style>
+              <a:lnRef idx="2">
+                <a:schemeClr val="accent1">
+                  <a:shade val="50000"/>
+                </a:schemeClr>
+              </a:lnRef>
+              <a:fillRef idx="1">
+                <a:schemeClr val="accent1"/>
+              </a:fillRef>
+              <a:effectRef idx="0">
+                <a:schemeClr val="accent1"/>
+              </a:effectRef>
+              <a:fontRef idx="minor">
+                <a:schemeClr val="lt1"/>
+              </a:fontRef>
+            </p:style>
+            <p:txBody>
+              <a:bodyPr rtlCol="0" anchor="ctr"/>
+              <a:lstStyle/>
+              <a:p>
+                <a:pPr algn="ctr"/>
+                <a:endParaRPr lang="en-US"/>
+              </a:p>
+            </p:txBody>
+          </p:sp>
+          <p:sp>
+            <p:nvSpPr>
+              <p:cNvPr id="11" name="TextBox 10"/>
+              <p:cNvSpPr txBox="1"/>
+              <p:nvPr/>
+            </p:nvSpPr>
+            <p:spPr>
+              <a:xfrm>
+                <a:off x="1839191" y="3896591"/>
+                <a:ext cx="476412" cy="369332"/>
+              </a:xfrm>
+              <a:prstGeom prst="rect">
+                <a:avLst/>
+              </a:prstGeom>
+              <a:noFill/>
+            </p:spPr>
+            <p:txBody>
+              <a:bodyPr wrap="none" rtlCol="0">
+                <a:spAutoFit/>
+              </a:bodyPr>
+              <a:lstStyle/>
+              <a:p>
+                <a:r>
+                  <a:rPr lang="en-US" dirty="0" smtClean="0"/>
+                  <a:t>0.6</a:t>
+                </a:r>
+                <a:endParaRPr lang="en-US" dirty="0"/>
+              </a:p>
+            </p:txBody>
+          </p:sp>
+        </p:grpSp>
+        <p:grpSp>
+          <p:nvGrpSpPr>
+            <p:cNvPr id="12" name="Group 11"/>
+            <p:cNvGrpSpPr/>
+            <p:nvPr/>
+          </p:nvGrpSpPr>
+          <p:grpSpPr>
+            <a:xfrm>
+              <a:off x="3619805" y="3919743"/>
+              <a:ext cx="546945" cy="369332"/>
+              <a:chOff x="1839191" y="3896591"/>
+              <a:chExt cx="546945" cy="369332"/>
+            </a:xfrm>
+          </p:grpSpPr>
+          <p:sp>
+            <p:nvSpPr>
+              <p:cNvPr id="13" name="Rectangle 12"/>
+              <p:cNvSpPr/>
+              <p:nvPr/>
+            </p:nvSpPr>
+            <p:spPr>
+              <a:xfrm>
+                <a:off x="1839191" y="3906982"/>
+                <a:ext cx="546945" cy="332509"/>
+              </a:xfrm>
+              <a:prstGeom prst="rect">
+                <a:avLst/>
+              </a:prstGeom>
+              <a:noFill/>
+              <a:ln>
+                <a:solidFill>
+                  <a:schemeClr val="tx1"/>
+                </a:solidFill>
+              </a:ln>
+            </p:spPr>
+            <p:style>
+              <a:lnRef idx="2">
+                <a:schemeClr val="accent1">
+                  <a:shade val="50000"/>
+                </a:schemeClr>
+              </a:lnRef>
+              <a:fillRef idx="1">
+                <a:schemeClr val="accent1"/>
+              </a:fillRef>
+              <a:effectRef idx="0">
+                <a:schemeClr val="accent1"/>
+              </a:effectRef>
+              <a:fontRef idx="minor">
+                <a:schemeClr val="lt1"/>
+              </a:fontRef>
+            </p:style>
+            <p:txBody>
+              <a:bodyPr rtlCol="0" anchor="ctr"/>
+              <a:lstStyle/>
+              <a:p>
+                <a:pPr algn="ctr"/>
+                <a:endParaRPr lang="en-US"/>
+              </a:p>
+            </p:txBody>
+          </p:sp>
+          <p:sp>
+            <p:nvSpPr>
+              <p:cNvPr id="14" name="TextBox 13"/>
+              <p:cNvSpPr txBox="1"/>
+              <p:nvPr/>
+            </p:nvSpPr>
+            <p:spPr>
+              <a:xfrm>
+                <a:off x="1839191" y="3896591"/>
+                <a:ext cx="476412" cy="369332"/>
+              </a:xfrm>
+              <a:prstGeom prst="rect">
+                <a:avLst/>
+              </a:prstGeom>
+              <a:noFill/>
+            </p:spPr>
+            <p:txBody>
+              <a:bodyPr wrap="none" rtlCol="0">
+                <a:spAutoFit/>
+              </a:bodyPr>
+              <a:lstStyle/>
+              <a:p>
+                <a:r>
+                  <a:rPr lang="en-US" dirty="0" smtClean="0"/>
+                  <a:t>5.9</a:t>
+                </a:r>
+                <a:endParaRPr lang="en-US" dirty="0"/>
+              </a:p>
+            </p:txBody>
+          </p:sp>
+        </p:grpSp>
+        <p:grpSp>
+          <p:nvGrpSpPr>
+            <p:cNvPr id="15" name="Group 14"/>
+            <p:cNvGrpSpPr/>
+            <p:nvPr/>
+          </p:nvGrpSpPr>
+          <p:grpSpPr>
+            <a:xfrm>
+              <a:off x="3072860" y="3919743"/>
+              <a:ext cx="546945" cy="369332"/>
+              <a:chOff x="1839191" y="3896591"/>
+              <a:chExt cx="546945" cy="369332"/>
+            </a:xfrm>
+          </p:grpSpPr>
+          <p:sp>
+            <p:nvSpPr>
+              <p:cNvPr id="16" name="Rectangle 15"/>
+              <p:cNvSpPr/>
+              <p:nvPr/>
+            </p:nvSpPr>
+            <p:spPr>
+              <a:xfrm>
+                <a:off x="1839191" y="3906982"/>
+                <a:ext cx="546945" cy="332509"/>
+              </a:xfrm>
+              <a:prstGeom prst="rect">
+                <a:avLst/>
+              </a:prstGeom>
+              <a:noFill/>
+              <a:ln>
+                <a:solidFill>
+                  <a:schemeClr val="tx1"/>
+                </a:solidFill>
+              </a:ln>
+            </p:spPr>
+            <p:style>
+              <a:lnRef idx="2">
+                <a:schemeClr val="accent1">
+                  <a:shade val="50000"/>
+                </a:schemeClr>
+              </a:lnRef>
+              <a:fillRef idx="1">
+                <a:schemeClr val="accent1"/>
+              </a:fillRef>
+              <a:effectRef idx="0">
+                <a:schemeClr val="accent1"/>
+              </a:effectRef>
+              <a:fontRef idx="minor">
+                <a:schemeClr val="lt1"/>
+              </a:fontRef>
+            </p:style>
+            <p:txBody>
+              <a:bodyPr rtlCol="0" anchor="ctr"/>
+              <a:lstStyle/>
+              <a:p>
+                <a:pPr algn="ctr"/>
+                <a:endParaRPr lang="en-US"/>
+              </a:p>
+            </p:txBody>
+          </p:sp>
+          <p:sp>
+            <p:nvSpPr>
+              <p:cNvPr id="17" name="TextBox 16"/>
+              <p:cNvSpPr txBox="1"/>
+              <p:nvPr/>
+            </p:nvSpPr>
+            <p:spPr>
+              <a:xfrm>
+                <a:off x="1839191" y="3896591"/>
+                <a:ext cx="476412" cy="369332"/>
+              </a:xfrm>
+              <a:prstGeom prst="rect">
+                <a:avLst/>
+              </a:prstGeom>
+              <a:noFill/>
+            </p:spPr>
+            <p:txBody>
+              <a:bodyPr wrap="none" rtlCol="0">
+                <a:spAutoFit/>
+              </a:bodyPr>
+              <a:lstStyle/>
+              <a:p>
+                <a:r>
+                  <a:rPr lang="en-US" dirty="0" smtClean="0"/>
+                  <a:t>1.2</a:t>
+                </a:r>
+                <a:endParaRPr lang="en-US" dirty="0"/>
+              </a:p>
+            </p:txBody>
+          </p:sp>
+        </p:grpSp>
+        <p:grpSp>
+          <p:nvGrpSpPr>
+            <p:cNvPr id="18" name="Group 17"/>
+            <p:cNvGrpSpPr/>
+            <p:nvPr/>
+          </p:nvGrpSpPr>
+          <p:grpSpPr>
+            <a:xfrm>
+              <a:off x="2525915" y="3919743"/>
+              <a:ext cx="546945" cy="369332"/>
+              <a:chOff x="1839191" y="3896591"/>
+              <a:chExt cx="546945" cy="369332"/>
+            </a:xfrm>
+          </p:grpSpPr>
+          <p:sp>
+            <p:nvSpPr>
+              <p:cNvPr id="19" name="Rectangle 18"/>
+              <p:cNvSpPr/>
+              <p:nvPr/>
+            </p:nvSpPr>
+            <p:spPr>
+              <a:xfrm>
+                <a:off x="1839191" y="3906982"/>
+                <a:ext cx="546945" cy="332509"/>
+              </a:xfrm>
+              <a:prstGeom prst="rect">
+                <a:avLst/>
+              </a:prstGeom>
+              <a:noFill/>
+              <a:ln>
+                <a:solidFill>
+                  <a:schemeClr val="tx1"/>
+                </a:solidFill>
+              </a:ln>
+            </p:spPr>
+            <p:style>
+              <a:lnRef idx="2">
+                <a:schemeClr val="accent1">
+                  <a:shade val="50000"/>
+                </a:schemeClr>
+              </a:lnRef>
+              <a:fillRef idx="1">
+                <a:schemeClr val="accent1"/>
+              </a:fillRef>
+              <a:effectRef idx="0">
+                <a:schemeClr val="accent1"/>
+              </a:effectRef>
+              <a:fontRef idx="minor">
+                <a:schemeClr val="lt1"/>
+              </a:fontRef>
+            </p:style>
+            <p:txBody>
+              <a:bodyPr rtlCol="0" anchor="ctr"/>
+              <a:lstStyle/>
+              <a:p>
+                <a:pPr algn="ctr"/>
+                <a:endParaRPr lang="en-US"/>
+              </a:p>
+            </p:txBody>
+          </p:sp>
+          <p:sp>
+            <p:nvSpPr>
+              <p:cNvPr id="20" name="TextBox 19"/>
+              <p:cNvSpPr txBox="1"/>
+              <p:nvPr/>
+            </p:nvSpPr>
+            <p:spPr>
+              <a:xfrm>
+                <a:off x="1839191" y="3896591"/>
+                <a:ext cx="476412" cy="369332"/>
+              </a:xfrm>
+              <a:prstGeom prst="rect">
+                <a:avLst/>
+              </a:prstGeom>
+              <a:noFill/>
+            </p:spPr>
+            <p:txBody>
+              <a:bodyPr wrap="none" rtlCol="0">
+                <a:spAutoFit/>
+              </a:bodyPr>
+              <a:lstStyle/>
+              <a:p>
+                <a:r>
+                  <a:rPr lang="en-US" dirty="0" smtClean="0"/>
+                  <a:t>3.5</a:t>
+                </a:r>
+                <a:endParaRPr lang="en-US" dirty="0"/>
+              </a:p>
+            </p:txBody>
+          </p:sp>
+        </p:grpSp>
+      </p:grpSp>
+      <p:grpSp>
+        <p:nvGrpSpPr>
+          <p:cNvPr id="27" name="Group 26"/>
+          <p:cNvGrpSpPr/>
+          <p:nvPr/>
+        </p:nvGrpSpPr>
+        <p:grpSpPr>
+          <a:xfrm>
+            <a:off x="1686775" y="3808331"/>
+            <a:ext cx="1569660" cy="776433"/>
+            <a:chOff x="1686775" y="3808331"/>
+            <a:chExt cx="1569660" cy="776433"/>
+          </a:xfrm>
+        </p:grpSpPr>
+        <p:sp>
+          <p:nvSpPr>
+            <p:cNvPr id="22" name="TextBox 21"/>
+            <p:cNvSpPr txBox="1"/>
+            <p:nvPr/>
+          </p:nvSpPr>
+          <p:spPr>
+            <a:xfrm>
+              <a:off x="1686775" y="3808331"/>
+              <a:ext cx="1569660" cy="400110"/>
+            </a:xfrm>
+            <a:prstGeom prst="rect">
+              <a:avLst/>
+            </a:prstGeom>
+            <a:noFill/>
+            <a:ln>
+              <a:solidFill>
+                <a:schemeClr val="tx1"/>
+              </a:solidFill>
+            </a:ln>
+          </p:spPr>
+          <p:txBody>
+            <a:bodyPr wrap="none" rtlCol="0">
+              <a:spAutoFit/>
+            </a:bodyPr>
+            <a:lstStyle/>
+            <a:p>
+              <a:r>
+                <a:rPr lang="en-US" sz="2000" dirty="0" smtClean="0">
+                  <a:latin typeface="Courier New" panose="02070309020205020404" pitchFamily="49" charset="0"/>
+                  <a:cs typeface="Courier New" panose="02070309020205020404" pitchFamily="49" charset="0"/>
+                </a:rPr>
+                <a:t>v.begin()</a:t>
+              </a:r>
+              <a:endParaRPr lang="en-US" sz="2000" dirty="0">
                 <a:latin typeface="Courier New" panose="02070309020205020404" pitchFamily="49" charset="0"/>
                 <a:cs typeface="Courier New" panose="02070309020205020404" pitchFamily="49" charset="0"/>
-              </a:rPr>
-              <a:t>}</a:t>
-            </a:r>
-          </a:p>
-        </p:txBody>
-      </p:sp>
-      <p:sp>
-        <p:nvSpPr>
-          <p:cNvPr id="8" name="TextBox 7"/>
-          <p:cNvSpPr txBox="1"/>
+              </a:endParaRPr>
+            </a:p>
+          </p:txBody>
+        </p:sp>
+        <p:cxnSp>
+          <p:nvCxnSpPr>
+            <p:cNvPr id="25" name="Straight Arrow Connector 24"/>
+            <p:cNvCxnSpPr>
+              <a:stCxn id="22" idx="2"/>
+              <a:endCxn id="20" idx="0"/>
+            </p:cNvCxnSpPr>
+            <p:nvPr/>
+          </p:nvCxnSpPr>
+          <p:spPr>
+            <a:xfrm>
+              <a:off x="2471605" y="4208441"/>
+              <a:ext cx="292516" cy="376323"/>
+            </a:xfrm>
+            <a:prstGeom prst="straightConnector1">
+              <a:avLst/>
+            </a:prstGeom>
+            <a:ln>
+              <a:solidFill>
+                <a:schemeClr val="tx1"/>
+              </a:solidFill>
+              <a:tailEnd type="stealth" w="lg" len="lg"/>
+            </a:ln>
+          </p:spPr>
+          <p:style>
+            <a:lnRef idx="1">
+              <a:schemeClr val="accent1"/>
+            </a:lnRef>
+            <a:fillRef idx="0">
+              <a:schemeClr val="accent1"/>
+            </a:fillRef>
+            <a:effectRef idx="0">
+              <a:schemeClr val="accent1"/>
+            </a:effectRef>
+            <a:fontRef idx="minor">
+              <a:schemeClr val="tx1"/>
+            </a:fontRef>
+          </p:style>
+        </p:cxnSp>
+      </p:grpSp>
+      <p:grpSp>
+        <p:nvGrpSpPr>
+          <p:cNvPr id="32" name="Group 31"/>
+          <p:cNvGrpSpPr/>
+          <p:nvPr/>
+        </p:nvGrpSpPr>
+        <p:grpSpPr>
+          <a:xfrm>
+            <a:off x="5260640" y="3808331"/>
+            <a:ext cx="1404501" cy="1119332"/>
+            <a:chOff x="5260640" y="3808331"/>
+            <a:chExt cx="1404501" cy="1119332"/>
+          </a:xfrm>
+        </p:grpSpPr>
+        <p:sp>
+          <p:nvSpPr>
+            <p:cNvPr id="23" name="Rectangle 22"/>
+            <p:cNvSpPr/>
+            <p:nvPr/>
+          </p:nvSpPr>
+          <p:spPr>
+            <a:xfrm>
+              <a:off x="5260640" y="4595154"/>
+              <a:ext cx="546945" cy="332509"/>
+            </a:xfrm>
+            <a:prstGeom prst="rect">
+              <a:avLst/>
+            </a:prstGeom>
+            <a:noFill/>
+            <a:ln>
+              <a:solidFill>
+                <a:schemeClr val="tx1"/>
+              </a:solidFill>
+              <a:prstDash val="sysDot"/>
+            </a:ln>
+          </p:spPr>
+          <p:style>
+            <a:lnRef idx="2">
+              <a:schemeClr val="accent1">
+                <a:shade val="50000"/>
+              </a:schemeClr>
+            </a:lnRef>
+            <a:fillRef idx="1">
+              <a:schemeClr val="accent1"/>
+            </a:fillRef>
+            <a:effectRef idx="0">
+              <a:schemeClr val="accent1"/>
+            </a:effectRef>
+            <a:fontRef idx="minor">
+              <a:schemeClr val="lt1"/>
+            </a:fontRef>
+          </p:style>
+          <p:txBody>
+            <a:bodyPr rtlCol="0" anchor="ctr"/>
+            <a:lstStyle/>
+            <a:p>
+              <a:pPr algn="ctr"/>
+              <a:endParaRPr lang="en-US"/>
+            </a:p>
+          </p:txBody>
+        </p:sp>
+        <p:grpSp>
+          <p:nvGrpSpPr>
+            <p:cNvPr id="28" name="Group 27"/>
+            <p:cNvGrpSpPr/>
+            <p:nvPr/>
+          </p:nvGrpSpPr>
+          <p:grpSpPr>
+            <a:xfrm>
+              <a:off x="5403257" y="3808331"/>
+              <a:ext cx="1261884" cy="786823"/>
+              <a:chOff x="1686775" y="3808331"/>
+              <a:chExt cx="1261884" cy="786823"/>
+            </a:xfrm>
+          </p:grpSpPr>
+          <p:sp>
+            <p:nvSpPr>
+              <p:cNvPr id="29" name="TextBox 28"/>
+              <p:cNvSpPr txBox="1"/>
+              <p:nvPr/>
+            </p:nvSpPr>
+            <p:spPr>
+              <a:xfrm>
+                <a:off x="1686775" y="3808331"/>
+                <a:ext cx="1261884" cy="400110"/>
+              </a:xfrm>
+              <a:prstGeom prst="rect">
+                <a:avLst/>
+              </a:prstGeom>
+              <a:noFill/>
+              <a:ln>
+                <a:solidFill>
+                  <a:schemeClr val="tx1"/>
+                </a:solidFill>
+              </a:ln>
+            </p:spPr>
+            <p:txBody>
+              <a:bodyPr wrap="none" rtlCol="0">
+                <a:spAutoFit/>
+              </a:bodyPr>
+              <a:lstStyle/>
+              <a:p>
+                <a:r>
+                  <a:rPr lang="en-US" sz="2000" dirty="0" err="1" smtClean="0">
+                    <a:latin typeface="Courier New" panose="02070309020205020404" pitchFamily="49" charset="0"/>
+                    <a:cs typeface="Courier New" panose="02070309020205020404" pitchFamily="49" charset="0"/>
+                  </a:rPr>
+                  <a:t>v.end</a:t>
+                </a:r>
+                <a:r>
+                  <a:rPr lang="en-US" sz="2000" dirty="0" smtClean="0">
+                    <a:latin typeface="Courier New" panose="02070309020205020404" pitchFamily="49" charset="0"/>
+                    <a:cs typeface="Courier New" panose="02070309020205020404" pitchFamily="49" charset="0"/>
+                  </a:rPr>
+                  <a:t>()</a:t>
+                </a:r>
+                <a:endParaRPr lang="en-US" sz="2000" dirty="0">
+                  <a:latin typeface="Courier New" panose="02070309020205020404" pitchFamily="49" charset="0"/>
+                  <a:cs typeface="Courier New" panose="02070309020205020404" pitchFamily="49" charset="0"/>
+                </a:endParaRPr>
+              </a:p>
+            </p:txBody>
+          </p:sp>
+          <p:cxnSp>
+            <p:nvCxnSpPr>
+              <p:cNvPr id="30" name="Straight Arrow Connector 29"/>
+              <p:cNvCxnSpPr>
+                <a:stCxn id="29" idx="2"/>
+                <a:endCxn id="23" idx="0"/>
+              </p:cNvCxnSpPr>
+              <p:nvPr/>
+            </p:nvCxnSpPr>
+            <p:spPr>
+              <a:xfrm flipH="1">
+                <a:off x="1817631" y="4208441"/>
+                <a:ext cx="500086" cy="386713"/>
+              </a:xfrm>
+              <a:prstGeom prst="straightConnector1">
+                <a:avLst/>
+              </a:prstGeom>
+              <a:ln>
+                <a:solidFill>
+                  <a:schemeClr val="tx1"/>
+                </a:solidFill>
+                <a:tailEnd type="stealth" w="lg" len="lg"/>
+              </a:ln>
+            </p:spPr>
+            <p:style>
+              <a:lnRef idx="1">
+                <a:schemeClr val="accent1"/>
+              </a:lnRef>
+              <a:fillRef idx="0">
+                <a:schemeClr val="accent1"/>
+              </a:fillRef>
+              <a:effectRef idx="0">
+                <a:schemeClr val="accent1"/>
+              </a:effectRef>
+              <a:fontRef idx="minor">
+                <a:schemeClr val="tx1"/>
+              </a:fontRef>
+            </p:style>
+          </p:cxnSp>
+        </p:grpSp>
+      </p:grpSp>
+      <p:grpSp>
+        <p:nvGrpSpPr>
+          <p:cNvPr id="33" name="Group 32"/>
+          <p:cNvGrpSpPr/>
+          <p:nvPr/>
+        </p:nvGrpSpPr>
+        <p:grpSpPr>
+          <a:xfrm>
+            <a:off x="2134686" y="4984874"/>
+            <a:ext cx="664701" cy="710673"/>
+            <a:chOff x="1686775" y="3497768"/>
+            <a:chExt cx="664701" cy="710673"/>
+          </a:xfrm>
+        </p:grpSpPr>
+        <p:sp>
+          <p:nvSpPr>
+            <p:cNvPr id="34" name="TextBox 33"/>
+            <p:cNvSpPr txBox="1"/>
+            <p:nvPr/>
+          </p:nvSpPr>
+          <p:spPr>
+            <a:xfrm>
+              <a:off x="1686775" y="3808331"/>
+              <a:ext cx="492443" cy="400110"/>
+            </a:xfrm>
+            <a:prstGeom prst="rect">
+              <a:avLst/>
+            </a:prstGeom>
+            <a:noFill/>
+            <a:ln>
+              <a:solidFill>
+                <a:schemeClr val="tx1"/>
+              </a:solidFill>
+            </a:ln>
+          </p:spPr>
+          <p:txBody>
+            <a:bodyPr wrap="none" rtlCol="0">
+              <a:spAutoFit/>
+            </a:bodyPr>
+            <a:lstStyle/>
+            <a:p>
+              <a:r>
+                <a:rPr lang="en-US" sz="2000" dirty="0" smtClean="0">
+                  <a:latin typeface="Courier New" panose="02070309020205020404" pitchFamily="49" charset="0"/>
+                  <a:cs typeface="Courier New" panose="02070309020205020404" pitchFamily="49" charset="0"/>
+                </a:rPr>
+                <a:t>it</a:t>
+              </a:r>
+              <a:endParaRPr lang="en-US" sz="2000" dirty="0">
+                <a:latin typeface="Courier New" panose="02070309020205020404" pitchFamily="49" charset="0"/>
+                <a:cs typeface="Courier New" panose="02070309020205020404" pitchFamily="49" charset="0"/>
+              </a:endParaRPr>
+            </a:p>
+          </p:txBody>
+        </p:sp>
+        <p:cxnSp>
+          <p:nvCxnSpPr>
+            <p:cNvPr id="35" name="Straight Arrow Connector 34"/>
+            <p:cNvCxnSpPr>
+              <a:stCxn id="34" idx="0"/>
+            </p:cNvCxnSpPr>
+            <p:nvPr/>
+          </p:nvCxnSpPr>
+          <p:spPr>
+            <a:xfrm flipV="1">
+              <a:off x="1932997" y="3497768"/>
+              <a:ext cx="418479" cy="310563"/>
+            </a:xfrm>
+            <a:prstGeom prst="straightConnector1">
+              <a:avLst/>
+            </a:prstGeom>
+            <a:ln>
+              <a:solidFill>
+                <a:schemeClr val="tx1"/>
+              </a:solidFill>
+              <a:tailEnd type="stealth" w="lg" len="lg"/>
+            </a:ln>
+          </p:spPr>
+          <p:style>
+            <a:lnRef idx="1">
+              <a:schemeClr val="accent1"/>
+            </a:lnRef>
+            <a:fillRef idx="0">
+              <a:schemeClr val="accent1"/>
+            </a:fillRef>
+            <a:effectRef idx="0">
+              <a:schemeClr val="accent1"/>
+            </a:effectRef>
+            <a:fontRef idx="minor">
+              <a:schemeClr val="tx1"/>
+            </a:fontRef>
+          </p:style>
+        </p:cxnSp>
+      </p:grpSp>
+      <p:sp>
+        <p:nvSpPr>
+          <p:cNvPr id="39" name="Rectangle 38"/>
+          <p:cNvSpPr/>
           <p:nvPr/>
         </p:nvSpPr>
         <p:spPr>
           <a:xfrm>
-            <a:off x="628650" y="4152808"/>
-            <a:ext cx="5561138" cy="923330"/>
+            <a:off x="1517073" y="4954096"/>
+            <a:ext cx="1485254" cy="937549"/>
           </a:xfrm>
           <a:prstGeom prst="rect">
             <a:avLst/>
           </a:prstGeom>
           <a:solidFill>
-            <a:schemeClr val="bg1">
-              <a:lumMod val="75000"/>
+            <a:schemeClr val="bg1"/>
+          </a:solidFill>
+          <a:ln>
+            <a:solidFill>
+              <a:schemeClr val="bg1"/>
+            </a:solidFill>
+          </a:ln>
+        </p:spPr>
+        <p:style>
+          <a:lnRef idx="2">
+            <a:schemeClr val="accent1">
+              <a:shade val="50000"/>
             </a:schemeClr>
-          </a:solidFill>
+          </a:lnRef>
+          <a:fillRef idx="1">
+            <a:schemeClr val="accent1"/>
+          </a:fillRef>
+          <a:effectRef idx="0">
+            <a:schemeClr val="accent1"/>
+          </a:effectRef>
+          <a:fontRef idx="minor">
+            <a:schemeClr val="lt1"/>
+          </a:fontRef>
+        </p:style>
+        <p:txBody>
+          <a:bodyPr rtlCol="0" anchor="ctr"/>
+          <a:lstStyle/>
+          <a:p>
+            <a:pPr algn="ctr"/>
+            <a:endParaRPr lang="en-US"/>
+          </a:p>
+        </p:txBody>
+      </p:sp>
+      <p:sp>
+        <p:nvSpPr>
+          <p:cNvPr id="40" name="TextBox 39"/>
+          <p:cNvSpPr txBox="1"/>
+          <p:nvPr/>
+        </p:nvSpPr>
+        <p:spPr>
+          <a:xfrm>
+            <a:off x="720741" y="5958916"/>
+            <a:ext cx="6750951" cy="461665"/>
+          </a:xfrm>
+          <a:prstGeom prst="rect">
+            <a:avLst/>
+          </a:prstGeom>
+          <a:noFill/>
           <a:ln>
             <a:solidFill>
               <a:schemeClr val="tx1"/>
@@ -3977,44 +4782,30 @@
           </a:ln>
         </p:spPr>
         <p:txBody>
-          <a:bodyPr wrap="square" rtlCol="0">
+          <a:bodyPr wrap="none" rtlCol="0">
             <a:spAutoFit/>
           </a:bodyPr>
           <a:lstStyle/>
           <a:p>
             <a:r>
-              <a:rPr lang="en-US" dirty="0" smtClean="0">
+              <a:rPr lang="en-US" sz="2400" dirty="0" smtClean="0">
                 <a:latin typeface="Courier New" panose="02070309020205020404" pitchFamily="49" charset="0"/>
                 <a:cs typeface="Courier New" panose="02070309020205020404" pitchFamily="49" charset="0"/>
               </a:rPr>
-              <a:t>…</a:t>
-            </a:r>
-          </a:p>
-          <a:p>
-            <a:r>
-              <a:rPr lang="en-US" dirty="0" smtClean="0">
+              <a:t>it</a:t>
+            </a:r>
+            <a:r>
+              <a:rPr lang="en-US" sz="2400" dirty="0" smtClean="0"/>
+              <a:t> contains address of element (pointer): value </a:t>
+            </a:r>
+            <a:r>
+              <a:rPr lang="en-US" sz="2400" dirty="0" smtClean="0">
                 <a:latin typeface="Courier New" panose="02070309020205020404" pitchFamily="49" charset="0"/>
                 <a:cs typeface="Courier New" panose="02070309020205020404" pitchFamily="49" charset="0"/>
               </a:rPr>
-              <a:t>a[0] = 12;</a:t>
-            </a:r>
-          </a:p>
-          <a:p>
-            <a:r>
-              <a:rPr lang="en-US" dirty="0" smtClean="0">
-                <a:latin typeface="Courier New" panose="02070309020205020404" pitchFamily="49" charset="0"/>
-                <a:cs typeface="Courier New" panose="02070309020205020404" pitchFamily="49" charset="0"/>
-              </a:rPr>
-              <a:t>a[1] = a[0] + </a:t>
-            </a:r>
-            <a:r>
-              <a:rPr lang="en-US" smtClean="0">
-                <a:latin typeface="Courier New" panose="02070309020205020404" pitchFamily="49" charset="0"/>
-                <a:cs typeface="Courier New" panose="02070309020205020404" pitchFamily="49" charset="0"/>
-              </a:rPr>
-              <a:t>13;</a:t>
-            </a:r>
-            <a:endParaRPr lang="en-US" dirty="0" smtClean="0">
+              <a:t>*it</a:t>
+            </a:r>
+            <a:endParaRPr lang="en-US" sz="2400" dirty="0">
               <a:latin typeface="Courier New" panose="02070309020205020404" pitchFamily="49" charset="0"/>
               <a:cs typeface="Courier New" panose="02070309020205020404" pitchFamily="49" charset="0"/>
             </a:endParaRPr>
@@ -4034,9 +4825,283 @@
   <p:timing>
     <p:tnLst>
       <p:par>
-        <p:cTn id="1" dur="indefinite" restart="never" nodeType="tmRoot"/>
+        <p:cTn id="1" dur="indefinite" restart="never" nodeType="tmRoot">
+          <p:childTnLst>
+            <p:seq concurrent="1" nextAc="seek">
+              <p:cTn id="2" dur="indefinite" nodeType="mainSeq">
+                <p:childTnLst>
+                  <p:par>
+                    <p:cTn id="3" fill="hold">
+                      <p:stCondLst>
+                        <p:cond delay="indefinite"/>
+                      </p:stCondLst>
+                      <p:childTnLst>
+                        <p:par>
+                          <p:cTn id="4" fill="hold">
+                            <p:stCondLst>
+                              <p:cond delay="0"/>
+                            </p:stCondLst>
+                            <p:childTnLst>
+                              <p:par>
+                                <p:cTn id="5" presetID="1" presetClass="entr" presetSubtype="0" fill="hold" nodeType="clickEffect">
+                                  <p:stCondLst>
+                                    <p:cond delay="0"/>
+                                  </p:stCondLst>
+                                  <p:childTnLst>
+                                    <p:set>
+                                      <p:cBhvr>
+                                        <p:cTn id="6" dur="1" fill="hold">
+                                          <p:stCondLst>
+                                            <p:cond delay="0"/>
+                                          </p:stCondLst>
+                                        </p:cTn>
+                                        <p:tgtEl>
+                                          <p:spTgt spid="21"/>
+                                        </p:tgtEl>
+                                        <p:attrNameLst>
+                                          <p:attrName>style.visibility</p:attrName>
+                                        </p:attrNameLst>
+                                      </p:cBhvr>
+                                      <p:to>
+                                        <p:strVal val="visible"/>
+                                      </p:to>
+                                    </p:set>
+                                  </p:childTnLst>
+                                </p:cTn>
+                              </p:par>
+                            </p:childTnLst>
+                          </p:cTn>
+                        </p:par>
+                      </p:childTnLst>
+                    </p:cTn>
+                  </p:par>
+                  <p:par>
+                    <p:cTn id="7" fill="hold">
+                      <p:stCondLst>
+                        <p:cond delay="indefinite"/>
+                      </p:stCondLst>
+                      <p:childTnLst>
+                        <p:par>
+                          <p:cTn id="8" fill="hold">
+                            <p:stCondLst>
+                              <p:cond delay="0"/>
+                            </p:stCondLst>
+                            <p:childTnLst>
+                              <p:par>
+                                <p:cTn id="9" presetID="1" presetClass="entr" presetSubtype="0" fill="hold" nodeType="clickEffect">
+                                  <p:stCondLst>
+                                    <p:cond delay="0"/>
+                                  </p:stCondLst>
+                                  <p:childTnLst>
+                                    <p:set>
+                                      <p:cBhvr>
+                                        <p:cTn id="10" dur="1" fill="hold">
+                                          <p:stCondLst>
+                                            <p:cond delay="0"/>
+                                          </p:stCondLst>
+                                        </p:cTn>
+                                        <p:tgtEl>
+                                          <p:spTgt spid="27"/>
+                                        </p:tgtEl>
+                                        <p:attrNameLst>
+                                          <p:attrName>style.visibility</p:attrName>
+                                        </p:attrNameLst>
+                                      </p:cBhvr>
+                                      <p:to>
+                                        <p:strVal val="visible"/>
+                                      </p:to>
+                                    </p:set>
+                                  </p:childTnLst>
+                                </p:cTn>
+                              </p:par>
+                            </p:childTnLst>
+                          </p:cTn>
+                        </p:par>
+                      </p:childTnLst>
+                    </p:cTn>
+                  </p:par>
+                  <p:par>
+                    <p:cTn id="11" fill="hold">
+                      <p:stCondLst>
+                        <p:cond delay="indefinite"/>
+                      </p:stCondLst>
+                      <p:childTnLst>
+                        <p:par>
+                          <p:cTn id="12" fill="hold">
+                            <p:stCondLst>
+                              <p:cond delay="0"/>
+                            </p:stCondLst>
+                            <p:childTnLst>
+                              <p:par>
+                                <p:cTn id="13" presetID="1" presetClass="entr" presetSubtype="0" fill="hold" nodeType="clickEffect">
+                                  <p:stCondLst>
+                                    <p:cond delay="0"/>
+                                  </p:stCondLst>
+                                  <p:childTnLst>
+                                    <p:set>
+                                      <p:cBhvr>
+                                        <p:cTn id="14" dur="1" fill="hold">
+                                          <p:stCondLst>
+                                            <p:cond delay="0"/>
+                                          </p:stCondLst>
+                                        </p:cTn>
+                                        <p:tgtEl>
+                                          <p:spTgt spid="32"/>
+                                        </p:tgtEl>
+                                        <p:attrNameLst>
+                                          <p:attrName>style.visibility</p:attrName>
+                                        </p:attrNameLst>
+                                      </p:cBhvr>
+                                      <p:to>
+                                        <p:strVal val="visible"/>
+                                      </p:to>
+                                    </p:set>
+                                  </p:childTnLst>
+                                </p:cTn>
+                              </p:par>
+                            </p:childTnLst>
+                          </p:cTn>
+                        </p:par>
+                      </p:childTnLst>
+                    </p:cTn>
+                  </p:par>
+                  <p:par>
+                    <p:cTn id="15" fill="hold">
+                      <p:stCondLst>
+                        <p:cond delay="indefinite"/>
+                      </p:stCondLst>
+                      <p:childTnLst>
+                        <p:par>
+                          <p:cTn id="16" fill="hold">
+                            <p:stCondLst>
+                              <p:cond delay="0"/>
+                            </p:stCondLst>
+                            <p:childTnLst>
+                              <p:par>
+                                <p:cTn id="17" presetID="1" presetClass="exit" presetSubtype="0" fill="hold" grpId="0" nodeType="clickEffect">
+                                  <p:stCondLst>
+                                    <p:cond delay="0"/>
+                                  </p:stCondLst>
+                                  <p:childTnLst>
+                                    <p:set>
+                                      <p:cBhvr>
+                                        <p:cTn id="18" dur="1" fill="hold">
+                                          <p:stCondLst>
+                                            <p:cond delay="0"/>
+                                          </p:stCondLst>
+                                        </p:cTn>
+                                        <p:tgtEl>
+                                          <p:spTgt spid="39"/>
+                                        </p:tgtEl>
+                                        <p:attrNameLst>
+                                          <p:attrName>style.visibility</p:attrName>
+                                        </p:attrNameLst>
+                                      </p:cBhvr>
+                                      <p:to>
+                                        <p:strVal val="hidden"/>
+                                      </p:to>
+                                    </p:set>
+                                  </p:childTnLst>
+                                </p:cTn>
+                              </p:par>
+                              <p:par>
+                                <p:cTn id="19" presetID="42" presetClass="path" presetSubtype="0" accel="50000" decel="50000" fill="hold" nodeType="withEffect">
+                                  <p:stCondLst>
+                                    <p:cond delay="0"/>
+                                  </p:stCondLst>
+                                  <p:childTnLst>
+                                    <p:animMotion origin="layout" path="M 4.72222E-6 -3.7037E-6 L 0.30556 -3.7037E-6 " pathEditMode="relative" rAng="0" ptsTypes="AA">
+                                      <p:cBhvr>
+                                        <p:cTn id="20" dur="2000" fill="hold"/>
+                                        <p:tgtEl>
+                                          <p:spTgt spid="33"/>
+                                        </p:tgtEl>
+                                        <p:attrNameLst>
+                                          <p:attrName>ppt_x</p:attrName>
+                                          <p:attrName>ppt_y</p:attrName>
+                                        </p:attrNameLst>
+                                      </p:cBhvr>
+                                      <p:rCtr x="14948" y="0"/>
+                                    </p:animMotion>
+                                  </p:childTnLst>
+                                </p:cTn>
+                              </p:par>
+                            </p:childTnLst>
+                          </p:cTn>
+                        </p:par>
+                      </p:childTnLst>
+                    </p:cTn>
+                  </p:par>
+                  <p:par>
+                    <p:cTn id="21" fill="hold">
+                      <p:stCondLst>
+                        <p:cond delay="indefinite"/>
+                      </p:stCondLst>
+                      <p:childTnLst>
+                        <p:par>
+                          <p:cTn id="22" fill="hold">
+                            <p:stCondLst>
+                              <p:cond delay="0"/>
+                            </p:stCondLst>
+                            <p:childTnLst>
+                              <p:par>
+                                <p:cTn id="23" presetID="1" presetClass="entr" presetSubtype="0" fill="hold" grpId="0" nodeType="clickEffect">
+                                  <p:stCondLst>
+                                    <p:cond delay="0"/>
+                                  </p:stCondLst>
+                                  <p:childTnLst>
+                                    <p:set>
+                                      <p:cBhvr>
+                                        <p:cTn id="24" dur="1" fill="hold">
+                                          <p:stCondLst>
+                                            <p:cond delay="0"/>
+                                          </p:stCondLst>
+                                        </p:cTn>
+                                        <p:tgtEl>
+                                          <p:spTgt spid="40"/>
+                                        </p:tgtEl>
+                                        <p:attrNameLst>
+                                          <p:attrName>style.visibility</p:attrName>
+                                        </p:attrNameLst>
+                                      </p:cBhvr>
+                                      <p:to>
+                                        <p:strVal val="visible"/>
+                                      </p:to>
+                                    </p:set>
+                                  </p:childTnLst>
+                                </p:cTn>
+                              </p:par>
+                            </p:childTnLst>
+                          </p:cTn>
+                        </p:par>
+                      </p:childTnLst>
+                    </p:cTn>
+                  </p:par>
+                </p:childTnLst>
+              </p:cTn>
+              <p:prevCondLst>
+                <p:cond evt="onPrev" delay="0">
+                  <p:tgtEl>
+                    <p:sldTgt/>
+                  </p:tgtEl>
+                </p:cond>
+              </p:prevCondLst>
+              <p:nextCondLst>
+                <p:cond evt="onNext" delay="0">
+                  <p:tgtEl>
+                    <p:sldTgt/>
+                  </p:tgtEl>
+                </p:cond>
+              </p:nextCondLst>
+            </p:seq>
+          </p:childTnLst>
+        </p:cTn>
       </p:par>
     </p:tnLst>
+    <p:bldLst>
+      <p:bldP spid="39" grpId="0" animBg="1"/>
+      <p:bldP spid="40" grpId="0" animBg="1"/>
+    </p:bldLst>
   </p:timing>
 </p:sld>
 </file>
@@ -4075,15 +5140,7 @@
           <a:p>
             <a:r>
               <a:rPr lang="en-US" dirty="0" smtClean="0"/>
-              <a:t>What was </a:t>
-            </a:r>
-            <a:r>
-              <a:rPr lang="en-US" dirty="0" smtClean="0"/>
-              <a:t>left out/added</a:t>
-            </a:r>
-            <a:r>
-              <a:rPr lang="en-US" dirty="0" smtClean="0"/>
-              <a:t>?</a:t>
+              <a:t>What was left out/added?</a:t>
             </a:r>
             <a:endParaRPr lang="en-US" dirty="0"/>
           </a:p>
@@ -4144,6 +5201,13 @@
   <p:clrMapOvr>
     <a:masterClrMapping/>
   </p:clrMapOvr>
+  <p:timing>
+    <p:tnLst>
+      <p:par>
+        <p:cTn id="1" dur="indefinite" restart="never" nodeType="tmRoot"/>
+      </p:par>
+    </p:tnLst>
+  </p:timing>
 </p:sld>
 </file>
 

</xml_diff>

<commit_message>
Added slide on sorting
</commit_message>
<xml_diff>
--- a/CPlusPlus/10_essential_algorithms.pptx
+++ b/CPlusPlus/10_essential_algorithms.pptx
@@ -5,14 +5,15 @@
     <p:sldMasterId id="2147483660" r:id="rId1"/>
   </p:sldMasterIdLst>
   <p:notesMasterIdLst>
-    <p:notesMasterId r:id="rId7"/>
+    <p:notesMasterId r:id="rId8"/>
   </p:notesMasterIdLst>
   <p:sldIdLst>
     <p:sldId id="302" r:id="rId2"/>
     <p:sldId id="303" r:id="rId3"/>
     <p:sldId id="267" r:id="rId4"/>
-    <p:sldId id="313" r:id="rId5"/>
-    <p:sldId id="300" r:id="rId6"/>
+    <p:sldId id="314" r:id="rId5"/>
+    <p:sldId id="313" r:id="rId6"/>
+    <p:sldId id="300" r:id="rId7"/>
   </p:sldIdLst>
   <p:sldSz cx="9144000" cy="6858000" type="screen4x3"/>
   <p:notesSz cx="6858000" cy="9144000"/>
@@ -5140,7 +5141,7 @@
           <a:p>
             <a:r>
               <a:rPr lang="en-US" dirty="0" smtClean="0"/>
-              <a:t>What was left out/added?</a:t>
+              <a:t>Sorting</a:t>
             </a:r>
             <a:endParaRPr lang="en-US" dirty="0"/>
           </a:p>
@@ -5148,12 +5149,12 @@
       </p:sp>
       <p:sp>
         <p:nvSpPr>
-          <p:cNvPr id="4" name="Content Placeholder 3"/>
-          <p:cNvSpPr>
-            <a:spLocks noGrp="1"/>
-          </p:cNvSpPr>
-          <p:nvPr>
-            <p:ph idx="1"/>
+          <p:cNvPr id="3" name="Slide Number Placeholder 2"/>
+          <p:cNvSpPr>
+            <a:spLocks noGrp="1"/>
+          </p:cNvSpPr>
+          <p:nvPr>
+            <p:ph type="sldNum" sz="quarter" idx="12"/>
           </p:nvPr>
         </p:nvSpPr>
         <p:spPr/>
@@ -5161,29 +5162,7 @@
           <a:bodyPr/>
           <a:lstStyle/>
           <a:p>
-            <a:endParaRPr lang="en-US" dirty="0" smtClean="0"/>
-          </a:p>
-          <a:p>
-            <a:endParaRPr lang="en-US" dirty="0"/>
-          </a:p>
-        </p:txBody>
-      </p:sp>
-      <p:sp>
-        <p:nvSpPr>
-          <p:cNvPr id="3" name="Slide Number Placeholder 2"/>
-          <p:cNvSpPr>
-            <a:spLocks noGrp="1"/>
-          </p:cNvSpPr>
-          <p:nvPr>
-            <p:ph type="sldNum" sz="quarter" idx="12"/>
-          </p:nvPr>
-        </p:nvSpPr>
-        <p:spPr/>
-        <p:txBody>
-          <a:bodyPr/>
-          <a:lstStyle/>
-          <a:p>
-            <a:fld id="{9CEF4966-5219-4577-B301-14467D565841}" type="slidenum">
+            <a:fld id="{11AD1F4E-1E51-402E-B221-310F004E7D3B}" type="slidenum">
               <a:rPr lang="en-US" smtClean="0"/>
               <a:t>4</a:t>
             </a:fld>
@@ -5191,10 +5170,192 @@
           </a:p>
         </p:txBody>
       </p:sp>
+      <p:sp>
+        <p:nvSpPr>
+          <p:cNvPr id="4" name="TextBox 3"/>
+          <p:cNvSpPr txBox="1"/>
+          <p:nvPr/>
+        </p:nvSpPr>
+        <p:spPr>
+          <a:xfrm>
+            <a:off x="628650" y="1953400"/>
+            <a:ext cx="7237268" cy="1754326"/>
+          </a:xfrm>
+          <a:prstGeom prst="rect">
+            <a:avLst/>
+          </a:prstGeom>
+          <a:solidFill>
+            <a:schemeClr val="bg1">
+              <a:lumMod val="75000"/>
+            </a:schemeClr>
+          </a:solidFill>
+          <a:ln>
+            <a:solidFill>
+              <a:schemeClr val="tx1"/>
+            </a:solidFill>
+          </a:ln>
+        </p:spPr>
+        <p:txBody>
+          <a:bodyPr wrap="square" rtlCol="0">
+            <a:spAutoFit/>
+          </a:bodyPr>
+          <a:lstStyle/>
+          <a:p>
+            <a:r>
+              <a:rPr lang="en-US" dirty="0" smtClean="0">
+                <a:latin typeface="Courier New" panose="02070309020205020404" pitchFamily="49" charset="0"/>
+                <a:cs typeface="Courier New" panose="02070309020205020404" pitchFamily="49" charset="0"/>
+              </a:rPr>
+              <a:t>#include &lt;algorithm&gt;</a:t>
+            </a:r>
+          </a:p>
+          <a:p>
+            <a:r>
+              <a:rPr lang="en-US" dirty="0" smtClean="0">
+                <a:latin typeface="Courier New" panose="02070309020205020404" pitchFamily="49" charset="0"/>
+                <a:cs typeface="Courier New" panose="02070309020205020404" pitchFamily="49" charset="0"/>
+              </a:rPr>
+              <a:t>…</a:t>
+            </a:r>
+          </a:p>
+          <a:p>
+            <a:r>
+              <a:rPr lang="en-US" dirty="0" smtClean="0">
+                <a:latin typeface="Courier New" panose="02070309020205020404" pitchFamily="49" charset="0"/>
+                <a:cs typeface="Courier New" panose="02070309020205020404" pitchFamily="49" charset="0"/>
+              </a:rPr>
+              <a:t>vector&lt;double&gt; v {3.5, 1.2, 5.9, -1.3, 0.6};</a:t>
+            </a:r>
+          </a:p>
+          <a:p>
+            <a:r>
+              <a:rPr lang="en-US" dirty="0" smtClean="0">
+                <a:latin typeface="Courier New" panose="02070309020205020404" pitchFamily="49" charset="0"/>
+                <a:cs typeface="Courier New" panose="02070309020205020404" pitchFamily="49" charset="0"/>
+              </a:rPr>
+              <a:t>sort(v.begin(), </a:t>
+            </a:r>
+            <a:r>
+              <a:rPr lang="en-US" dirty="0" err="1" smtClean="0">
+                <a:latin typeface="Courier New" panose="02070309020205020404" pitchFamily="49" charset="0"/>
+                <a:cs typeface="Courier New" panose="02070309020205020404" pitchFamily="49" charset="0"/>
+              </a:rPr>
+              <a:t>v.end</a:t>
+            </a:r>
+            <a:r>
+              <a:rPr lang="en-US" dirty="0" smtClean="0">
+                <a:latin typeface="Courier New" panose="02070309020205020404" pitchFamily="49" charset="0"/>
+                <a:cs typeface="Courier New" panose="02070309020205020404" pitchFamily="49" charset="0"/>
+              </a:rPr>
+              <a:t>());</a:t>
+            </a:r>
+            <a:endParaRPr lang="en-US" dirty="0" smtClean="0">
+              <a:latin typeface="Courier New" panose="02070309020205020404" pitchFamily="49" charset="0"/>
+              <a:cs typeface="Courier New" panose="02070309020205020404" pitchFamily="49" charset="0"/>
+            </a:endParaRPr>
+          </a:p>
+          <a:p>
+            <a:r>
+              <a:rPr lang="en-US" dirty="0" smtClean="0">
+                <a:latin typeface="Courier New" panose="02070309020205020404" pitchFamily="49" charset="0"/>
+                <a:cs typeface="Courier New" panose="02070309020205020404" pitchFamily="49" charset="0"/>
+              </a:rPr>
+              <a:t>for (auto it = v.begin(); it != </a:t>
+            </a:r>
+            <a:r>
+              <a:rPr lang="en-US" dirty="0" err="1" smtClean="0">
+                <a:latin typeface="Courier New" panose="02070309020205020404" pitchFamily="49" charset="0"/>
+                <a:cs typeface="Courier New" panose="02070309020205020404" pitchFamily="49" charset="0"/>
+              </a:rPr>
+              <a:t>v.end</a:t>
+            </a:r>
+            <a:r>
+              <a:rPr lang="en-US" dirty="0" smtClean="0">
+                <a:latin typeface="Courier New" panose="02070309020205020404" pitchFamily="49" charset="0"/>
+                <a:cs typeface="Courier New" panose="02070309020205020404" pitchFamily="49" charset="0"/>
+              </a:rPr>
+              <a:t>(); it++)</a:t>
+            </a:r>
+            <a:endParaRPr lang="en-US" dirty="0" smtClean="0">
+              <a:latin typeface="Courier New" panose="02070309020205020404" pitchFamily="49" charset="0"/>
+              <a:cs typeface="Courier New" panose="02070309020205020404" pitchFamily="49" charset="0"/>
+            </a:endParaRPr>
+          </a:p>
+          <a:p>
+            <a:r>
+              <a:rPr lang="en-US" dirty="0">
+                <a:latin typeface="Courier New" panose="02070309020205020404" pitchFamily="49" charset="0"/>
+                <a:cs typeface="Courier New" panose="02070309020205020404" pitchFamily="49" charset="0"/>
+              </a:rPr>
+              <a:t> </a:t>
+            </a:r>
+            <a:r>
+              <a:rPr lang="en-US" dirty="0" smtClean="0">
+                <a:latin typeface="Courier New" panose="02070309020205020404" pitchFamily="49" charset="0"/>
+                <a:cs typeface="Courier New" panose="02070309020205020404" pitchFamily="49" charset="0"/>
+              </a:rPr>
+              <a:t>   </a:t>
+            </a:r>
+            <a:r>
+              <a:rPr lang="en-US" dirty="0" err="1" smtClean="0">
+                <a:latin typeface="Courier New" panose="02070309020205020404" pitchFamily="49" charset="0"/>
+                <a:cs typeface="Courier New" panose="02070309020205020404" pitchFamily="49" charset="0"/>
+              </a:rPr>
+              <a:t>cout</a:t>
+            </a:r>
+            <a:r>
+              <a:rPr lang="en-US" dirty="0" smtClean="0">
+                <a:latin typeface="Courier New" panose="02070309020205020404" pitchFamily="49" charset="0"/>
+                <a:cs typeface="Courier New" panose="02070309020205020404" pitchFamily="49" charset="0"/>
+              </a:rPr>
+              <a:t> &lt;&lt; </a:t>
+            </a:r>
+            <a:r>
+              <a:rPr lang="en-US" dirty="0" smtClean="0">
+                <a:latin typeface="Courier New" panose="02070309020205020404" pitchFamily="49" charset="0"/>
+                <a:cs typeface="Courier New" panose="02070309020205020404" pitchFamily="49" charset="0"/>
+              </a:rPr>
+              <a:t>*it</a:t>
+            </a:r>
+            <a:r>
+              <a:rPr lang="en-US" dirty="0" smtClean="0">
+                <a:latin typeface="Courier New" panose="02070309020205020404" pitchFamily="49" charset="0"/>
+                <a:cs typeface="Courier New" panose="02070309020205020404" pitchFamily="49" charset="0"/>
+              </a:rPr>
+              <a:t> </a:t>
+            </a:r>
+            <a:r>
+              <a:rPr lang="en-US" dirty="0" smtClean="0">
+                <a:latin typeface="Courier New" panose="02070309020205020404" pitchFamily="49" charset="0"/>
+                <a:cs typeface="Courier New" panose="02070309020205020404" pitchFamily="49" charset="0"/>
+              </a:rPr>
+              <a:t>&lt;&lt; </a:t>
+            </a:r>
+            <a:r>
+              <a:rPr lang="en-US" dirty="0" err="1" smtClean="0">
+                <a:latin typeface="Courier New" panose="02070309020205020404" pitchFamily="49" charset="0"/>
+                <a:cs typeface="Courier New" panose="02070309020205020404" pitchFamily="49" charset="0"/>
+              </a:rPr>
+              <a:t>endl</a:t>
+            </a:r>
+            <a:r>
+              <a:rPr lang="en-US" dirty="0" smtClean="0">
+                <a:latin typeface="Courier New" panose="02070309020205020404" pitchFamily="49" charset="0"/>
+                <a:cs typeface="Courier New" panose="02070309020205020404" pitchFamily="49" charset="0"/>
+              </a:rPr>
+              <a:t>;</a:t>
+            </a:r>
+            <a:endParaRPr lang="en-US" dirty="0" smtClean="0">
+              <a:latin typeface="Courier New" panose="02070309020205020404" pitchFamily="49" charset="0"/>
+              <a:cs typeface="Courier New" panose="02070309020205020404" pitchFamily="49" charset="0"/>
+            </a:endParaRPr>
+          </a:p>
+        </p:txBody>
+      </p:sp>
     </p:spTree>
     <p:extLst>
       <p:ext uri="{BB962C8B-B14F-4D97-AF65-F5344CB8AC3E}">
-        <p14:creationId xmlns:p14="http://schemas.microsoft.com/office/powerpoint/2010/main" val="3233369179"/>
+        <p14:creationId xmlns:p14="http://schemas.microsoft.com/office/powerpoint/2010/main" val="2909435324"/>
       </p:ext>
     </p:extLst>
   </p:cSld>
@@ -5245,6 +5406,111 @@
           <a:p>
             <a:r>
               <a:rPr lang="en-US" dirty="0" smtClean="0"/>
+              <a:t>What was left out/added?</a:t>
+            </a:r>
+            <a:endParaRPr lang="en-US" dirty="0"/>
+          </a:p>
+        </p:txBody>
+      </p:sp>
+      <p:sp>
+        <p:nvSpPr>
+          <p:cNvPr id="4" name="Content Placeholder 3"/>
+          <p:cNvSpPr>
+            <a:spLocks noGrp="1"/>
+          </p:cNvSpPr>
+          <p:nvPr>
+            <p:ph idx="1"/>
+          </p:nvPr>
+        </p:nvSpPr>
+        <p:spPr/>
+        <p:txBody>
+          <a:bodyPr/>
+          <a:lstStyle/>
+          <a:p>
+            <a:endParaRPr lang="en-US" dirty="0" smtClean="0"/>
+          </a:p>
+          <a:p>
+            <a:endParaRPr lang="en-US" dirty="0"/>
+          </a:p>
+        </p:txBody>
+      </p:sp>
+      <p:sp>
+        <p:nvSpPr>
+          <p:cNvPr id="3" name="Slide Number Placeholder 2"/>
+          <p:cNvSpPr>
+            <a:spLocks noGrp="1"/>
+          </p:cNvSpPr>
+          <p:nvPr>
+            <p:ph type="sldNum" sz="quarter" idx="12"/>
+          </p:nvPr>
+        </p:nvSpPr>
+        <p:spPr/>
+        <p:txBody>
+          <a:bodyPr/>
+          <a:lstStyle/>
+          <a:p>
+            <a:fld id="{9CEF4966-5219-4577-B301-14467D565841}" type="slidenum">
+              <a:rPr lang="en-US" smtClean="0"/>
+              <a:t>5</a:t>
+            </a:fld>
+            <a:endParaRPr lang="en-US"/>
+          </a:p>
+        </p:txBody>
+      </p:sp>
+    </p:spTree>
+    <p:extLst>
+      <p:ext uri="{BB962C8B-B14F-4D97-AF65-F5344CB8AC3E}">
+        <p14:creationId xmlns:p14="http://schemas.microsoft.com/office/powerpoint/2010/main" val="3233369179"/>
+      </p:ext>
+    </p:extLst>
+  </p:cSld>
+  <p:clrMapOvr>
+    <a:masterClrMapping/>
+  </p:clrMapOvr>
+  <p:timing>
+    <p:tnLst>
+      <p:par>
+        <p:cTn id="1" dur="indefinite" restart="never" nodeType="tmRoot"/>
+      </p:par>
+    </p:tnLst>
+  </p:timing>
+</p:sld>
+</file>
+
+<file path=ppt/slides/slide6.xml><?xml version="1.0" encoding="utf-8"?>
+<p:sld xmlns:a="http://schemas.openxmlformats.org/drawingml/2006/main" xmlns:r="http://schemas.openxmlformats.org/officeDocument/2006/relationships" xmlns:p="http://schemas.openxmlformats.org/presentationml/2006/main">
+  <p:cSld>
+    <p:spTree>
+      <p:nvGrpSpPr>
+        <p:cNvPr id="1" name=""/>
+        <p:cNvGrpSpPr/>
+        <p:nvPr/>
+      </p:nvGrpSpPr>
+      <p:grpSpPr>
+        <a:xfrm>
+          <a:off x="0" y="0"/>
+          <a:ext cx="0" cy="0"/>
+          <a:chOff x="0" y="0"/>
+          <a:chExt cx="0" cy="0"/>
+        </a:xfrm>
+      </p:grpSpPr>
+      <p:sp>
+        <p:nvSpPr>
+          <p:cNvPr id="2" name="Title 1"/>
+          <p:cNvSpPr>
+            <a:spLocks noGrp="1"/>
+          </p:cNvSpPr>
+          <p:nvPr>
+            <p:ph type="title"/>
+          </p:nvPr>
+        </p:nvSpPr>
+        <p:spPr/>
+        <p:txBody>
+          <a:bodyPr/>
+          <a:lstStyle/>
+          <a:p>
+            <a:r>
+              <a:rPr lang="en-US" dirty="0" smtClean="0"/>
               <a:t>References</a:t>
             </a:r>
             <a:endParaRPr lang="en-US" dirty="0"/>
@@ -5358,7 +5624,7 @@
           <a:p>
             <a:fld id="{11AD1F4E-1E51-402E-B221-310F004E7D3B}" type="slidenum">
               <a:rPr lang="en-US" smtClean="0"/>
-              <a:t>5</a:t>
+              <a:t>6</a:t>
             </a:fld>
             <a:endParaRPr lang="en-US"/>
           </a:p>

</xml_diff>

<commit_message>
Added placeholderr slide for search algorithms
</commit_message>
<xml_diff>
--- a/CPlusPlus/10_essential_algorithms.pptx
+++ b/CPlusPlus/10_essential_algorithms.pptx
@@ -5,15 +5,17 @@
     <p:sldMasterId id="2147483660" r:id="rId1"/>
   </p:sldMasterIdLst>
   <p:notesMasterIdLst>
-    <p:notesMasterId r:id="rId8"/>
+    <p:notesMasterId r:id="rId10"/>
   </p:notesMasterIdLst>
   <p:sldIdLst>
     <p:sldId id="302" r:id="rId2"/>
     <p:sldId id="303" r:id="rId3"/>
     <p:sldId id="267" r:id="rId4"/>
     <p:sldId id="314" r:id="rId5"/>
-    <p:sldId id="313" r:id="rId6"/>
-    <p:sldId id="300" r:id="rId7"/>
+    <p:sldId id="315" r:id="rId6"/>
+    <p:sldId id="316" r:id="rId7"/>
+    <p:sldId id="313" r:id="rId8"/>
+    <p:sldId id="300" r:id="rId9"/>
   </p:sldIdLst>
   <p:sldSz cx="9144000" cy="6858000" type="screen4x3"/>
   <p:notesSz cx="6858000" cy="9144000"/>
@@ -202,7 +204,7 @@
           <a:p>
             <a:fld id="{D3AF4CC3-573B-48A2-BA19-C88E9EEB8008}" type="datetimeFigureOut">
               <a:rPr lang="en-US" smtClean="0"/>
-              <a:t>2017-04-06</a:t>
+              <a:t>2017-04-09</a:t>
             </a:fld>
             <a:endParaRPr lang="en-US"/>
           </a:p>
@@ -601,7 +603,7 @@
           <a:p>
             <a:fld id="{E7395A51-B5B5-44D7-85E1-1556CCB9180F}" type="datetime1">
               <a:rPr lang="en-US" smtClean="0"/>
-              <a:t>2017-04-06</a:t>
+              <a:t>2017-04-09</a:t>
             </a:fld>
             <a:endParaRPr lang="en-US"/>
           </a:p>
@@ -771,7 +773,7 @@
           <a:p>
             <a:fld id="{BEDB066D-DA80-4992-B507-A911EFD1878C}" type="datetime1">
               <a:rPr lang="en-US" smtClean="0"/>
-              <a:t>2017-04-06</a:t>
+              <a:t>2017-04-09</a:t>
             </a:fld>
             <a:endParaRPr lang="en-US"/>
           </a:p>
@@ -951,7 +953,7 @@
           <a:p>
             <a:fld id="{21259CBD-682A-4ABE-AFE9-CACFF55FE875}" type="datetime1">
               <a:rPr lang="en-US" smtClean="0"/>
-              <a:t>2017-04-06</a:t>
+              <a:t>2017-04-09</a:t>
             </a:fld>
             <a:endParaRPr lang="en-US"/>
           </a:p>
@@ -1121,7 +1123,7 @@
           <a:p>
             <a:fld id="{5F76F78E-A200-421E-B0AA-A6018E81E55E}" type="datetime1">
               <a:rPr lang="en-US" smtClean="0"/>
-              <a:t>2017-04-06</a:t>
+              <a:t>2017-04-09</a:t>
             </a:fld>
             <a:endParaRPr lang="en-US"/>
           </a:p>
@@ -1365,7 +1367,7 @@
           <a:p>
             <a:fld id="{EBEC21EE-ED62-44E3-A586-FF0104F19B99}" type="datetime1">
               <a:rPr lang="en-US" smtClean="0"/>
-              <a:t>2017-04-06</a:t>
+              <a:t>2017-04-09</a:t>
             </a:fld>
             <a:endParaRPr lang="en-US"/>
           </a:p>
@@ -1597,7 +1599,7 @@
           <a:p>
             <a:fld id="{30049BC0-4C66-4CED-BC8E-7AF0BD49C9B5}" type="datetime1">
               <a:rPr lang="en-US" smtClean="0"/>
-              <a:t>2017-04-06</a:t>
+              <a:t>2017-04-09</a:t>
             </a:fld>
             <a:endParaRPr lang="en-US"/>
           </a:p>
@@ -1964,7 +1966,7 @@
           <a:p>
             <a:fld id="{C7C90E0A-53F1-4115-8AB2-2E28E481FF48}" type="datetime1">
               <a:rPr lang="en-US" smtClean="0"/>
-              <a:t>2017-04-06</a:t>
+              <a:t>2017-04-09</a:t>
             </a:fld>
             <a:endParaRPr lang="en-US"/>
           </a:p>
@@ -2082,7 +2084,7 @@
           <a:p>
             <a:fld id="{AF79CAB3-789B-4117-A859-FC7082686441}" type="datetime1">
               <a:rPr lang="en-US" smtClean="0"/>
-              <a:t>2017-04-06</a:t>
+              <a:t>2017-04-09</a:t>
             </a:fld>
             <a:endParaRPr lang="en-US"/>
           </a:p>
@@ -2177,7 +2179,7 @@
           <a:p>
             <a:fld id="{82AE2AC5-51ED-46C8-8F1B-788630EE802E}" type="datetime1">
               <a:rPr lang="en-US" smtClean="0"/>
-              <a:t>2017-04-06</a:t>
+              <a:t>2017-04-09</a:t>
             </a:fld>
             <a:endParaRPr lang="en-US"/>
           </a:p>
@@ -2454,7 +2456,7 @@
           <a:p>
             <a:fld id="{49D0F6DD-6796-44CA-AF4C-1B2A2288F444}" type="datetime1">
               <a:rPr lang="en-US" smtClean="0"/>
-              <a:t>2017-04-06</a:t>
+              <a:t>2017-04-09</a:t>
             </a:fld>
             <a:endParaRPr lang="en-US"/>
           </a:p>
@@ -2711,7 +2713,7 @@
           <a:p>
             <a:fld id="{57F6808E-F05D-421A-97B7-12B728993E3B}" type="datetime1">
               <a:rPr lang="en-US" smtClean="0"/>
-              <a:t>2017-04-06</a:t>
+              <a:t>2017-04-09</a:t>
             </a:fld>
             <a:endParaRPr lang="en-US"/>
           </a:p>
@@ -2924,7 +2926,7 @@
           <a:p>
             <a:fld id="{7B995810-2FB7-4DE8-B622-97729F9C53CB}" type="datetime1">
               <a:rPr lang="en-US" smtClean="0"/>
-              <a:t>2017-04-06</a:t>
+              <a:t>2017-04-09</a:t>
             </a:fld>
             <a:endParaRPr lang="en-US"/>
           </a:p>
@@ -3787,10 +3789,6 @@
               </a:rPr>
               <a:t>vector&lt;double&gt; v {3.5, 1.2, 5.9, -1.3, 0.6};</a:t>
             </a:r>
-            <a:endParaRPr lang="en-US" dirty="0" smtClean="0">
-              <a:latin typeface="Courier New" panose="02070309020205020404" pitchFamily="49" charset="0"/>
-              <a:cs typeface="Courier New" panose="02070309020205020404" pitchFamily="49" charset="0"/>
-            </a:endParaRPr>
           </a:p>
           <a:p>
             <a:r>
@@ -3798,26 +3796,50 @@
                 <a:latin typeface="Courier New" panose="02070309020205020404" pitchFamily="49" charset="0"/>
                 <a:cs typeface="Courier New" panose="02070309020205020404" pitchFamily="49" charset="0"/>
               </a:rPr>
-              <a:t>for (auto it = v.begin(); it != </a:t>
+              <a:t>for </a:t>
+            </a:r>
+            <a:r>
+              <a:rPr lang="en-US" dirty="0" smtClean="0">
+                <a:latin typeface="Courier New" panose="02070309020205020404" pitchFamily="49" charset="0"/>
+                <a:cs typeface="Courier New" panose="02070309020205020404" pitchFamily="49" charset="0"/>
+              </a:rPr>
+              <a:t>(auto </a:t>
+            </a:r>
+            <a:r>
+              <a:rPr lang="en-US" dirty="0" smtClean="0">
+                <a:latin typeface="Courier New" panose="02070309020205020404" pitchFamily="49" charset="0"/>
+                <a:cs typeface="Courier New" panose="02070309020205020404" pitchFamily="49" charset="0"/>
+              </a:rPr>
+              <a:t>it = </a:t>
             </a:r>
             <a:r>
               <a:rPr lang="en-US" dirty="0" err="1" smtClean="0">
                 <a:latin typeface="Courier New" panose="02070309020205020404" pitchFamily="49" charset="0"/>
                 <a:cs typeface="Courier New" panose="02070309020205020404" pitchFamily="49" charset="0"/>
               </a:rPr>
-              <a:t>v.end</a:t>
+              <a:t>v.cbegin</a:t>
             </a:r>
             <a:r>
               <a:rPr lang="en-US" dirty="0" smtClean="0">
                 <a:latin typeface="Courier New" panose="02070309020205020404" pitchFamily="49" charset="0"/>
                 <a:cs typeface="Courier New" panose="02070309020205020404" pitchFamily="49" charset="0"/>
               </a:rPr>
+              <a:t>(); it != </a:t>
+            </a:r>
+            <a:r>
+              <a:rPr lang="en-US" dirty="0" err="1" smtClean="0">
+                <a:latin typeface="Courier New" panose="02070309020205020404" pitchFamily="49" charset="0"/>
+                <a:cs typeface="Courier New" panose="02070309020205020404" pitchFamily="49" charset="0"/>
+              </a:rPr>
+              <a:t>v.cend</a:t>
+            </a:r>
+            <a:r>
+              <a:rPr lang="en-US" dirty="0" smtClean="0">
+                <a:latin typeface="Courier New" panose="02070309020205020404" pitchFamily="49" charset="0"/>
+                <a:cs typeface="Courier New" panose="02070309020205020404" pitchFamily="49" charset="0"/>
+              </a:rPr>
               <a:t>(); it++)</a:t>
             </a:r>
-            <a:endParaRPr lang="en-US" dirty="0" smtClean="0">
-              <a:latin typeface="Courier New" panose="02070309020205020404" pitchFamily="49" charset="0"/>
-              <a:cs typeface="Courier New" panose="02070309020205020404" pitchFamily="49" charset="0"/>
-            </a:endParaRPr>
           </a:p>
           <a:p>
             <a:r>
@@ -3846,47 +3868,22 @@
                 <a:latin typeface="Courier New" panose="02070309020205020404" pitchFamily="49" charset="0"/>
                 <a:cs typeface="Courier New" panose="02070309020205020404" pitchFamily="49" charset="0"/>
               </a:rPr>
-              <a:t> &lt;&lt; </a:t>
+              <a:t> &lt;&lt; *it &lt;&lt; </a:t>
+            </a:r>
+            <a:r>
+              <a:rPr lang="en-US" dirty="0" err="1" smtClean="0">
+                <a:latin typeface="Courier New" panose="02070309020205020404" pitchFamily="49" charset="0"/>
+                <a:cs typeface="Courier New" panose="02070309020205020404" pitchFamily="49" charset="0"/>
+              </a:rPr>
+              <a:t>endl</a:t>
             </a:r>
             <a:r>
               <a:rPr lang="en-US" dirty="0" smtClean="0">
                 <a:latin typeface="Courier New" panose="02070309020205020404" pitchFamily="49" charset="0"/>
                 <a:cs typeface="Courier New" panose="02070309020205020404" pitchFamily="49" charset="0"/>
               </a:rPr>
-              <a:t>*it</a:t>
-            </a:r>
-            <a:r>
-              <a:rPr lang="en-US" dirty="0" smtClean="0">
-                <a:latin typeface="Courier New" panose="02070309020205020404" pitchFamily="49" charset="0"/>
-                <a:cs typeface="Courier New" panose="02070309020205020404" pitchFamily="49" charset="0"/>
-              </a:rPr>
-              <a:t> </a:t>
-            </a:r>
-            <a:r>
-              <a:rPr lang="en-US" dirty="0" smtClean="0">
-                <a:latin typeface="Courier New" panose="02070309020205020404" pitchFamily="49" charset="0"/>
-                <a:cs typeface="Courier New" panose="02070309020205020404" pitchFamily="49" charset="0"/>
-              </a:rPr>
-              <a:t>&lt;&lt; </a:t>
-            </a:r>
-            <a:r>
-              <a:rPr lang="en-US" dirty="0" err="1" smtClean="0">
-                <a:latin typeface="Courier New" panose="02070309020205020404" pitchFamily="49" charset="0"/>
-                <a:cs typeface="Courier New" panose="02070309020205020404" pitchFamily="49" charset="0"/>
-              </a:rPr>
-              <a:t>endl</a:t>
-            </a:r>
-            <a:r>
-              <a:rPr lang="en-US" dirty="0" smtClean="0">
-                <a:latin typeface="Courier New" panose="02070309020205020404" pitchFamily="49" charset="0"/>
-                <a:cs typeface="Courier New" panose="02070309020205020404" pitchFamily="49" charset="0"/>
-              </a:rPr>
               <a:t>;</a:t>
             </a:r>
-            <a:endParaRPr lang="en-US" dirty="0" smtClean="0">
-              <a:latin typeface="Courier New" panose="02070309020205020404" pitchFamily="49" charset="0"/>
-              <a:cs typeface="Courier New" panose="02070309020205020404" pitchFamily="49" charset="0"/>
-            </a:endParaRPr>
           </a:p>
         </p:txBody>
       </p:sp>
@@ -4369,9 +4366,9 @@
         <p:grpSpPr>
           <a:xfrm>
             <a:off x="1686775" y="3808331"/>
-            <a:ext cx="1569660" cy="776433"/>
+            <a:ext cx="1723549" cy="776433"/>
             <a:chOff x="1686775" y="3808331"/>
-            <a:chExt cx="1569660" cy="776433"/>
+            <a:chExt cx="1723549" cy="776433"/>
           </a:xfrm>
         </p:grpSpPr>
         <p:sp>
@@ -4383,7 +4380,7 @@
           <p:spPr>
             <a:xfrm>
               <a:off x="1686775" y="3808331"/>
-              <a:ext cx="1569660" cy="400110"/>
+              <a:ext cx="1723549" cy="400110"/>
             </a:xfrm>
             <a:prstGeom prst="rect">
               <a:avLst/>
@@ -4402,11 +4399,18 @@
             <a:lstStyle/>
             <a:p>
               <a:r>
+                <a:rPr lang="en-US" sz="2000" dirty="0" err="1" smtClean="0">
+                  <a:latin typeface="Courier New" panose="02070309020205020404" pitchFamily="49" charset="0"/>
+                  <a:cs typeface="Courier New" panose="02070309020205020404" pitchFamily="49" charset="0"/>
+                </a:rPr>
+                <a:t>v.cbegin</a:t>
+              </a:r>
+              <a:r>
                 <a:rPr lang="en-US" sz="2000" dirty="0" smtClean="0">
                   <a:latin typeface="Courier New" panose="02070309020205020404" pitchFamily="49" charset="0"/>
                   <a:cs typeface="Courier New" panose="02070309020205020404" pitchFamily="49" charset="0"/>
                 </a:rPr>
-                <a:t>v.begin()</a:t>
+                <a:t>()</a:t>
               </a:r>
               <a:endParaRPr lang="en-US" sz="2000" dirty="0">
                 <a:latin typeface="Courier New" panose="02070309020205020404" pitchFamily="49" charset="0"/>
@@ -4426,8 +4430,8 @@
           </p:nvCxnSpPr>
           <p:spPr>
             <a:xfrm>
-              <a:off x="2471605" y="4208441"/>
-              <a:ext cx="292516" cy="376323"/>
+              <a:off x="2548550" y="4208441"/>
+              <a:ext cx="215571" cy="376323"/>
             </a:xfrm>
             <a:prstGeom prst="straightConnector1">
               <a:avLst/>
@@ -4464,9 +4468,9 @@
         <p:grpSpPr>
           <a:xfrm>
             <a:off x="5260640" y="3808331"/>
-            <a:ext cx="1404501" cy="1119332"/>
+            <a:ext cx="1558389" cy="1119332"/>
             <a:chOff x="5260640" y="3808331"/>
-            <a:chExt cx="1404501" cy="1119332"/>
+            <a:chExt cx="1558389" cy="1119332"/>
           </a:xfrm>
         </p:grpSpPr>
         <p:sp>
@@ -4525,9 +4529,9 @@
           <p:grpSpPr>
             <a:xfrm>
               <a:off x="5403257" y="3808331"/>
-              <a:ext cx="1261884" cy="786823"/>
+              <a:ext cx="1415772" cy="786823"/>
               <a:chOff x="1686775" y="3808331"/>
-              <a:chExt cx="1261884" cy="786823"/>
+              <a:chExt cx="1415772" cy="786823"/>
             </a:xfrm>
           </p:grpSpPr>
           <p:sp>
@@ -4539,7 +4543,7 @@
             <p:spPr>
               <a:xfrm>
                 <a:off x="1686775" y="3808331"/>
-                <a:ext cx="1261884" cy="400110"/>
+                <a:ext cx="1415772" cy="400110"/>
               </a:xfrm>
               <a:prstGeom prst="rect">
                 <a:avLst/>
@@ -4562,7 +4566,7 @@
                     <a:latin typeface="Courier New" panose="02070309020205020404" pitchFamily="49" charset="0"/>
                     <a:cs typeface="Courier New" panose="02070309020205020404" pitchFamily="49" charset="0"/>
                   </a:rPr>
-                  <a:t>v.end</a:t>
+                  <a:t>v.cend</a:t>
                 </a:r>
                 <a:r>
                   <a:rPr lang="en-US" sz="2000" dirty="0" smtClean="0">
@@ -4590,7 +4594,7 @@
             <p:spPr>
               <a:xfrm flipH="1">
                 <a:off x="1817631" y="4208441"/>
-                <a:ext cx="500086" cy="386713"/>
+                <a:ext cx="577030" cy="386713"/>
               </a:xfrm>
               <a:prstGeom prst="straightConnector1">
                 <a:avLst/>
@@ -5149,6 +5153,103 @@
       </p:sp>
       <p:sp>
         <p:nvSpPr>
+          <p:cNvPr id="5" name="Content Placeholder 4"/>
+          <p:cNvSpPr>
+            <a:spLocks noGrp="1"/>
+          </p:cNvSpPr>
+          <p:nvPr>
+            <p:ph idx="1"/>
+          </p:nvPr>
+        </p:nvSpPr>
+        <p:spPr>
+          <a:xfrm>
+            <a:off x="628650" y="3970437"/>
+            <a:ext cx="7886700" cy="2206526"/>
+          </a:xfrm>
+        </p:spPr>
+        <p:txBody>
+          <a:bodyPr/>
+          <a:lstStyle/>
+          <a:p>
+            <a:r>
+              <a:rPr lang="en-US" dirty="0" err="1" smtClean="0">
+                <a:latin typeface="Courier New" panose="02070309020205020404" pitchFamily="49" charset="0"/>
+                <a:cs typeface="Courier New" panose="02070309020205020404" pitchFamily="49" charset="0"/>
+              </a:rPr>
+              <a:t>cbegin</a:t>
+            </a:r>
+            <a:r>
+              <a:rPr lang="en-US" dirty="0" smtClean="0">
+                <a:latin typeface="Courier New" panose="02070309020205020404" pitchFamily="49" charset="0"/>
+                <a:cs typeface="Courier New" panose="02070309020205020404" pitchFamily="49" charset="0"/>
+              </a:rPr>
+              <a:t>()</a:t>
+            </a:r>
+            <a:r>
+              <a:rPr lang="en-US" dirty="0" smtClean="0"/>
+              <a:t>/</a:t>
+            </a:r>
+            <a:r>
+              <a:rPr lang="en-US" dirty="0" err="1" smtClean="0">
+                <a:latin typeface="Courier New" panose="02070309020205020404" pitchFamily="49" charset="0"/>
+                <a:cs typeface="Courier New" panose="02070309020205020404" pitchFamily="49" charset="0"/>
+              </a:rPr>
+              <a:t>cend</a:t>
+            </a:r>
+            <a:r>
+              <a:rPr lang="en-US" dirty="0" smtClean="0">
+                <a:latin typeface="Courier New" panose="02070309020205020404" pitchFamily="49" charset="0"/>
+                <a:cs typeface="Courier New" panose="02070309020205020404" pitchFamily="49" charset="0"/>
+              </a:rPr>
+              <a:t>()</a:t>
+            </a:r>
+          </a:p>
+          <a:p>
+            <a:pPr lvl="1"/>
+            <a:r>
+              <a:rPr lang="en-US" dirty="0" smtClean="0"/>
+              <a:t>constant iterator</a:t>
+            </a:r>
+          </a:p>
+          <a:p>
+            <a:pPr lvl="1"/>
+            <a:r>
+              <a:rPr lang="en-US" dirty="0" smtClean="0"/>
+              <a:t>elements will not be modified</a:t>
+            </a:r>
+          </a:p>
+          <a:p>
+            <a:r>
+              <a:rPr lang="en-US" dirty="0" smtClean="0">
+                <a:latin typeface="Courier New" panose="02070309020205020404" pitchFamily="49" charset="0"/>
+                <a:cs typeface="Courier New" panose="02070309020205020404" pitchFamily="49" charset="0"/>
+              </a:rPr>
+              <a:t>begin()</a:t>
+            </a:r>
+            <a:r>
+              <a:rPr lang="en-US" dirty="0" smtClean="0"/>
+              <a:t>/</a:t>
+            </a:r>
+            <a:r>
+              <a:rPr lang="en-US" dirty="0" smtClean="0">
+                <a:latin typeface="Courier New" panose="02070309020205020404" pitchFamily="49" charset="0"/>
+                <a:cs typeface="Courier New" panose="02070309020205020404" pitchFamily="49" charset="0"/>
+              </a:rPr>
+              <a:t>end()</a:t>
+            </a:r>
+          </a:p>
+          <a:p>
+            <a:pPr lvl="1"/>
+            <a:r>
+              <a:rPr lang="en-US" dirty="0" smtClean="0"/>
+              <a:t>elements can be modified</a:t>
+            </a:r>
+            <a:endParaRPr lang="en-US" dirty="0"/>
+          </a:p>
+        </p:txBody>
+      </p:sp>
+      <p:sp>
+        <p:nvSpPr>
           <p:cNvPr id="3" name="Slide Number Placeholder 2"/>
           <p:cNvSpPr>
             <a:spLocks noGrp="1"/>
@@ -5179,7 +5280,7 @@
         <p:spPr>
           <a:xfrm>
             <a:off x="628650" y="1953400"/>
-            <a:ext cx="7237268" cy="1754326"/>
+            <a:ext cx="7787986" cy="1754326"/>
           </a:xfrm>
           <a:prstGeom prst="rect">
             <a:avLst/>
@@ -5249,10 +5350,6 @@
               </a:rPr>
               <a:t>());</a:t>
             </a:r>
-            <a:endParaRPr lang="en-US" dirty="0" smtClean="0">
-              <a:latin typeface="Courier New" panose="02070309020205020404" pitchFamily="49" charset="0"/>
-              <a:cs typeface="Courier New" panose="02070309020205020404" pitchFamily="49" charset="0"/>
-            </a:endParaRPr>
           </a:p>
           <a:p>
             <a:r>
@@ -5260,26 +5357,64 @@
                 <a:latin typeface="Courier New" panose="02070309020205020404" pitchFamily="49" charset="0"/>
                 <a:cs typeface="Courier New" panose="02070309020205020404" pitchFamily="49" charset="0"/>
               </a:rPr>
-              <a:t>for (auto it = v.begin(); it != </a:t>
+              <a:t>for </a:t>
+            </a:r>
+            <a:r>
+              <a:rPr lang="en-US" dirty="0" smtClean="0">
+                <a:latin typeface="Courier New" panose="02070309020205020404" pitchFamily="49" charset="0"/>
+                <a:cs typeface="Courier New" panose="02070309020205020404" pitchFamily="49" charset="0"/>
+              </a:rPr>
+              <a:t>(</a:t>
             </a:r>
             <a:r>
               <a:rPr lang="en-US" dirty="0" err="1" smtClean="0">
                 <a:latin typeface="Courier New" panose="02070309020205020404" pitchFamily="49" charset="0"/>
                 <a:cs typeface="Courier New" panose="02070309020205020404" pitchFamily="49" charset="0"/>
               </a:rPr>
-              <a:t>v.end</a:t>
+              <a:t>const</a:t>
             </a:r>
             <a:r>
               <a:rPr lang="en-US" dirty="0" smtClean="0">
                 <a:latin typeface="Courier New" panose="02070309020205020404" pitchFamily="49" charset="0"/>
                 <a:cs typeface="Courier New" panose="02070309020205020404" pitchFamily="49" charset="0"/>
               </a:rPr>
+              <a:t> auto&amp; </a:t>
+            </a:r>
+            <a:r>
+              <a:rPr lang="en-US" dirty="0" smtClean="0">
+                <a:latin typeface="Courier New" panose="02070309020205020404" pitchFamily="49" charset="0"/>
+                <a:cs typeface="Courier New" panose="02070309020205020404" pitchFamily="49" charset="0"/>
+              </a:rPr>
+              <a:t>it = </a:t>
+            </a:r>
+            <a:r>
+              <a:rPr lang="en-US" dirty="0" err="1" smtClean="0">
+                <a:latin typeface="Courier New" panose="02070309020205020404" pitchFamily="49" charset="0"/>
+                <a:cs typeface="Courier New" panose="02070309020205020404" pitchFamily="49" charset="0"/>
+              </a:rPr>
+              <a:t>v.cbegin</a:t>
+            </a:r>
+            <a:r>
+              <a:rPr lang="en-US" dirty="0" smtClean="0">
+                <a:latin typeface="Courier New" panose="02070309020205020404" pitchFamily="49" charset="0"/>
+                <a:cs typeface="Courier New" panose="02070309020205020404" pitchFamily="49" charset="0"/>
+              </a:rPr>
+              <a:t>(); it != </a:t>
+            </a:r>
+            <a:r>
+              <a:rPr lang="en-US" dirty="0" err="1" smtClean="0">
+                <a:latin typeface="Courier New" panose="02070309020205020404" pitchFamily="49" charset="0"/>
+                <a:cs typeface="Courier New" panose="02070309020205020404" pitchFamily="49" charset="0"/>
+              </a:rPr>
+              <a:t>v.cend</a:t>
+            </a:r>
+            <a:r>
+              <a:rPr lang="en-US" dirty="0" smtClean="0">
+                <a:latin typeface="Courier New" panose="02070309020205020404" pitchFamily="49" charset="0"/>
+                <a:cs typeface="Courier New" panose="02070309020205020404" pitchFamily="49" charset="0"/>
+              </a:rPr>
               <a:t>(); it++)</a:t>
             </a:r>
-            <a:endParaRPr lang="en-US" dirty="0" smtClean="0">
-              <a:latin typeface="Courier New" panose="02070309020205020404" pitchFamily="49" charset="0"/>
-              <a:cs typeface="Courier New" panose="02070309020205020404" pitchFamily="49" charset="0"/>
-            </a:endParaRPr>
           </a:p>
           <a:p>
             <a:r>
@@ -5308,47 +5443,75 @@
                 <a:latin typeface="Courier New" panose="02070309020205020404" pitchFamily="49" charset="0"/>
                 <a:cs typeface="Courier New" panose="02070309020205020404" pitchFamily="49" charset="0"/>
               </a:rPr>
-              <a:t> &lt;&lt; </a:t>
+              <a:t> &lt;&lt; *it &lt;&lt; </a:t>
+            </a:r>
+            <a:r>
+              <a:rPr lang="en-US" dirty="0" err="1" smtClean="0">
+                <a:latin typeface="Courier New" panose="02070309020205020404" pitchFamily="49" charset="0"/>
+                <a:cs typeface="Courier New" panose="02070309020205020404" pitchFamily="49" charset="0"/>
+              </a:rPr>
+              <a:t>endl</a:t>
             </a:r>
             <a:r>
               <a:rPr lang="en-US" dirty="0" smtClean="0">
                 <a:latin typeface="Courier New" panose="02070309020205020404" pitchFamily="49" charset="0"/>
                 <a:cs typeface="Courier New" panose="02070309020205020404" pitchFamily="49" charset="0"/>
               </a:rPr>
-              <a:t>*it</a:t>
-            </a:r>
-            <a:r>
-              <a:rPr lang="en-US" dirty="0" smtClean="0">
-                <a:latin typeface="Courier New" panose="02070309020205020404" pitchFamily="49" charset="0"/>
-                <a:cs typeface="Courier New" panose="02070309020205020404" pitchFamily="49" charset="0"/>
-              </a:rPr>
-              <a:t> </a:t>
-            </a:r>
-            <a:r>
-              <a:rPr lang="en-US" dirty="0" smtClean="0">
-                <a:latin typeface="Courier New" panose="02070309020205020404" pitchFamily="49" charset="0"/>
-                <a:cs typeface="Courier New" panose="02070309020205020404" pitchFamily="49" charset="0"/>
-              </a:rPr>
-              <a:t>&lt;&lt; </a:t>
-            </a:r>
-            <a:r>
-              <a:rPr lang="en-US" dirty="0" err="1" smtClean="0">
-                <a:latin typeface="Courier New" panose="02070309020205020404" pitchFamily="49" charset="0"/>
-                <a:cs typeface="Courier New" panose="02070309020205020404" pitchFamily="49" charset="0"/>
-              </a:rPr>
-              <a:t>endl</a:t>
-            </a:r>
-            <a:r>
-              <a:rPr lang="en-US" dirty="0" smtClean="0">
-                <a:latin typeface="Courier New" panose="02070309020205020404" pitchFamily="49" charset="0"/>
-                <a:cs typeface="Courier New" panose="02070309020205020404" pitchFamily="49" charset="0"/>
-              </a:rPr>
               <a:t>;</a:t>
             </a:r>
-            <a:endParaRPr lang="en-US" dirty="0" smtClean="0">
-              <a:latin typeface="Courier New" panose="02070309020205020404" pitchFamily="49" charset="0"/>
-              <a:cs typeface="Courier New" panose="02070309020205020404" pitchFamily="49" charset="0"/>
-            </a:endParaRPr>
+          </a:p>
+        </p:txBody>
+      </p:sp>
+      <p:sp>
+        <p:nvSpPr>
+          <p:cNvPr id="6" name="TextBox 5"/>
+          <p:cNvSpPr txBox="1"/>
+          <p:nvPr/>
+        </p:nvSpPr>
+        <p:spPr>
+          <a:xfrm>
+            <a:off x="5902037" y="4520046"/>
+            <a:ext cx="2768771" cy="830997"/>
+          </a:xfrm>
+          <a:prstGeom prst="rect">
+            <a:avLst/>
+          </a:prstGeom>
+          <a:noFill/>
+          <a:ln>
+            <a:solidFill>
+              <a:schemeClr val="tx1"/>
+            </a:solidFill>
+          </a:ln>
+        </p:spPr>
+        <p:txBody>
+          <a:bodyPr wrap="none" rtlCol="0">
+            <a:spAutoFit/>
+          </a:bodyPr>
+          <a:lstStyle/>
+          <a:p>
+            <a:r>
+              <a:rPr lang="en-US" sz="2400" dirty="0" smtClean="0"/>
+              <a:t>Use </a:t>
+            </a:r>
+            <a:r>
+              <a:rPr lang="en-US" sz="2400" dirty="0" err="1" smtClean="0">
+                <a:latin typeface="Courier New" panose="02070309020205020404" pitchFamily="49" charset="0"/>
+                <a:cs typeface="Courier New" panose="02070309020205020404" pitchFamily="49" charset="0"/>
+              </a:rPr>
+              <a:t>const</a:t>
+            </a:r>
+            <a:r>
+              <a:rPr lang="en-US" sz="2400" dirty="0" smtClean="0"/>
+              <a:t> iterators</a:t>
+            </a:r>
+            <a:br>
+              <a:rPr lang="en-US" sz="2400" dirty="0" smtClean="0"/>
+            </a:br>
+            <a:r>
+              <a:rPr lang="en-US" sz="2400" dirty="0" smtClean="0"/>
+              <a:t>whenever possible</a:t>
+            </a:r>
+            <a:endParaRPr lang="en-US" sz="2400" dirty="0"/>
           </a:p>
         </p:txBody>
       </p:sp>
@@ -5365,9 +5528,275 @@
   <p:timing>
     <p:tnLst>
       <p:par>
-        <p:cTn id="1" dur="indefinite" restart="never" nodeType="tmRoot"/>
+        <p:cTn id="1" dur="indefinite" restart="never" nodeType="tmRoot">
+          <p:childTnLst>
+            <p:seq concurrent="1" nextAc="seek">
+              <p:cTn id="2" dur="indefinite" nodeType="mainSeq">
+                <p:childTnLst>
+                  <p:par>
+                    <p:cTn id="3" fill="hold">
+                      <p:stCondLst>
+                        <p:cond delay="indefinite"/>
+                      </p:stCondLst>
+                      <p:childTnLst>
+                        <p:par>
+                          <p:cTn id="4" fill="hold">
+                            <p:stCondLst>
+                              <p:cond delay="0"/>
+                            </p:stCondLst>
+                            <p:childTnLst>
+                              <p:par>
+                                <p:cTn id="5" presetID="1" presetClass="entr" presetSubtype="0" fill="hold" grpId="0" nodeType="clickEffect">
+                                  <p:stCondLst>
+                                    <p:cond delay="0"/>
+                                  </p:stCondLst>
+                                  <p:childTnLst>
+                                    <p:set>
+                                      <p:cBhvr>
+                                        <p:cTn id="6" dur="1" fill="hold">
+                                          <p:stCondLst>
+                                            <p:cond delay="0"/>
+                                          </p:stCondLst>
+                                        </p:cTn>
+                                        <p:tgtEl>
+                                          <p:spTgt spid="5">
+                                            <p:txEl>
+                                              <p:pRg st="0" end="0"/>
+                                            </p:txEl>
+                                          </p:spTgt>
+                                        </p:tgtEl>
+                                        <p:attrNameLst>
+                                          <p:attrName>style.visibility</p:attrName>
+                                        </p:attrNameLst>
+                                      </p:cBhvr>
+                                      <p:to>
+                                        <p:strVal val="visible"/>
+                                      </p:to>
+                                    </p:set>
+                                  </p:childTnLst>
+                                </p:cTn>
+                              </p:par>
+                              <p:par>
+                                <p:cTn id="7" presetID="1" presetClass="entr" presetSubtype="0" fill="hold" grpId="0" nodeType="withEffect">
+                                  <p:stCondLst>
+                                    <p:cond delay="0"/>
+                                  </p:stCondLst>
+                                  <p:childTnLst>
+                                    <p:set>
+                                      <p:cBhvr>
+                                        <p:cTn id="8" dur="1" fill="hold">
+                                          <p:stCondLst>
+                                            <p:cond delay="0"/>
+                                          </p:stCondLst>
+                                        </p:cTn>
+                                        <p:tgtEl>
+                                          <p:spTgt spid="5">
+                                            <p:txEl>
+                                              <p:pRg st="1" end="1"/>
+                                            </p:txEl>
+                                          </p:spTgt>
+                                        </p:tgtEl>
+                                        <p:attrNameLst>
+                                          <p:attrName>style.visibility</p:attrName>
+                                        </p:attrNameLst>
+                                      </p:cBhvr>
+                                      <p:to>
+                                        <p:strVal val="visible"/>
+                                      </p:to>
+                                    </p:set>
+                                  </p:childTnLst>
+                                </p:cTn>
+                              </p:par>
+                              <p:par>
+                                <p:cTn id="9" presetID="1" presetClass="entr" presetSubtype="0" fill="hold" grpId="0" nodeType="withEffect">
+                                  <p:stCondLst>
+                                    <p:cond delay="0"/>
+                                  </p:stCondLst>
+                                  <p:childTnLst>
+                                    <p:set>
+                                      <p:cBhvr>
+                                        <p:cTn id="10" dur="1" fill="hold">
+                                          <p:stCondLst>
+                                            <p:cond delay="0"/>
+                                          </p:stCondLst>
+                                        </p:cTn>
+                                        <p:tgtEl>
+                                          <p:spTgt spid="5">
+                                            <p:txEl>
+                                              <p:pRg st="2" end="2"/>
+                                            </p:txEl>
+                                          </p:spTgt>
+                                        </p:tgtEl>
+                                        <p:attrNameLst>
+                                          <p:attrName>style.visibility</p:attrName>
+                                        </p:attrNameLst>
+                                      </p:cBhvr>
+                                      <p:to>
+                                        <p:strVal val="visible"/>
+                                      </p:to>
+                                    </p:set>
+                                  </p:childTnLst>
+                                </p:cTn>
+                              </p:par>
+                            </p:childTnLst>
+                          </p:cTn>
+                        </p:par>
+                      </p:childTnLst>
+                    </p:cTn>
+                  </p:par>
+                  <p:par>
+                    <p:cTn id="11" fill="hold">
+                      <p:stCondLst>
+                        <p:cond delay="indefinite"/>
+                      </p:stCondLst>
+                      <p:childTnLst>
+                        <p:par>
+                          <p:cTn id="12" fill="hold">
+                            <p:stCondLst>
+                              <p:cond delay="0"/>
+                            </p:stCondLst>
+                            <p:childTnLst>
+                              <p:par>
+                                <p:cTn id="13" presetID="1" presetClass="entr" presetSubtype="0" fill="hold" grpId="0" nodeType="clickEffect">
+                                  <p:stCondLst>
+                                    <p:cond delay="0"/>
+                                  </p:stCondLst>
+                                  <p:childTnLst>
+                                    <p:set>
+                                      <p:cBhvr>
+                                        <p:cTn id="14" dur="1" fill="hold">
+                                          <p:stCondLst>
+                                            <p:cond delay="0"/>
+                                          </p:stCondLst>
+                                        </p:cTn>
+                                        <p:tgtEl>
+                                          <p:spTgt spid="5">
+                                            <p:txEl>
+                                              <p:pRg st="3" end="3"/>
+                                            </p:txEl>
+                                          </p:spTgt>
+                                        </p:tgtEl>
+                                        <p:attrNameLst>
+                                          <p:attrName>style.visibility</p:attrName>
+                                        </p:attrNameLst>
+                                      </p:cBhvr>
+                                      <p:to>
+                                        <p:strVal val="visible"/>
+                                      </p:to>
+                                    </p:set>
+                                  </p:childTnLst>
+                                </p:cTn>
+                              </p:par>
+                              <p:par>
+                                <p:cTn id="15" presetID="1" presetClass="entr" presetSubtype="0" fill="hold" grpId="0" nodeType="withEffect">
+                                  <p:stCondLst>
+                                    <p:cond delay="0"/>
+                                  </p:stCondLst>
+                                  <p:childTnLst>
+                                    <p:set>
+                                      <p:cBhvr>
+                                        <p:cTn id="16" dur="1" fill="hold">
+                                          <p:stCondLst>
+                                            <p:cond delay="0"/>
+                                          </p:stCondLst>
+                                        </p:cTn>
+                                        <p:tgtEl>
+                                          <p:spTgt spid="5">
+                                            <p:txEl>
+                                              <p:pRg st="4" end="4"/>
+                                            </p:txEl>
+                                          </p:spTgt>
+                                        </p:tgtEl>
+                                        <p:attrNameLst>
+                                          <p:attrName>style.visibility</p:attrName>
+                                        </p:attrNameLst>
+                                      </p:cBhvr>
+                                      <p:to>
+                                        <p:strVal val="visible"/>
+                                      </p:to>
+                                    </p:set>
+                                  </p:childTnLst>
+                                </p:cTn>
+                              </p:par>
+                            </p:childTnLst>
+                          </p:cTn>
+                        </p:par>
+                      </p:childTnLst>
+                    </p:cTn>
+                  </p:par>
+                  <p:par>
+                    <p:cTn id="17" fill="hold">
+                      <p:stCondLst>
+                        <p:cond delay="indefinite"/>
+                      </p:stCondLst>
+                      <p:childTnLst>
+                        <p:par>
+                          <p:cTn id="18" fill="hold">
+                            <p:stCondLst>
+                              <p:cond delay="0"/>
+                            </p:stCondLst>
+                            <p:childTnLst>
+                              <p:par>
+                                <p:cTn id="19" presetID="1" presetClass="entr" presetSubtype="0" fill="hold" nodeType="clickEffect">
+                                  <p:stCondLst>
+                                    <p:cond delay="0"/>
+                                  </p:stCondLst>
+                                  <p:childTnLst>
+                                    <p:set>
+                                      <p:cBhvr>
+                                        <p:cTn id="20" dur="1" fill="hold">
+                                          <p:stCondLst>
+                                            <p:cond delay="0"/>
+                                          </p:stCondLst>
+                                        </p:cTn>
+                                        <p:tgtEl>
+                                          <p:spTgt spid="6">
+                                            <p:txEl>
+                                              <p:pRg st="0" end="0"/>
+                                            </p:txEl>
+                                          </p:spTgt>
+                                        </p:tgtEl>
+                                        <p:attrNameLst>
+                                          <p:attrName>style.visibility</p:attrName>
+                                        </p:attrNameLst>
+                                      </p:cBhvr>
+                                      <p:to>
+                                        <p:strVal val="visible"/>
+                                      </p:to>
+                                    </p:set>
+                                  </p:childTnLst>
+                                </p:cTn>
+                              </p:par>
+                            </p:childTnLst>
+                          </p:cTn>
+                        </p:par>
+                      </p:childTnLst>
+                    </p:cTn>
+                  </p:par>
+                </p:childTnLst>
+              </p:cTn>
+              <p:prevCondLst>
+                <p:cond evt="onPrev" delay="0">
+                  <p:tgtEl>
+                    <p:sldTgt/>
+                  </p:tgtEl>
+                </p:cond>
+              </p:prevCondLst>
+              <p:nextCondLst>
+                <p:cond evt="onNext" delay="0">
+                  <p:tgtEl>
+                    <p:sldTgt/>
+                  </p:tgtEl>
+                </p:cond>
+              </p:nextCondLst>
+            </p:seq>
+          </p:childTnLst>
+        </p:cTn>
       </p:par>
     </p:tnLst>
+    <p:bldLst>
+      <p:bldP spid="5" grpId="0" build="p"/>
+    </p:bldLst>
   </p:timing>
 </p:sld>
 </file>
@@ -5406,7 +5835,7 @@
           <a:p>
             <a:r>
               <a:rPr lang="en-US" dirty="0" smtClean="0"/>
-              <a:t>What was left out/added?</a:t>
+              <a:t>Defining order</a:t>
             </a:r>
             <a:endParaRPr lang="en-US" dirty="0"/>
           </a:p>
@@ -5414,7 +5843,7 @@
       </p:sp>
       <p:sp>
         <p:nvSpPr>
-          <p:cNvPr id="4" name="Content Placeholder 3"/>
+          <p:cNvPr id="3" name="Content Placeholder 2"/>
           <p:cNvSpPr>
             <a:spLocks noGrp="1"/>
           </p:cNvSpPr>
@@ -5427,16 +5856,44 @@
           <a:bodyPr/>
           <a:lstStyle/>
           <a:p>
+            <a:r>
+              <a:rPr lang="en-US" dirty="0" smtClean="0"/>
+              <a:t>Define data structure</a:t>
+            </a:r>
+          </a:p>
+          <a:p>
+            <a:endParaRPr lang="en-US" dirty="0"/>
+          </a:p>
+          <a:p>
             <a:endParaRPr lang="en-US" dirty="0" smtClean="0"/>
           </a:p>
           <a:p>
             <a:endParaRPr lang="en-US" dirty="0"/>
           </a:p>
-        </p:txBody>
-      </p:sp>
-      <p:sp>
-        <p:nvSpPr>
-          <p:cNvPr id="3" name="Slide Number Placeholder 2"/>
+          <a:p>
+            <a:r>
+              <a:rPr lang="en-US" dirty="0" smtClean="0"/>
+              <a:t>Define order relation on mass</a:t>
+            </a:r>
+          </a:p>
+          <a:p>
+            <a:endParaRPr lang="en-US" dirty="0"/>
+          </a:p>
+          <a:p>
+            <a:endParaRPr lang="en-US" dirty="0" smtClean="0"/>
+          </a:p>
+          <a:p>
+            <a:r>
+              <a:rPr lang="en-US" dirty="0" smtClean="0"/>
+              <a:t>Sort on mass</a:t>
+            </a:r>
+            <a:endParaRPr lang="en-US" dirty="0"/>
+          </a:p>
+        </p:txBody>
+      </p:sp>
+      <p:sp>
+        <p:nvSpPr>
+          <p:cNvPr id="4" name="Slide Number Placeholder 3"/>
           <p:cNvSpPr>
             <a:spLocks noGrp="1"/>
           </p:cNvSpPr>
@@ -5449,7 +5906,7 @@
           <a:bodyPr/>
           <a:lstStyle/>
           <a:p>
-            <a:fld id="{9CEF4966-5219-4577-B301-14467D565841}" type="slidenum">
+            <a:fld id="{11AD1F4E-1E51-402E-B221-310F004E7D3B}" type="slidenum">
               <a:rPr lang="en-US" smtClean="0"/>
               <a:t>5</a:t>
             </a:fld>
@@ -5457,10 +5914,375 @@
           </a:p>
         </p:txBody>
       </p:sp>
+      <p:sp>
+        <p:nvSpPr>
+          <p:cNvPr id="5" name="TextBox 4"/>
+          <p:cNvSpPr txBox="1"/>
+          <p:nvPr/>
+        </p:nvSpPr>
+        <p:spPr>
+          <a:xfrm>
+            <a:off x="628650" y="2348258"/>
+            <a:ext cx="7787986" cy="1200329"/>
+          </a:xfrm>
+          <a:prstGeom prst="rect">
+            <a:avLst/>
+          </a:prstGeom>
+          <a:solidFill>
+            <a:schemeClr val="bg1">
+              <a:lumMod val="75000"/>
+            </a:schemeClr>
+          </a:solidFill>
+          <a:ln>
+            <a:solidFill>
+              <a:schemeClr val="tx1"/>
+            </a:solidFill>
+          </a:ln>
+        </p:spPr>
+        <p:txBody>
+          <a:bodyPr wrap="square" rtlCol="0">
+            <a:spAutoFit/>
+          </a:bodyPr>
+          <a:lstStyle/>
+          <a:p>
+            <a:r>
+              <a:rPr lang="fr-FR" dirty="0" err="1">
+                <a:latin typeface="Courier New" panose="02070309020205020404" pitchFamily="49" charset="0"/>
+                <a:cs typeface="Courier New" panose="02070309020205020404" pitchFamily="49" charset="0"/>
+              </a:rPr>
+              <a:t>struct</a:t>
+            </a:r>
+            <a:r>
+              <a:rPr lang="fr-FR" dirty="0">
+                <a:latin typeface="Courier New" panose="02070309020205020404" pitchFamily="49" charset="0"/>
+                <a:cs typeface="Courier New" panose="02070309020205020404" pitchFamily="49" charset="0"/>
+              </a:rPr>
+              <a:t> </a:t>
+            </a:r>
+            <a:r>
+              <a:rPr lang="fr-FR" dirty="0" err="1">
+                <a:latin typeface="Courier New" panose="02070309020205020404" pitchFamily="49" charset="0"/>
+                <a:cs typeface="Courier New" panose="02070309020205020404" pitchFamily="49" charset="0"/>
+              </a:rPr>
+              <a:t>Particle</a:t>
+            </a:r>
+            <a:r>
+              <a:rPr lang="fr-FR" dirty="0">
+                <a:latin typeface="Courier New" panose="02070309020205020404" pitchFamily="49" charset="0"/>
+                <a:cs typeface="Courier New" panose="02070309020205020404" pitchFamily="49" charset="0"/>
+              </a:rPr>
+              <a:t> {</a:t>
+            </a:r>
+          </a:p>
+          <a:p>
+            <a:r>
+              <a:rPr lang="fr-FR" dirty="0">
+                <a:latin typeface="Courier New" panose="02070309020205020404" pitchFamily="49" charset="0"/>
+                <a:cs typeface="Courier New" panose="02070309020205020404" pitchFamily="49" charset="0"/>
+              </a:rPr>
+              <a:t>    double x, y, mass;</a:t>
+            </a:r>
+          </a:p>
+          <a:p>
+            <a:r>
+              <a:rPr lang="fr-FR" dirty="0" smtClean="0">
+                <a:latin typeface="Courier New" panose="02070309020205020404" pitchFamily="49" charset="0"/>
+                <a:cs typeface="Courier New" panose="02070309020205020404" pitchFamily="49" charset="0"/>
+              </a:rPr>
+              <a:t>};</a:t>
+            </a:r>
+          </a:p>
+          <a:p>
+            <a:r>
+              <a:rPr lang="fr-FR" dirty="0" err="1" smtClean="0">
+                <a:latin typeface="Courier New" panose="02070309020205020404" pitchFamily="49" charset="0"/>
+                <a:cs typeface="Courier New" panose="02070309020205020404" pitchFamily="49" charset="0"/>
+              </a:rPr>
+              <a:t>vector</a:t>
+            </a:r>
+            <a:r>
+              <a:rPr lang="fr-FR" dirty="0" smtClean="0">
+                <a:latin typeface="Courier New" panose="02070309020205020404" pitchFamily="49" charset="0"/>
+                <a:cs typeface="Courier New" panose="02070309020205020404" pitchFamily="49" charset="0"/>
+              </a:rPr>
+              <a:t>&lt;</a:t>
+            </a:r>
+            <a:r>
+              <a:rPr lang="fr-FR" dirty="0" err="1" smtClean="0">
+                <a:latin typeface="Courier New" panose="02070309020205020404" pitchFamily="49" charset="0"/>
+                <a:cs typeface="Courier New" panose="02070309020205020404" pitchFamily="49" charset="0"/>
+              </a:rPr>
+              <a:t>Particle</a:t>
+            </a:r>
+            <a:r>
+              <a:rPr lang="fr-FR" dirty="0" smtClean="0">
+                <a:latin typeface="Courier New" panose="02070309020205020404" pitchFamily="49" charset="0"/>
+                <a:cs typeface="Courier New" panose="02070309020205020404" pitchFamily="49" charset="0"/>
+              </a:rPr>
+              <a:t>&gt; </a:t>
+            </a:r>
+            <a:r>
+              <a:rPr lang="fr-FR" dirty="0" err="1" smtClean="0">
+                <a:latin typeface="Courier New" panose="02070309020205020404" pitchFamily="49" charset="0"/>
+                <a:cs typeface="Courier New" panose="02070309020205020404" pitchFamily="49" charset="0"/>
+              </a:rPr>
+              <a:t>particles</a:t>
+            </a:r>
+            <a:r>
+              <a:rPr lang="fr-FR" dirty="0" smtClean="0">
+                <a:latin typeface="Courier New" panose="02070309020205020404" pitchFamily="49" charset="0"/>
+                <a:cs typeface="Courier New" panose="02070309020205020404" pitchFamily="49" charset="0"/>
+              </a:rPr>
+              <a:t> = </a:t>
+            </a:r>
+            <a:r>
+              <a:rPr lang="fr-FR" dirty="0" err="1" smtClean="0">
+                <a:latin typeface="Courier New" panose="02070309020205020404" pitchFamily="49" charset="0"/>
+                <a:cs typeface="Courier New" panose="02070309020205020404" pitchFamily="49" charset="0"/>
+              </a:rPr>
+              <a:t>init_particles</a:t>
+            </a:r>
+            <a:r>
+              <a:rPr lang="fr-FR" dirty="0" smtClean="0">
+                <a:latin typeface="Courier New" panose="02070309020205020404" pitchFamily="49" charset="0"/>
+                <a:cs typeface="Courier New" panose="02070309020205020404" pitchFamily="49" charset="0"/>
+              </a:rPr>
+              <a:t>(n);</a:t>
+            </a:r>
+            <a:endParaRPr lang="fr-FR" dirty="0">
+              <a:latin typeface="Courier New" panose="02070309020205020404" pitchFamily="49" charset="0"/>
+              <a:cs typeface="Courier New" panose="02070309020205020404" pitchFamily="49" charset="0"/>
+            </a:endParaRPr>
+          </a:p>
+        </p:txBody>
+      </p:sp>
+      <p:sp>
+        <p:nvSpPr>
+          <p:cNvPr id="6" name="TextBox 5"/>
+          <p:cNvSpPr txBox="1"/>
+          <p:nvPr/>
+        </p:nvSpPr>
+        <p:spPr>
+          <a:xfrm>
+            <a:off x="628650" y="4381412"/>
+            <a:ext cx="7787986" cy="923330"/>
+          </a:xfrm>
+          <a:prstGeom prst="rect">
+            <a:avLst/>
+          </a:prstGeom>
+          <a:solidFill>
+            <a:schemeClr val="bg1">
+              <a:lumMod val="75000"/>
+            </a:schemeClr>
+          </a:solidFill>
+          <a:ln>
+            <a:solidFill>
+              <a:schemeClr val="tx1"/>
+            </a:solidFill>
+          </a:ln>
+        </p:spPr>
+        <p:txBody>
+          <a:bodyPr wrap="square" rtlCol="0">
+            <a:spAutoFit/>
+          </a:bodyPr>
+          <a:lstStyle/>
+          <a:p>
+            <a:r>
+              <a:rPr lang="fr-FR" dirty="0" err="1">
+                <a:latin typeface="Courier New" panose="02070309020205020404" pitchFamily="49" charset="0"/>
+                <a:cs typeface="Courier New" panose="02070309020205020404" pitchFamily="49" charset="0"/>
+              </a:rPr>
+              <a:t>bool</a:t>
+            </a:r>
+            <a:r>
+              <a:rPr lang="fr-FR" dirty="0">
+                <a:latin typeface="Courier New" panose="02070309020205020404" pitchFamily="49" charset="0"/>
+                <a:cs typeface="Courier New" panose="02070309020205020404" pitchFamily="49" charset="0"/>
+              </a:rPr>
+              <a:t> </a:t>
+            </a:r>
+            <a:r>
+              <a:rPr lang="fr-FR" dirty="0" err="1">
+                <a:latin typeface="Courier New" panose="02070309020205020404" pitchFamily="49" charset="0"/>
+                <a:cs typeface="Courier New" panose="02070309020205020404" pitchFamily="49" charset="0"/>
+              </a:rPr>
+              <a:t>mass_cmp</a:t>
+            </a:r>
+            <a:r>
+              <a:rPr lang="fr-FR" dirty="0">
+                <a:latin typeface="Courier New" panose="02070309020205020404" pitchFamily="49" charset="0"/>
+                <a:cs typeface="Courier New" panose="02070309020205020404" pitchFamily="49" charset="0"/>
+              </a:rPr>
+              <a:t>(</a:t>
+            </a:r>
+            <a:r>
+              <a:rPr lang="fr-FR" dirty="0" err="1">
+                <a:latin typeface="Courier New" panose="02070309020205020404" pitchFamily="49" charset="0"/>
+                <a:cs typeface="Courier New" panose="02070309020205020404" pitchFamily="49" charset="0"/>
+              </a:rPr>
+              <a:t>const</a:t>
+            </a:r>
+            <a:r>
+              <a:rPr lang="fr-FR" dirty="0">
+                <a:latin typeface="Courier New" panose="02070309020205020404" pitchFamily="49" charset="0"/>
+                <a:cs typeface="Courier New" panose="02070309020205020404" pitchFamily="49" charset="0"/>
+              </a:rPr>
+              <a:t> </a:t>
+            </a:r>
+            <a:r>
+              <a:rPr lang="fr-FR" dirty="0" err="1">
+                <a:latin typeface="Courier New" panose="02070309020205020404" pitchFamily="49" charset="0"/>
+                <a:cs typeface="Courier New" panose="02070309020205020404" pitchFamily="49" charset="0"/>
+              </a:rPr>
+              <a:t>Particle</a:t>
+            </a:r>
+            <a:r>
+              <a:rPr lang="fr-FR" dirty="0">
+                <a:latin typeface="Courier New" panose="02070309020205020404" pitchFamily="49" charset="0"/>
+                <a:cs typeface="Courier New" panose="02070309020205020404" pitchFamily="49" charset="0"/>
+              </a:rPr>
+              <a:t>&amp; p1, </a:t>
+            </a:r>
+            <a:r>
+              <a:rPr lang="fr-FR" dirty="0" err="1">
+                <a:latin typeface="Courier New" panose="02070309020205020404" pitchFamily="49" charset="0"/>
+                <a:cs typeface="Courier New" panose="02070309020205020404" pitchFamily="49" charset="0"/>
+              </a:rPr>
+              <a:t>const</a:t>
+            </a:r>
+            <a:r>
+              <a:rPr lang="fr-FR" dirty="0">
+                <a:latin typeface="Courier New" panose="02070309020205020404" pitchFamily="49" charset="0"/>
+                <a:cs typeface="Courier New" panose="02070309020205020404" pitchFamily="49" charset="0"/>
+              </a:rPr>
+              <a:t> </a:t>
+            </a:r>
+            <a:r>
+              <a:rPr lang="fr-FR" dirty="0" err="1">
+                <a:latin typeface="Courier New" panose="02070309020205020404" pitchFamily="49" charset="0"/>
+                <a:cs typeface="Courier New" panose="02070309020205020404" pitchFamily="49" charset="0"/>
+              </a:rPr>
+              <a:t>Particle</a:t>
+            </a:r>
+            <a:r>
+              <a:rPr lang="fr-FR" dirty="0">
+                <a:latin typeface="Courier New" panose="02070309020205020404" pitchFamily="49" charset="0"/>
+                <a:cs typeface="Courier New" panose="02070309020205020404" pitchFamily="49" charset="0"/>
+              </a:rPr>
+              <a:t>&amp; p2) {</a:t>
+            </a:r>
+          </a:p>
+          <a:p>
+            <a:r>
+              <a:rPr lang="fr-FR" dirty="0">
+                <a:latin typeface="Courier New" panose="02070309020205020404" pitchFamily="49" charset="0"/>
+                <a:cs typeface="Courier New" panose="02070309020205020404" pitchFamily="49" charset="0"/>
+              </a:rPr>
+              <a:t>    return p1.mass &lt; p2.mass;</a:t>
+            </a:r>
+          </a:p>
+          <a:p>
+            <a:r>
+              <a:rPr lang="fr-FR" dirty="0">
+                <a:latin typeface="Courier New" panose="02070309020205020404" pitchFamily="49" charset="0"/>
+                <a:cs typeface="Courier New" panose="02070309020205020404" pitchFamily="49" charset="0"/>
+              </a:rPr>
+              <a:t>}</a:t>
+            </a:r>
+          </a:p>
+        </p:txBody>
+      </p:sp>
+      <p:sp>
+        <p:nvSpPr>
+          <p:cNvPr id="7" name="TextBox 6"/>
+          <p:cNvSpPr txBox="1"/>
+          <p:nvPr/>
+        </p:nvSpPr>
+        <p:spPr>
+          <a:xfrm>
+            <a:off x="628650" y="5850234"/>
+            <a:ext cx="7787986" cy="369332"/>
+          </a:xfrm>
+          <a:prstGeom prst="rect">
+            <a:avLst/>
+          </a:prstGeom>
+          <a:solidFill>
+            <a:schemeClr val="bg1">
+              <a:lumMod val="75000"/>
+            </a:schemeClr>
+          </a:solidFill>
+          <a:ln>
+            <a:solidFill>
+              <a:schemeClr val="tx1"/>
+            </a:solidFill>
+          </a:ln>
+        </p:spPr>
+        <p:txBody>
+          <a:bodyPr wrap="square" rtlCol="0">
+            <a:spAutoFit/>
+          </a:bodyPr>
+          <a:lstStyle/>
+          <a:p>
+            <a:r>
+              <a:rPr lang="fr-FR" dirty="0" smtClean="0">
+                <a:latin typeface="Courier New" panose="02070309020205020404" pitchFamily="49" charset="0"/>
+                <a:cs typeface="Courier New" panose="02070309020205020404" pitchFamily="49" charset="0"/>
+              </a:rPr>
+              <a:t>sort(</a:t>
+            </a:r>
+            <a:r>
+              <a:rPr lang="fr-FR" dirty="0" err="1" smtClean="0">
+                <a:latin typeface="Courier New" panose="02070309020205020404" pitchFamily="49" charset="0"/>
+                <a:cs typeface="Courier New" panose="02070309020205020404" pitchFamily="49" charset="0"/>
+              </a:rPr>
+              <a:t>particles.begin</a:t>
+            </a:r>
+            <a:r>
+              <a:rPr lang="fr-FR" dirty="0">
+                <a:latin typeface="Courier New" panose="02070309020205020404" pitchFamily="49" charset="0"/>
+                <a:cs typeface="Courier New" panose="02070309020205020404" pitchFamily="49" charset="0"/>
+              </a:rPr>
+              <a:t>(), </a:t>
+            </a:r>
+            <a:r>
+              <a:rPr lang="fr-FR" dirty="0" err="1">
+                <a:latin typeface="Courier New" panose="02070309020205020404" pitchFamily="49" charset="0"/>
+                <a:cs typeface="Courier New" panose="02070309020205020404" pitchFamily="49" charset="0"/>
+              </a:rPr>
+              <a:t>particles.end</a:t>
+            </a:r>
+            <a:r>
+              <a:rPr lang="fr-FR" dirty="0">
+                <a:latin typeface="Courier New" panose="02070309020205020404" pitchFamily="49" charset="0"/>
+                <a:cs typeface="Courier New" panose="02070309020205020404" pitchFamily="49" charset="0"/>
+              </a:rPr>
+              <a:t>(), </a:t>
+            </a:r>
+            <a:r>
+              <a:rPr lang="fr-FR" dirty="0" err="1">
+                <a:latin typeface="Courier New" panose="02070309020205020404" pitchFamily="49" charset="0"/>
+                <a:cs typeface="Courier New" panose="02070309020205020404" pitchFamily="49" charset="0"/>
+              </a:rPr>
+              <a:t>mass_cmp</a:t>
+            </a:r>
+            <a:r>
+              <a:rPr lang="fr-FR" dirty="0" smtClean="0">
+                <a:latin typeface="Courier New" panose="02070309020205020404" pitchFamily="49" charset="0"/>
+                <a:cs typeface="Courier New" panose="02070309020205020404" pitchFamily="49" charset="0"/>
+              </a:rPr>
+              <a:t>);</a:t>
+            </a:r>
+            <a:endParaRPr lang="fr-FR" dirty="0">
+              <a:latin typeface="Courier New" panose="02070309020205020404" pitchFamily="49" charset="0"/>
+              <a:cs typeface="Courier New" panose="02070309020205020404" pitchFamily="49" charset="0"/>
+            </a:endParaRPr>
+          </a:p>
+        </p:txBody>
+      </p:sp>
     </p:spTree>
     <p:extLst>
       <p:ext uri="{BB962C8B-B14F-4D97-AF65-F5344CB8AC3E}">
-        <p14:creationId xmlns:p14="http://schemas.microsoft.com/office/powerpoint/2010/main" val="3233369179"/>
+        <p14:creationId xmlns:p14="http://schemas.microsoft.com/office/powerpoint/2010/main" val="614233588"/>
       </p:ext>
     </p:extLst>
   </p:cSld>
@@ -5470,9 +6292,278 @@
   <p:timing>
     <p:tnLst>
       <p:par>
-        <p:cTn id="1" dur="indefinite" restart="never" nodeType="tmRoot"/>
+        <p:cTn id="1" dur="indefinite" restart="never" nodeType="tmRoot">
+          <p:childTnLst>
+            <p:seq concurrent="1" nextAc="seek">
+              <p:cTn id="2" dur="indefinite" nodeType="mainSeq">
+                <p:childTnLst>
+                  <p:par>
+                    <p:cTn id="3" fill="hold">
+                      <p:stCondLst>
+                        <p:cond delay="indefinite"/>
+                        <p:cond evt="onBegin" delay="0">
+                          <p:tn val="2"/>
+                        </p:cond>
+                      </p:stCondLst>
+                      <p:childTnLst>
+                        <p:par>
+                          <p:cTn id="4" fill="hold">
+                            <p:stCondLst>
+                              <p:cond delay="0"/>
+                            </p:stCondLst>
+                            <p:childTnLst>
+                              <p:par>
+                                <p:cTn id="5" presetID="1" presetClass="entr" presetSubtype="0" fill="hold" grpId="0" nodeType="withEffect">
+                                  <p:stCondLst>
+                                    <p:cond delay="0"/>
+                                  </p:stCondLst>
+                                  <p:childTnLst>
+                                    <p:set>
+                                      <p:cBhvr>
+                                        <p:cTn id="6" dur="1" fill="hold">
+                                          <p:stCondLst>
+                                            <p:cond delay="0"/>
+                                          </p:stCondLst>
+                                        </p:cTn>
+                                        <p:tgtEl>
+                                          <p:spTgt spid="3">
+                                            <p:txEl>
+                                              <p:pRg st="0" end="0"/>
+                                            </p:txEl>
+                                          </p:spTgt>
+                                        </p:tgtEl>
+                                        <p:attrNameLst>
+                                          <p:attrName>style.visibility</p:attrName>
+                                        </p:attrNameLst>
+                                      </p:cBhvr>
+                                      <p:to>
+                                        <p:strVal val="visible"/>
+                                      </p:to>
+                                    </p:set>
+                                  </p:childTnLst>
+                                </p:cTn>
+                              </p:par>
+                            </p:childTnLst>
+                          </p:cTn>
+                        </p:par>
+                        <p:par>
+                          <p:cTn id="7" fill="hold">
+                            <p:stCondLst>
+                              <p:cond delay="0"/>
+                            </p:stCondLst>
+                            <p:childTnLst>
+                              <p:par>
+                                <p:cTn id="8" presetID="1" presetClass="entr" presetSubtype="0" fill="hold" grpId="0" nodeType="afterEffect">
+                                  <p:stCondLst>
+                                    <p:cond delay="0"/>
+                                  </p:stCondLst>
+                                  <p:childTnLst>
+                                    <p:set>
+                                      <p:cBhvr>
+                                        <p:cTn id="9" dur="1" fill="hold">
+                                          <p:stCondLst>
+                                            <p:cond delay="0"/>
+                                          </p:stCondLst>
+                                        </p:cTn>
+                                        <p:tgtEl>
+                                          <p:spTgt spid="5"/>
+                                        </p:tgtEl>
+                                        <p:attrNameLst>
+                                          <p:attrName>style.visibility</p:attrName>
+                                        </p:attrNameLst>
+                                      </p:cBhvr>
+                                      <p:to>
+                                        <p:strVal val="visible"/>
+                                      </p:to>
+                                    </p:set>
+                                  </p:childTnLst>
+                                </p:cTn>
+                              </p:par>
+                            </p:childTnLst>
+                          </p:cTn>
+                        </p:par>
+                      </p:childTnLst>
+                    </p:cTn>
+                  </p:par>
+                  <p:par>
+                    <p:cTn id="10" fill="hold">
+                      <p:stCondLst>
+                        <p:cond delay="indefinite"/>
+                      </p:stCondLst>
+                      <p:childTnLst>
+                        <p:par>
+                          <p:cTn id="11" fill="hold">
+                            <p:stCondLst>
+                              <p:cond delay="0"/>
+                            </p:stCondLst>
+                            <p:childTnLst>
+                              <p:par>
+                                <p:cTn id="12" presetID="1" presetClass="entr" presetSubtype="0" fill="hold" grpId="0" nodeType="clickEffect">
+                                  <p:stCondLst>
+                                    <p:cond delay="0"/>
+                                  </p:stCondLst>
+                                  <p:childTnLst>
+                                    <p:set>
+                                      <p:cBhvr>
+                                        <p:cTn id="13" dur="1" fill="hold">
+                                          <p:stCondLst>
+                                            <p:cond delay="0"/>
+                                          </p:stCondLst>
+                                        </p:cTn>
+                                        <p:tgtEl>
+                                          <p:spTgt spid="3">
+                                            <p:txEl>
+                                              <p:pRg st="4" end="4"/>
+                                            </p:txEl>
+                                          </p:spTgt>
+                                        </p:tgtEl>
+                                        <p:attrNameLst>
+                                          <p:attrName>style.visibility</p:attrName>
+                                        </p:attrNameLst>
+                                      </p:cBhvr>
+                                      <p:to>
+                                        <p:strVal val="visible"/>
+                                      </p:to>
+                                    </p:set>
+                                  </p:childTnLst>
+                                </p:cTn>
+                              </p:par>
+                              <p:par>
+                                <p:cTn id="14" presetID="1" presetClass="entr" presetSubtype="0" fill="hold" grpId="0" nodeType="withEffect">
+                                  <p:stCondLst>
+                                    <p:cond delay="0"/>
+                                  </p:stCondLst>
+                                  <p:childTnLst>
+                                    <p:set>
+                                      <p:cBhvr>
+                                        <p:cTn id="15" dur="1" fill="hold">
+                                          <p:stCondLst>
+                                            <p:cond delay="0"/>
+                                          </p:stCondLst>
+                                        </p:cTn>
+                                        <p:tgtEl>
+                                          <p:spTgt spid="6"/>
+                                        </p:tgtEl>
+                                        <p:attrNameLst>
+                                          <p:attrName>style.visibility</p:attrName>
+                                        </p:attrNameLst>
+                                      </p:cBhvr>
+                                      <p:to>
+                                        <p:strVal val="visible"/>
+                                      </p:to>
+                                    </p:set>
+                                  </p:childTnLst>
+                                </p:cTn>
+                              </p:par>
+                            </p:childTnLst>
+                          </p:cTn>
+                        </p:par>
+                      </p:childTnLst>
+                    </p:cTn>
+                  </p:par>
+                  <p:par>
+                    <p:cTn id="16" fill="hold">
+                      <p:stCondLst>
+                        <p:cond delay="indefinite"/>
+                      </p:stCondLst>
+                      <p:childTnLst>
+                        <p:par>
+                          <p:cTn id="17" fill="hold">
+                            <p:stCondLst>
+                              <p:cond delay="0"/>
+                            </p:stCondLst>
+                            <p:childTnLst>
+                              <p:par>
+                                <p:cTn id="18" presetID="1" presetClass="entr" presetSubtype="0" fill="hold" grpId="0" nodeType="clickEffect">
+                                  <p:stCondLst>
+                                    <p:cond delay="0"/>
+                                  </p:stCondLst>
+                                  <p:childTnLst>
+                                    <p:set>
+                                      <p:cBhvr>
+                                        <p:cTn id="19" dur="1" fill="hold">
+                                          <p:stCondLst>
+                                            <p:cond delay="0"/>
+                                          </p:stCondLst>
+                                        </p:cTn>
+                                        <p:tgtEl>
+                                          <p:spTgt spid="3">
+                                            <p:txEl>
+                                              <p:pRg st="7" end="7"/>
+                                            </p:txEl>
+                                          </p:spTgt>
+                                        </p:tgtEl>
+                                        <p:attrNameLst>
+                                          <p:attrName>style.visibility</p:attrName>
+                                        </p:attrNameLst>
+                                      </p:cBhvr>
+                                      <p:to>
+                                        <p:strVal val="visible"/>
+                                      </p:to>
+                                    </p:set>
+                                  </p:childTnLst>
+                                </p:cTn>
+                              </p:par>
+                              <p:par>
+                                <p:cTn id="20" presetID="1" presetClass="entr" presetSubtype="0" fill="hold" grpId="0" nodeType="withEffect">
+                                  <p:stCondLst>
+                                    <p:cond delay="0"/>
+                                  </p:stCondLst>
+                                  <p:childTnLst>
+                                    <p:set>
+                                      <p:cBhvr>
+                                        <p:cTn id="21" dur="1" fill="hold">
+                                          <p:stCondLst>
+                                            <p:cond delay="0"/>
+                                          </p:stCondLst>
+                                        </p:cTn>
+                                        <p:tgtEl>
+                                          <p:spTgt spid="7"/>
+                                        </p:tgtEl>
+                                        <p:attrNameLst>
+                                          <p:attrName>style.visibility</p:attrName>
+                                        </p:attrNameLst>
+                                      </p:cBhvr>
+                                      <p:to>
+                                        <p:strVal val="visible"/>
+                                      </p:to>
+                                    </p:set>
+                                  </p:childTnLst>
+                                </p:cTn>
+                              </p:par>
+                            </p:childTnLst>
+                          </p:cTn>
+                        </p:par>
+                      </p:childTnLst>
+                    </p:cTn>
+                  </p:par>
+                </p:childTnLst>
+              </p:cTn>
+              <p:prevCondLst>
+                <p:cond evt="onPrev" delay="0">
+                  <p:tgtEl>
+                    <p:sldTgt/>
+                  </p:tgtEl>
+                </p:cond>
+              </p:prevCondLst>
+              <p:nextCondLst>
+                <p:cond evt="onNext" delay="0">
+                  <p:tgtEl>
+                    <p:sldTgt/>
+                  </p:tgtEl>
+                </p:cond>
+              </p:nextCondLst>
+            </p:seq>
+          </p:childTnLst>
+        </p:cTn>
       </p:par>
     </p:tnLst>
+    <p:bldLst>
+      <p:bldP spid="3" grpId="0" uiExpand="1" build="p"/>
+      <p:bldP spid="5" grpId="0" animBg="1"/>
+      <p:bldP spid="6" grpId="0" animBg="1"/>
+      <p:bldP spid="7" grpId="0" animBg="1"/>
+    </p:bldLst>
   </p:timing>
 </p:sld>
 </file>
@@ -5511,6 +6602,213 @@
           <a:p>
             <a:r>
               <a:rPr lang="en-US" dirty="0" smtClean="0"/>
+              <a:t>Finding things</a:t>
+            </a:r>
+            <a:endParaRPr lang="en-US" dirty="0"/>
+          </a:p>
+        </p:txBody>
+      </p:sp>
+      <p:sp>
+        <p:nvSpPr>
+          <p:cNvPr id="3" name="Content Placeholder 2"/>
+          <p:cNvSpPr>
+            <a:spLocks noGrp="1"/>
+          </p:cNvSpPr>
+          <p:nvPr>
+            <p:ph idx="1"/>
+          </p:nvPr>
+        </p:nvSpPr>
+        <p:spPr/>
+        <p:txBody>
+          <a:bodyPr/>
+          <a:lstStyle/>
+          <a:p>
+            <a:endParaRPr lang="en-US" dirty="0"/>
+          </a:p>
+        </p:txBody>
+      </p:sp>
+      <p:sp>
+        <p:nvSpPr>
+          <p:cNvPr id="4" name="Slide Number Placeholder 3"/>
+          <p:cNvSpPr>
+            <a:spLocks noGrp="1"/>
+          </p:cNvSpPr>
+          <p:nvPr>
+            <p:ph type="sldNum" sz="quarter" idx="12"/>
+          </p:nvPr>
+        </p:nvSpPr>
+        <p:spPr/>
+        <p:txBody>
+          <a:bodyPr/>
+          <a:lstStyle/>
+          <a:p>
+            <a:fld id="{11AD1F4E-1E51-402E-B221-310F004E7D3B}" type="slidenum">
+              <a:rPr lang="en-US" smtClean="0"/>
+              <a:t>6</a:t>
+            </a:fld>
+            <a:endParaRPr lang="en-US"/>
+          </a:p>
+        </p:txBody>
+      </p:sp>
+    </p:spTree>
+    <p:extLst>
+      <p:ext uri="{BB962C8B-B14F-4D97-AF65-F5344CB8AC3E}">
+        <p14:creationId xmlns:p14="http://schemas.microsoft.com/office/powerpoint/2010/main" val="1770642138"/>
+      </p:ext>
+    </p:extLst>
+  </p:cSld>
+  <p:clrMapOvr>
+    <a:masterClrMapping/>
+  </p:clrMapOvr>
+  <p:timing>
+    <p:tnLst>
+      <p:par>
+        <p:cTn id="1" dur="indefinite" restart="never" nodeType="tmRoot"/>
+      </p:par>
+    </p:tnLst>
+  </p:timing>
+</p:sld>
+</file>
+
+<file path=ppt/slides/slide7.xml><?xml version="1.0" encoding="utf-8"?>
+<p:sld xmlns:a="http://schemas.openxmlformats.org/drawingml/2006/main" xmlns:r="http://schemas.openxmlformats.org/officeDocument/2006/relationships" xmlns:p="http://schemas.openxmlformats.org/presentationml/2006/main">
+  <p:cSld>
+    <p:spTree>
+      <p:nvGrpSpPr>
+        <p:cNvPr id="1" name=""/>
+        <p:cNvGrpSpPr/>
+        <p:nvPr/>
+      </p:nvGrpSpPr>
+      <p:grpSpPr>
+        <a:xfrm>
+          <a:off x="0" y="0"/>
+          <a:ext cx="0" cy="0"/>
+          <a:chOff x="0" y="0"/>
+          <a:chExt cx="0" cy="0"/>
+        </a:xfrm>
+      </p:grpSpPr>
+      <p:sp>
+        <p:nvSpPr>
+          <p:cNvPr id="2" name="Title 1"/>
+          <p:cNvSpPr>
+            <a:spLocks noGrp="1"/>
+          </p:cNvSpPr>
+          <p:nvPr>
+            <p:ph type="title"/>
+          </p:nvPr>
+        </p:nvSpPr>
+        <p:spPr/>
+        <p:txBody>
+          <a:bodyPr/>
+          <a:lstStyle/>
+          <a:p>
+            <a:r>
+              <a:rPr lang="en-US" dirty="0" smtClean="0"/>
+              <a:t>What was left out/added?</a:t>
+            </a:r>
+            <a:endParaRPr lang="en-US" dirty="0"/>
+          </a:p>
+        </p:txBody>
+      </p:sp>
+      <p:sp>
+        <p:nvSpPr>
+          <p:cNvPr id="4" name="Content Placeholder 3"/>
+          <p:cNvSpPr>
+            <a:spLocks noGrp="1"/>
+          </p:cNvSpPr>
+          <p:nvPr>
+            <p:ph idx="1"/>
+          </p:nvPr>
+        </p:nvSpPr>
+        <p:spPr/>
+        <p:txBody>
+          <a:bodyPr/>
+          <a:lstStyle/>
+          <a:p>
+            <a:endParaRPr lang="en-US" dirty="0" smtClean="0"/>
+          </a:p>
+          <a:p>
+            <a:endParaRPr lang="en-US" dirty="0"/>
+          </a:p>
+        </p:txBody>
+      </p:sp>
+      <p:sp>
+        <p:nvSpPr>
+          <p:cNvPr id="3" name="Slide Number Placeholder 2"/>
+          <p:cNvSpPr>
+            <a:spLocks noGrp="1"/>
+          </p:cNvSpPr>
+          <p:nvPr>
+            <p:ph type="sldNum" sz="quarter" idx="12"/>
+          </p:nvPr>
+        </p:nvSpPr>
+        <p:spPr/>
+        <p:txBody>
+          <a:bodyPr/>
+          <a:lstStyle/>
+          <a:p>
+            <a:fld id="{9CEF4966-5219-4577-B301-14467D565841}" type="slidenum">
+              <a:rPr lang="en-US" smtClean="0"/>
+              <a:t>7</a:t>
+            </a:fld>
+            <a:endParaRPr lang="en-US"/>
+          </a:p>
+        </p:txBody>
+      </p:sp>
+    </p:spTree>
+    <p:extLst>
+      <p:ext uri="{BB962C8B-B14F-4D97-AF65-F5344CB8AC3E}">
+        <p14:creationId xmlns:p14="http://schemas.microsoft.com/office/powerpoint/2010/main" val="3233369179"/>
+      </p:ext>
+    </p:extLst>
+  </p:cSld>
+  <p:clrMapOvr>
+    <a:masterClrMapping/>
+  </p:clrMapOvr>
+  <p:timing>
+    <p:tnLst>
+      <p:par>
+        <p:cTn id="1" dur="indefinite" restart="never" nodeType="tmRoot"/>
+      </p:par>
+    </p:tnLst>
+  </p:timing>
+</p:sld>
+</file>
+
+<file path=ppt/slides/slide8.xml><?xml version="1.0" encoding="utf-8"?>
+<p:sld xmlns:a="http://schemas.openxmlformats.org/drawingml/2006/main" xmlns:r="http://schemas.openxmlformats.org/officeDocument/2006/relationships" xmlns:p="http://schemas.openxmlformats.org/presentationml/2006/main">
+  <p:cSld>
+    <p:spTree>
+      <p:nvGrpSpPr>
+        <p:cNvPr id="1" name=""/>
+        <p:cNvGrpSpPr/>
+        <p:nvPr/>
+      </p:nvGrpSpPr>
+      <p:grpSpPr>
+        <a:xfrm>
+          <a:off x="0" y="0"/>
+          <a:ext cx="0" cy="0"/>
+          <a:chOff x="0" y="0"/>
+          <a:chExt cx="0" cy="0"/>
+        </a:xfrm>
+      </p:grpSpPr>
+      <p:sp>
+        <p:nvSpPr>
+          <p:cNvPr id="2" name="Title 1"/>
+          <p:cNvSpPr>
+            <a:spLocks noGrp="1"/>
+          </p:cNvSpPr>
+          <p:nvPr>
+            <p:ph type="title"/>
+          </p:nvPr>
+        </p:nvSpPr>
+        <p:spPr/>
+        <p:txBody>
+          <a:bodyPr/>
+          <a:lstStyle/>
+          <a:p>
+            <a:r>
+              <a:rPr lang="en-US" dirty="0" smtClean="0"/>
               <a:t>References</a:t>
             </a:r>
             <a:endParaRPr lang="en-US" dirty="0"/>
@@ -5624,7 +6922,7 @@
           <a:p>
             <a:fld id="{11AD1F4E-1E51-402E-B221-310F004E7D3B}" type="slidenum">
               <a:rPr lang="en-US" smtClean="0"/>
-              <a:t>6</a:t>
+              <a:t>8</a:t>
             </a:fld>
             <a:endParaRPr lang="en-US"/>
           </a:p>

</xml_diff>

<commit_message>
Added examples of tranformations; more algorithms
</commit_message>
<xml_diff>
--- a/CPlusPlus/10_essential_algorithms.pptx
+++ b/CPlusPlus/10_essential_algorithms.pptx
@@ -5,7 +5,7 @@
     <p:sldMasterId id="2147483660" r:id="rId1"/>
   </p:sldMasterIdLst>
   <p:notesMasterIdLst>
-    <p:notesMasterId r:id="rId10"/>
+    <p:notesMasterId r:id="rId12"/>
   </p:notesMasterIdLst>
   <p:sldIdLst>
     <p:sldId id="302" r:id="rId2"/>
@@ -14,8 +14,10 @@
     <p:sldId id="314" r:id="rId5"/>
     <p:sldId id="315" r:id="rId6"/>
     <p:sldId id="316" r:id="rId7"/>
-    <p:sldId id="313" r:id="rId8"/>
-    <p:sldId id="300" r:id="rId9"/>
+    <p:sldId id="317" r:id="rId8"/>
+    <p:sldId id="318" r:id="rId9"/>
+    <p:sldId id="313" r:id="rId10"/>
+    <p:sldId id="300" r:id="rId11"/>
   </p:sldIdLst>
   <p:sldSz cx="9144000" cy="6858000" type="screen4x3"/>
   <p:notesSz cx="6858000" cy="9144000"/>
@@ -204,7 +206,7 @@
           <a:p>
             <a:fld id="{D3AF4CC3-573B-48A2-BA19-C88E9EEB8008}" type="datetimeFigureOut">
               <a:rPr lang="en-US" smtClean="0"/>
-              <a:t>2017-04-09</a:t>
+              <a:t>2017-04-10</a:t>
             </a:fld>
             <a:endParaRPr lang="en-US"/>
           </a:p>
@@ -603,7 +605,7 @@
           <a:p>
             <a:fld id="{E7395A51-B5B5-44D7-85E1-1556CCB9180F}" type="datetime1">
               <a:rPr lang="en-US" smtClean="0"/>
-              <a:t>2017-04-09</a:t>
+              <a:t>2017-04-10</a:t>
             </a:fld>
             <a:endParaRPr lang="en-US"/>
           </a:p>
@@ -773,7 +775,7 @@
           <a:p>
             <a:fld id="{BEDB066D-DA80-4992-B507-A911EFD1878C}" type="datetime1">
               <a:rPr lang="en-US" smtClean="0"/>
-              <a:t>2017-04-09</a:t>
+              <a:t>2017-04-10</a:t>
             </a:fld>
             <a:endParaRPr lang="en-US"/>
           </a:p>
@@ -953,7 +955,7 @@
           <a:p>
             <a:fld id="{21259CBD-682A-4ABE-AFE9-CACFF55FE875}" type="datetime1">
               <a:rPr lang="en-US" smtClean="0"/>
-              <a:t>2017-04-09</a:t>
+              <a:t>2017-04-10</a:t>
             </a:fld>
             <a:endParaRPr lang="en-US"/>
           </a:p>
@@ -1123,7 +1125,7 @@
           <a:p>
             <a:fld id="{5F76F78E-A200-421E-B0AA-A6018E81E55E}" type="datetime1">
               <a:rPr lang="en-US" smtClean="0"/>
-              <a:t>2017-04-09</a:t>
+              <a:t>2017-04-10</a:t>
             </a:fld>
             <a:endParaRPr lang="en-US"/>
           </a:p>
@@ -1367,7 +1369,7 @@
           <a:p>
             <a:fld id="{EBEC21EE-ED62-44E3-A586-FF0104F19B99}" type="datetime1">
               <a:rPr lang="en-US" smtClean="0"/>
-              <a:t>2017-04-09</a:t>
+              <a:t>2017-04-10</a:t>
             </a:fld>
             <a:endParaRPr lang="en-US"/>
           </a:p>
@@ -1599,7 +1601,7 @@
           <a:p>
             <a:fld id="{30049BC0-4C66-4CED-BC8E-7AF0BD49C9B5}" type="datetime1">
               <a:rPr lang="en-US" smtClean="0"/>
-              <a:t>2017-04-09</a:t>
+              <a:t>2017-04-10</a:t>
             </a:fld>
             <a:endParaRPr lang="en-US"/>
           </a:p>
@@ -1966,7 +1968,7 @@
           <a:p>
             <a:fld id="{C7C90E0A-53F1-4115-8AB2-2E28E481FF48}" type="datetime1">
               <a:rPr lang="en-US" smtClean="0"/>
-              <a:t>2017-04-09</a:t>
+              <a:t>2017-04-10</a:t>
             </a:fld>
             <a:endParaRPr lang="en-US"/>
           </a:p>
@@ -2084,7 +2086,7 @@
           <a:p>
             <a:fld id="{AF79CAB3-789B-4117-A859-FC7082686441}" type="datetime1">
               <a:rPr lang="en-US" smtClean="0"/>
-              <a:t>2017-04-09</a:t>
+              <a:t>2017-04-10</a:t>
             </a:fld>
             <a:endParaRPr lang="en-US"/>
           </a:p>
@@ -2179,7 +2181,7 @@
           <a:p>
             <a:fld id="{82AE2AC5-51ED-46C8-8F1B-788630EE802E}" type="datetime1">
               <a:rPr lang="en-US" smtClean="0"/>
-              <a:t>2017-04-09</a:t>
+              <a:t>2017-04-10</a:t>
             </a:fld>
             <a:endParaRPr lang="en-US"/>
           </a:p>
@@ -2456,7 +2458,7 @@
           <a:p>
             <a:fld id="{49D0F6DD-6796-44CA-AF4C-1B2A2288F444}" type="datetime1">
               <a:rPr lang="en-US" smtClean="0"/>
-              <a:t>2017-04-09</a:t>
+              <a:t>2017-04-10</a:t>
             </a:fld>
             <a:endParaRPr lang="en-US"/>
           </a:p>
@@ -2713,7 +2715,7 @@
           <a:p>
             <a:fld id="{57F6808E-F05D-421A-97B7-12B728993E3B}" type="datetime1">
               <a:rPr lang="en-US" smtClean="0"/>
-              <a:t>2017-04-09</a:t>
+              <a:t>2017-04-10</a:t>
             </a:fld>
             <a:endParaRPr lang="en-US"/>
           </a:p>
@@ -2926,7 +2928,7 @@
           <a:p>
             <a:fld id="{7B995810-2FB7-4DE8-B622-97729F9C53CB}" type="datetime1">
               <a:rPr lang="en-US" smtClean="0"/>
-              <a:t>2017-04-09</a:t>
+              <a:t>2017-04-10</a:t>
             </a:fld>
             <a:endParaRPr lang="en-US"/>
           </a:p>
@@ -3494,6 +3496,179 @@
 </p:sld>
 </file>
 
+<file path=ppt/slides/slide10.xml><?xml version="1.0" encoding="utf-8"?>
+<p:sld xmlns:a="http://schemas.openxmlformats.org/drawingml/2006/main" xmlns:r="http://schemas.openxmlformats.org/officeDocument/2006/relationships" xmlns:p="http://schemas.openxmlformats.org/presentationml/2006/main">
+  <p:cSld>
+    <p:spTree>
+      <p:nvGrpSpPr>
+        <p:cNvPr id="1" name=""/>
+        <p:cNvGrpSpPr/>
+        <p:nvPr/>
+      </p:nvGrpSpPr>
+      <p:grpSpPr>
+        <a:xfrm>
+          <a:off x="0" y="0"/>
+          <a:ext cx="0" cy="0"/>
+          <a:chOff x="0" y="0"/>
+          <a:chExt cx="0" cy="0"/>
+        </a:xfrm>
+      </p:grpSpPr>
+      <p:sp>
+        <p:nvSpPr>
+          <p:cNvPr id="2" name="Title 1"/>
+          <p:cNvSpPr>
+            <a:spLocks noGrp="1"/>
+          </p:cNvSpPr>
+          <p:nvPr>
+            <p:ph type="title"/>
+          </p:nvPr>
+        </p:nvSpPr>
+        <p:spPr/>
+        <p:txBody>
+          <a:bodyPr/>
+          <a:lstStyle/>
+          <a:p>
+            <a:r>
+              <a:rPr lang="en-US" dirty="0" smtClean="0"/>
+              <a:t>References</a:t>
+            </a:r>
+            <a:endParaRPr lang="en-US" dirty="0"/>
+          </a:p>
+        </p:txBody>
+      </p:sp>
+      <p:sp>
+        <p:nvSpPr>
+          <p:cNvPr id="3" name="Content Placeholder 2"/>
+          <p:cNvSpPr>
+            <a:spLocks noGrp="1"/>
+          </p:cNvSpPr>
+          <p:nvPr>
+            <p:ph idx="1"/>
+          </p:nvPr>
+        </p:nvSpPr>
+        <p:spPr/>
+        <p:txBody>
+          <a:bodyPr>
+            <a:normAutofit/>
+          </a:bodyPr>
+          <a:lstStyle/>
+          <a:p>
+            <a:r>
+              <a:rPr lang="en-US" dirty="0"/>
+              <a:t>Introduction to </a:t>
+            </a:r>
+            <a:r>
+              <a:rPr lang="en-US" dirty="0" smtClean="0"/>
+              <a:t>algorithms</a:t>
+            </a:r>
+            <a:br>
+              <a:rPr lang="en-US" dirty="0" smtClean="0"/>
+            </a:br>
+            <a:r>
+              <a:rPr lang="en-US" dirty="0" smtClean="0"/>
+              <a:t>Thomas </a:t>
+            </a:r>
+            <a:r>
+              <a:rPr lang="en-US" dirty="0"/>
+              <a:t>H. </a:t>
+            </a:r>
+            <a:r>
+              <a:rPr lang="en-US" dirty="0" err="1"/>
+              <a:t>Cromen</a:t>
+            </a:r>
+            <a:r>
+              <a:rPr lang="en-US" dirty="0"/>
+              <a:t>, Charles E. </a:t>
+            </a:r>
+            <a:r>
+              <a:rPr lang="en-US" dirty="0" err="1"/>
+              <a:t>Leiserson</a:t>
+            </a:r>
+            <a:r>
+              <a:rPr lang="en-US" dirty="0"/>
+              <a:t>, Ronald L. </a:t>
+            </a:r>
+            <a:r>
+              <a:rPr lang="en-US" dirty="0" err="1" smtClean="0"/>
+              <a:t>Rivest</a:t>
+            </a:r>
+            <a:r>
+              <a:rPr lang="en-US" dirty="0"/>
+              <a:t> </a:t>
+            </a:r>
+            <a:r>
+              <a:rPr lang="en-US" dirty="0" smtClean="0"/>
+              <a:t>and </a:t>
+            </a:r>
+            <a:r>
+              <a:rPr lang="en-US" dirty="0"/>
+              <a:t>Clifford </a:t>
+            </a:r>
+            <a:r>
+              <a:rPr lang="en-US" dirty="0" smtClean="0"/>
+              <a:t>Stein</a:t>
+            </a:r>
+            <a:br>
+              <a:rPr lang="en-US" dirty="0" smtClean="0"/>
+            </a:br>
+            <a:r>
+              <a:rPr lang="en-US" dirty="0" smtClean="0"/>
+              <a:t>MIT </a:t>
+            </a:r>
+            <a:r>
+              <a:rPr lang="en-US" dirty="0"/>
+              <a:t>Press, 2009 (3rd edition</a:t>
+            </a:r>
+            <a:r>
+              <a:rPr lang="en-US" dirty="0" smtClean="0"/>
+              <a:t>)</a:t>
+            </a:r>
+          </a:p>
+        </p:txBody>
+      </p:sp>
+      <p:sp>
+        <p:nvSpPr>
+          <p:cNvPr id="4" name="Slide Number Placeholder 3"/>
+          <p:cNvSpPr>
+            <a:spLocks noGrp="1"/>
+          </p:cNvSpPr>
+          <p:nvPr>
+            <p:ph type="sldNum" sz="quarter" idx="12"/>
+          </p:nvPr>
+        </p:nvSpPr>
+        <p:spPr/>
+        <p:txBody>
+          <a:bodyPr/>
+          <a:lstStyle/>
+          <a:p>
+            <a:fld id="{11AD1F4E-1E51-402E-B221-310F004E7D3B}" type="slidenum">
+              <a:rPr lang="en-US" smtClean="0"/>
+              <a:t>10</a:t>
+            </a:fld>
+            <a:endParaRPr lang="en-US"/>
+          </a:p>
+        </p:txBody>
+      </p:sp>
+    </p:spTree>
+    <p:extLst>
+      <p:ext uri="{BB962C8B-B14F-4D97-AF65-F5344CB8AC3E}">
+        <p14:creationId xmlns:p14="http://schemas.microsoft.com/office/powerpoint/2010/main" val="1571435006"/>
+      </p:ext>
+    </p:extLst>
+  </p:cSld>
+  <p:clrMapOvr>
+    <a:masterClrMapping/>
+  </p:clrMapOvr>
+  <p:timing>
+    <p:tnLst>
+      <p:par>
+        <p:cTn id="1" dur="indefinite" restart="never" nodeType="tmRoot"/>
+      </p:par>
+    </p:tnLst>
+  </p:timing>
+</p:sld>
+</file>
+
 <file path=ppt/slides/slide2.xml><?xml version="1.0" encoding="utf-8"?>
 <p:sld xmlns:a="http://schemas.openxmlformats.org/drawingml/2006/main" xmlns:r="http://schemas.openxmlformats.org/officeDocument/2006/relationships" xmlns:p="http://schemas.openxmlformats.org/presentationml/2006/main">
   <p:cSld>
@@ -3796,21 +3971,7 @@
                 <a:latin typeface="Courier New" panose="02070309020205020404" pitchFamily="49" charset="0"/>
                 <a:cs typeface="Courier New" panose="02070309020205020404" pitchFamily="49" charset="0"/>
               </a:rPr>
-              <a:t>for </a:t>
-            </a:r>
-            <a:r>
-              <a:rPr lang="en-US" dirty="0" smtClean="0">
-                <a:latin typeface="Courier New" panose="02070309020205020404" pitchFamily="49" charset="0"/>
-                <a:cs typeface="Courier New" panose="02070309020205020404" pitchFamily="49" charset="0"/>
-              </a:rPr>
-              <a:t>(auto </a:t>
-            </a:r>
-            <a:r>
-              <a:rPr lang="en-US" dirty="0" smtClean="0">
-                <a:latin typeface="Courier New" panose="02070309020205020404" pitchFamily="49" charset="0"/>
-                <a:cs typeface="Courier New" panose="02070309020205020404" pitchFamily="49" charset="0"/>
-              </a:rPr>
-              <a:t>it = </a:t>
+              <a:t>for (auto it = </a:t>
             </a:r>
             <a:r>
               <a:rPr lang="en-US" dirty="0" err="1" smtClean="0">
@@ -5357,35 +5518,21 @@
                 <a:latin typeface="Courier New" panose="02070309020205020404" pitchFamily="49" charset="0"/>
                 <a:cs typeface="Courier New" panose="02070309020205020404" pitchFamily="49" charset="0"/>
               </a:rPr>
-              <a:t>for </a:t>
+              <a:t>for (</a:t>
+            </a:r>
+            <a:r>
+              <a:rPr lang="en-US" dirty="0" err="1" smtClean="0">
+                <a:latin typeface="Courier New" panose="02070309020205020404" pitchFamily="49" charset="0"/>
+                <a:cs typeface="Courier New" panose="02070309020205020404" pitchFamily="49" charset="0"/>
+              </a:rPr>
+              <a:t>const</a:t>
             </a:r>
             <a:r>
               <a:rPr lang="en-US" dirty="0" smtClean="0">
                 <a:latin typeface="Courier New" panose="02070309020205020404" pitchFamily="49" charset="0"/>
                 <a:cs typeface="Courier New" panose="02070309020205020404" pitchFamily="49" charset="0"/>
               </a:rPr>
-              <a:t>(</a:t>
-            </a:r>
-            <a:r>
-              <a:rPr lang="en-US" dirty="0" err="1" smtClean="0">
-                <a:latin typeface="Courier New" panose="02070309020205020404" pitchFamily="49" charset="0"/>
-                <a:cs typeface="Courier New" panose="02070309020205020404" pitchFamily="49" charset="0"/>
-              </a:rPr>
-              <a:t>const</a:t>
-            </a:r>
-            <a:r>
-              <a:rPr lang="en-US" dirty="0" smtClean="0">
-                <a:latin typeface="Courier New" panose="02070309020205020404" pitchFamily="49" charset="0"/>
-                <a:cs typeface="Courier New" panose="02070309020205020404" pitchFamily="49" charset="0"/>
-              </a:rPr>
-              <a:t> auto&amp; </a:t>
-            </a:r>
-            <a:r>
-              <a:rPr lang="en-US" dirty="0" smtClean="0">
-                <a:latin typeface="Courier New" panose="02070309020205020404" pitchFamily="49" charset="0"/>
-                <a:cs typeface="Courier New" panose="02070309020205020404" pitchFamily="49" charset="0"/>
-              </a:rPr>
-              <a:t>it = </a:t>
+              <a:t> auto&amp; it = </a:t>
             </a:r>
             <a:r>
               <a:rPr lang="en-US" dirty="0" err="1" smtClean="0">
@@ -6620,10 +6767,30 @@
         </p:nvSpPr>
         <p:spPr/>
         <p:txBody>
-          <a:bodyPr/>
+          <a:bodyPr>
+            <a:normAutofit/>
+          </a:bodyPr>
           <a:lstStyle/>
           <a:p>
+            <a:r>
+              <a:rPr lang="en-US" dirty="0" smtClean="0"/>
+              <a:t>Predicate find</a:t>
+            </a:r>
+          </a:p>
+          <a:p>
             <a:endParaRPr lang="en-US" dirty="0"/>
+          </a:p>
+          <a:p>
+            <a:endParaRPr lang="en-US" dirty="0" smtClean="0"/>
+          </a:p>
+          <a:p>
+            <a:endParaRPr lang="en-US" dirty="0" smtClean="0"/>
+          </a:p>
+          <a:p>
+            <a:r>
+              <a:rPr lang="en-US" dirty="0" smtClean="0"/>
+              <a:t>Sequence search</a:t>
+            </a:r>
           </a:p>
         </p:txBody>
       </p:sp>
@@ -6647,6 +6814,598 @@
               <a:t>6</a:t>
             </a:fld>
             <a:endParaRPr lang="en-US"/>
+          </a:p>
+        </p:txBody>
+      </p:sp>
+      <p:sp>
+        <p:nvSpPr>
+          <p:cNvPr id="5" name="TextBox 4"/>
+          <p:cNvSpPr txBox="1"/>
+          <p:nvPr/>
+        </p:nvSpPr>
+        <p:spPr>
+          <a:xfrm>
+            <a:off x="628648" y="2298021"/>
+            <a:ext cx="8006195" cy="1200329"/>
+          </a:xfrm>
+          <a:prstGeom prst="rect">
+            <a:avLst/>
+          </a:prstGeom>
+          <a:solidFill>
+            <a:schemeClr val="bg1">
+              <a:lumMod val="75000"/>
+            </a:schemeClr>
+          </a:solidFill>
+          <a:ln>
+            <a:solidFill>
+              <a:schemeClr val="tx1"/>
+            </a:solidFill>
+          </a:ln>
+        </p:spPr>
+        <p:txBody>
+          <a:bodyPr wrap="square" rtlCol="0">
+            <a:spAutoFit/>
+          </a:bodyPr>
+          <a:lstStyle/>
+          <a:p>
+            <a:r>
+              <a:rPr lang="fr-FR" dirty="0" err="1" smtClean="0">
+                <a:latin typeface="Courier New" panose="02070309020205020404" pitchFamily="49" charset="0"/>
+                <a:cs typeface="Courier New" panose="02070309020205020404" pitchFamily="49" charset="0"/>
+              </a:rPr>
+              <a:t>vector</a:t>
+            </a:r>
+            <a:r>
+              <a:rPr lang="fr-FR" dirty="0" smtClean="0">
+                <a:latin typeface="Courier New" panose="02070309020205020404" pitchFamily="49" charset="0"/>
+                <a:cs typeface="Courier New" panose="02070309020205020404" pitchFamily="49" charset="0"/>
+              </a:rPr>
+              <a:t>&lt;</a:t>
+            </a:r>
+            <a:r>
+              <a:rPr lang="fr-FR" dirty="0" err="1" smtClean="0">
+                <a:latin typeface="Courier New" panose="02070309020205020404" pitchFamily="49" charset="0"/>
+                <a:cs typeface="Courier New" panose="02070309020205020404" pitchFamily="49" charset="0"/>
+              </a:rPr>
+              <a:t>int</a:t>
+            </a:r>
+            <a:r>
+              <a:rPr lang="fr-FR" dirty="0" smtClean="0">
+                <a:latin typeface="Courier New" panose="02070309020205020404" pitchFamily="49" charset="0"/>
+                <a:cs typeface="Courier New" panose="02070309020205020404" pitchFamily="49" charset="0"/>
+              </a:rPr>
+              <a:t>&gt; data {…};</a:t>
+            </a:r>
+          </a:p>
+          <a:p>
+            <a:r>
+              <a:rPr lang="fr-FR" dirty="0" smtClean="0">
+                <a:latin typeface="Courier New" panose="02070309020205020404" pitchFamily="49" charset="0"/>
+                <a:cs typeface="Courier New" panose="02070309020205020404" pitchFamily="49" charset="0"/>
+              </a:rPr>
+              <a:t>if (</a:t>
+            </a:r>
+            <a:r>
+              <a:rPr lang="fr-FR" dirty="0" err="1" smtClean="0">
+                <a:latin typeface="Courier New" panose="02070309020205020404" pitchFamily="49" charset="0"/>
+                <a:cs typeface="Courier New" panose="02070309020205020404" pitchFamily="49" charset="0"/>
+              </a:rPr>
+              <a:t>find_if</a:t>
+            </a:r>
+            <a:r>
+              <a:rPr lang="fr-FR" dirty="0" smtClean="0">
+                <a:latin typeface="Courier New" panose="02070309020205020404" pitchFamily="49" charset="0"/>
+                <a:cs typeface="Courier New" panose="02070309020205020404" pitchFamily="49" charset="0"/>
+              </a:rPr>
+              <a:t>(</a:t>
+            </a:r>
+            <a:r>
+              <a:rPr lang="fr-FR" dirty="0" err="1" smtClean="0">
+                <a:latin typeface="Courier New" panose="02070309020205020404" pitchFamily="49" charset="0"/>
+                <a:cs typeface="Courier New" panose="02070309020205020404" pitchFamily="49" charset="0"/>
+              </a:rPr>
+              <a:t>data.cbegin</a:t>
+            </a:r>
+            <a:r>
+              <a:rPr lang="fr-FR" dirty="0" smtClean="0">
+                <a:latin typeface="Courier New" panose="02070309020205020404" pitchFamily="49" charset="0"/>
+                <a:cs typeface="Courier New" panose="02070309020205020404" pitchFamily="49" charset="0"/>
+              </a:rPr>
+              <a:t>(), </a:t>
+            </a:r>
+            <a:r>
+              <a:rPr lang="fr-FR" dirty="0" err="1" smtClean="0">
+                <a:latin typeface="Courier New" panose="02070309020205020404" pitchFamily="49" charset="0"/>
+                <a:cs typeface="Courier New" panose="02070309020205020404" pitchFamily="49" charset="0"/>
+              </a:rPr>
+              <a:t>data.cend</a:t>
+            </a:r>
+            <a:r>
+              <a:rPr lang="fr-FR" dirty="0" smtClean="0">
+                <a:latin typeface="Courier New" panose="02070309020205020404" pitchFamily="49" charset="0"/>
+                <a:cs typeface="Courier New" panose="02070309020205020404" pitchFamily="49" charset="0"/>
+              </a:rPr>
+              <a:t>(),</a:t>
+            </a:r>
+          </a:p>
+          <a:p>
+            <a:r>
+              <a:rPr lang="fr-FR" dirty="0">
+                <a:latin typeface="Courier New" panose="02070309020205020404" pitchFamily="49" charset="0"/>
+                <a:cs typeface="Courier New" panose="02070309020205020404" pitchFamily="49" charset="0"/>
+              </a:rPr>
+              <a:t> </a:t>
+            </a:r>
+            <a:r>
+              <a:rPr lang="fr-FR" dirty="0" smtClean="0">
+                <a:latin typeface="Courier New" panose="02070309020205020404" pitchFamily="49" charset="0"/>
+                <a:cs typeface="Courier New" panose="02070309020205020404" pitchFamily="49" charset="0"/>
+              </a:rPr>
+              <a:t>           [] (</a:t>
+            </a:r>
+            <a:r>
+              <a:rPr lang="fr-FR" dirty="0" err="1" smtClean="0">
+                <a:latin typeface="Courier New" panose="02070309020205020404" pitchFamily="49" charset="0"/>
+                <a:cs typeface="Courier New" panose="02070309020205020404" pitchFamily="49" charset="0"/>
+              </a:rPr>
+              <a:t>int</a:t>
+            </a:r>
+            <a:r>
+              <a:rPr lang="fr-FR" dirty="0" smtClean="0">
+                <a:latin typeface="Courier New" panose="02070309020205020404" pitchFamily="49" charset="0"/>
+                <a:cs typeface="Courier New" panose="02070309020205020404" pitchFamily="49" charset="0"/>
+              </a:rPr>
+              <a:t> x) { return x &lt; 0; }) != </a:t>
+            </a:r>
+            <a:r>
+              <a:rPr lang="fr-FR" dirty="0" err="1" smtClean="0">
+                <a:latin typeface="Courier New" panose="02070309020205020404" pitchFamily="49" charset="0"/>
+                <a:cs typeface="Courier New" panose="02070309020205020404" pitchFamily="49" charset="0"/>
+              </a:rPr>
+              <a:t>data.cend</a:t>
+            </a:r>
+            <a:r>
+              <a:rPr lang="fr-FR" dirty="0" smtClean="0">
+                <a:latin typeface="Courier New" panose="02070309020205020404" pitchFamily="49" charset="0"/>
+                <a:cs typeface="Courier New" panose="02070309020205020404" pitchFamily="49" charset="0"/>
+              </a:rPr>
+              <a:t>())</a:t>
+            </a:r>
+          </a:p>
+          <a:p>
+            <a:r>
+              <a:rPr lang="fr-FR" dirty="0">
+                <a:latin typeface="Courier New" panose="02070309020205020404" pitchFamily="49" charset="0"/>
+                <a:cs typeface="Courier New" panose="02070309020205020404" pitchFamily="49" charset="0"/>
+              </a:rPr>
+              <a:t> </a:t>
+            </a:r>
+            <a:r>
+              <a:rPr lang="fr-FR" dirty="0" smtClean="0">
+                <a:latin typeface="Courier New" panose="02070309020205020404" pitchFamily="49" charset="0"/>
+                <a:cs typeface="Courier New" panose="02070309020205020404" pitchFamily="49" charset="0"/>
+              </a:rPr>
+              <a:t>   cout &lt;&lt; "</a:t>
+            </a:r>
+            <a:r>
+              <a:rPr lang="fr-FR" dirty="0" err="1" smtClean="0">
+                <a:latin typeface="Courier New" panose="02070309020205020404" pitchFamily="49" charset="0"/>
+                <a:cs typeface="Courier New" panose="02070309020205020404" pitchFamily="49" charset="0"/>
+              </a:rPr>
+              <a:t>found</a:t>
+            </a:r>
+            <a:r>
+              <a:rPr lang="fr-FR" dirty="0" smtClean="0">
+                <a:latin typeface="Courier New" panose="02070309020205020404" pitchFamily="49" charset="0"/>
+                <a:cs typeface="Courier New" panose="02070309020205020404" pitchFamily="49" charset="0"/>
+              </a:rPr>
+              <a:t>!" &lt;&lt; </a:t>
+            </a:r>
+            <a:r>
+              <a:rPr lang="fr-FR" dirty="0" err="1" smtClean="0">
+                <a:latin typeface="Courier New" panose="02070309020205020404" pitchFamily="49" charset="0"/>
+                <a:cs typeface="Courier New" panose="02070309020205020404" pitchFamily="49" charset="0"/>
+              </a:rPr>
+              <a:t>endl</a:t>
+            </a:r>
+            <a:r>
+              <a:rPr lang="fr-FR" dirty="0" smtClean="0">
+                <a:latin typeface="Courier New" panose="02070309020205020404" pitchFamily="49" charset="0"/>
+                <a:cs typeface="Courier New" panose="02070309020205020404" pitchFamily="49" charset="0"/>
+              </a:rPr>
+              <a:t>;</a:t>
+            </a:r>
+            <a:endParaRPr lang="fr-FR" dirty="0" smtClean="0">
+              <a:latin typeface="Courier New" panose="02070309020205020404" pitchFamily="49" charset="0"/>
+              <a:cs typeface="Courier New" panose="02070309020205020404" pitchFamily="49" charset="0"/>
+            </a:endParaRPr>
+          </a:p>
+        </p:txBody>
+      </p:sp>
+      <p:sp>
+        <p:nvSpPr>
+          <p:cNvPr id="6" name="TextBox 5"/>
+          <p:cNvSpPr txBox="1"/>
+          <p:nvPr/>
+        </p:nvSpPr>
+        <p:spPr>
+          <a:xfrm>
+            <a:off x="628648" y="4350648"/>
+            <a:ext cx="8006195" cy="1754326"/>
+          </a:xfrm>
+          <a:prstGeom prst="rect">
+            <a:avLst/>
+          </a:prstGeom>
+          <a:solidFill>
+            <a:schemeClr val="bg1">
+              <a:lumMod val="75000"/>
+            </a:schemeClr>
+          </a:solidFill>
+          <a:ln>
+            <a:solidFill>
+              <a:schemeClr val="tx1"/>
+            </a:solidFill>
+          </a:ln>
+        </p:spPr>
+        <p:txBody>
+          <a:bodyPr wrap="square" rtlCol="0">
+            <a:spAutoFit/>
+          </a:bodyPr>
+          <a:lstStyle/>
+          <a:p>
+            <a:r>
+              <a:rPr lang="fr-FR" dirty="0" err="1" smtClean="0">
+                <a:latin typeface="Courier New" panose="02070309020205020404" pitchFamily="49" charset="0"/>
+                <a:cs typeface="Courier New" panose="02070309020205020404" pitchFamily="49" charset="0"/>
+              </a:rPr>
+              <a:t>const</a:t>
+            </a:r>
+            <a:r>
+              <a:rPr lang="fr-FR" dirty="0" smtClean="0">
+                <a:latin typeface="Courier New" panose="02070309020205020404" pitchFamily="49" charset="0"/>
+                <a:cs typeface="Courier New" panose="02070309020205020404" pitchFamily="49" charset="0"/>
+              </a:rPr>
+              <a:t> string </a:t>
+            </a:r>
+            <a:r>
+              <a:rPr lang="fr-FR" dirty="0" err="1" smtClean="0">
+                <a:latin typeface="Courier New" panose="02070309020205020404" pitchFamily="49" charset="0"/>
+                <a:cs typeface="Courier New" panose="02070309020205020404" pitchFamily="49" charset="0"/>
+              </a:rPr>
+              <a:t>dna</a:t>
+            </a:r>
+            <a:r>
+              <a:rPr lang="fr-FR" dirty="0" smtClean="0">
+                <a:latin typeface="Courier New" panose="02070309020205020404" pitchFamily="49" charset="0"/>
+                <a:cs typeface="Courier New" panose="02070309020205020404" pitchFamily="49" charset="0"/>
+              </a:rPr>
+              <a:t> {…};</a:t>
+            </a:r>
+          </a:p>
+          <a:p>
+            <a:r>
+              <a:rPr lang="fr-FR" dirty="0" err="1" smtClean="0">
+                <a:latin typeface="Courier New" panose="02070309020205020404" pitchFamily="49" charset="0"/>
+                <a:cs typeface="Courier New" panose="02070309020205020404" pitchFamily="49" charset="0"/>
+              </a:rPr>
+              <a:t>const</a:t>
+            </a:r>
+            <a:r>
+              <a:rPr lang="fr-FR" dirty="0" smtClean="0">
+                <a:latin typeface="Courier New" panose="02070309020205020404" pitchFamily="49" charset="0"/>
+                <a:cs typeface="Courier New" panose="02070309020205020404" pitchFamily="49" charset="0"/>
+              </a:rPr>
+              <a:t> string </a:t>
+            </a:r>
+            <a:r>
+              <a:rPr lang="fr-FR" dirty="0" err="1" smtClean="0">
+                <a:latin typeface="Courier New" panose="02070309020205020404" pitchFamily="49" charset="0"/>
+                <a:cs typeface="Courier New" panose="02070309020205020404" pitchFamily="49" charset="0"/>
+              </a:rPr>
+              <a:t>subseq</a:t>
+            </a:r>
+            <a:r>
+              <a:rPr lang="fr-FR" dirty="0" smtClean="0">
+                <a:latin typeface="Courier New" panose="02070309020205020404" pitchFamily="49" charset="0"/>
+                <a:cs typeface="Courier New" panose="02070309020205020404" pitchFamily="49" charset="0"/>
+              </a:rPr>
+              <a:t> {"ACCGTA"};</a:t>
+            </a:r>
+          </a:p>
+          <a:p>
+            <a:r>
+              <a:rPr lang="fr-FR" dirty="0" smtClean="0">
+                <a:latin typeface="Courier New" panose="02070309020205020404" pitchFamily="49" charset="0"/>
+                <a:cs typeface="Courier New" panose="02070309020205020404" pitchFamily="49" charset="0"/>
+              </a:rPr>
+              <a:t>auto </a:t>
+            </a:r>
+            <a:r>
+              <a:rPr lang="fr-FR" dirty="0" err="1" smtClean="0">
+                <a:latin typeface="Courier New" panose="02070309020205020404" pitchFamily="49" charset="0"/>
+                <a:cs typeface="Courier New" panose="02070309020205020404" pitchFamily="49" charset="0"/>
+              </a:rPr>
+              <a:t>it</a:t>
+            </a:r>
+            <a:r>
+              <a:rPr lang="fr-FR" dirty="0" smtClean="0">
+                <a:latin typeface="Courier New" panose="02070309020205020404" pitchFamily="49" charset="0"/>
+                <a:cs typeface="Courier New" panose="02070309020205020404" pitchFamily="49" charset="0"/>
+              </a:rPr>
+              <a:t> = </a:t>
+            </a:r>
+            <a:r>
+              <a:rPr lang="fr-FR" dirty="0" err="1" smtClean="0">
+                <a:latin typeface="Courier New" panose="02070309020205020404" pitchFamily="49" charset="0"/>
+                <a:cs typeface="Courier New" panose="02070309020205020404" pitchFamily="49" charset="0"/>
+              </a:rPr>
+              <a:t>search</a:t>
+            </a:r>
+            <a:r>
+              <a:rPr lang="fr-FR" dirty="0" smtClean="0">
+                <a:latin typeface="Courier New" panose="02070309020205020404" pitchFamily="49" charset="0"/>
+                <a:cs typeface="Courier New" panose="02070309020205020404" pitchFamily="49" charset="0"/>
+              </a:rPr>
+              <a:t>(</a:t>
+            </a:r>
+            <a:r>
+              <a:rPr lang="fr-FR" dirty="0" err="1" smtClean="0">
+                <a:latin typeface="Courier New" panose="02070309020205020404" pitchFamily="49" charset="0"/>
+                <a:cs typeface="Courier New" panose="02070309020205020404" pitchFamily="49" charset="0"/>
+              </a:rPr>
+              <a:t>dna.cbegin</a:t>
+            </a:r>
+            <a:r>
+              <a:rPr lang="fr-FR" dirty="0" smtClean="0">
+                <a:latin typeface="Courier New" panose="02070309020205020404" pitchFamily="49" charset="0"/>
+                <a:cs typeface="Courier New" panose="02070309020205020404" pitchFamily="49" charset="0"/>
+              </a:rPr>
+              <a:t>(), </a:t>
+            </a:r>
+            <a:r>
+              <a:rPr lang="fr-FR" dirty="0" err="1" smtClean="0">
+                <a:latin typeface="Courier New" panose="02070309020205020404" pitchFamily="49" charset="0"/>
+                <a:cs typeface="Courier New" panose="02070309020205020404" pitchFamily="49" charset="0"/>
+              </a:rPr>
+              <a:t>dna.cend</a:t>
+            </a:r>
+            <a:r>
+              <a:rPr lang="fr-FR" dirty="0" smtClean="0">
+                <a:latin typeface="Courier New" panose="02070309020205020404" pitchFamily="49" charset="0"/>
+                <a:cs typeface="Courier New" panose="02070309020205020404" pitchFamily="49" charset="0"/>
+              </a:rPr>
+              <a:t>(),</a:t>
+            </a:r>
+            <a:br>
+              <a:rPr lang="fr-FR" dirty="0" smtClean="0">
+                <a:latin typeface="Courier New" panose="02070309020205020404" pitchFamily="49" charset="0"/>
+                <a:cs typeface="Courier New" panose="02070309020205020404" pitchFamily="49" charset="0"/>
+              </a:rPr>
+            </a:br>
+            <a:r>
+              <a:rPr lang="fr-FR" dirty="0" smtClean="0">
+                <a:latin typeface="Courier New" panose="02070309020205020404" pitchFamily="49" charset="0"/>
+                <a:cs typeface="Courier New" panose="02070309020205020404" pitchFamily="49" charset="0"/>
+              </a:rPr>
+              <a:t>                 </a:t>
+            </a:r>
+            <a:r>
+              <a:rPr lang="fr-FR" dirty="0" err="1" smtClean="0">
+                <a:latin typeface="Courier New" panose="02070309020205020404" pitchFamily="49" charset="0"/>
+                <a:cs typeface="Courier New" panose="02070309020205020404" pitchFamily="49" charset="0"/>
+              </a:rPr>
+              <a:t>subseq.cbegin</a:t>
+            </a:r>
+            <a:r>
+              <a:rPr lang="fr-FR" dirty="0" smtClean="0">
+                <a:latin typeface="Courier New" panose="02070309020205020404" pitchFamily="49" charset="0"/>
+                <a:cs typeface="Courier New" panose="02070309020205020404" pitchFamily="49" charset="0"/>
+              </a:rPr>
+              <a:t>(), </a:t>
+            </a:r>
+            <a:r>
+              <a:rPr lang="fr-FR" dirty="0" err="1" smtClean="0">
+                <a:latin typeface="Courier New" panose="02070309020205020404" pitchFamily="49" charset="0"/>
+                <a:cs typeface="Courier New" panose="02070309020205020404" pitchFamily="49" charset="0"/>
+              </a:rPr>
+              <a:t>subseq.cend</a:t>
+            </a:r>
+            <a:r>
+              <a:rPr lang="fr-FR" dirty="0" smtClean="0">
+                <a:latin typeface="Courier New" panose="02070309020205020404" pitchFamily="49" charset="0"/>
+                <a:cs typeface="Courier New" panose="02070309020205020404" pitchFamily="49" charset="0"/>
+              </a:rPr>
+              <a:t>());</a:t>
+            </a:r>
+          </a:p>
+          <a:p>
+            <a:r>
+              <a:rPr lang="fr-FR" dirty="0" smtClean="0">
+                <a:latin typeface="Courier New" panose="02070309020205020404" pitchFamily="49" charset="0"/>
+                <a:cs typeface="Courier New" panose="02070309020205020404" pitchFamily="49" charset="0"/>
+              </a:rPr>
+              <a:t>if (</a:t>
+            </a:r>
+            <a:r>
+              <a:rPr lang="fr-FR" dirty="0" err="1" smtClean="0">
+                <a:latin typeface="Courier New" panose="02070309020205020404" pitchFamily="49" charset="0"/>
+                <a:cs typeface="Courier New" panose="02070309020205020404" pitchFamily="49" charset="0"/>
+              </a:rPr>
+              <a:t>it</a:t>
+            </a:r>
+            <a:r>
+              <a:rPr lang="fr-FR" dirty="0" smtClean="0">
+                <a:latin typeface="Courier New" panose="02070309020205020404" pitchFamily="49" charset="0"/>
+                <a:cs typeface="Courier New" panose="02070309020205020404" pitchFamily="49" charset="0"/>
+              </a:rPr>
+              <a:t> != </a:t>
+            </a:r>
+            <a:r>
+              <a:rPr lang="fr-FR" dirty="0" err="1" smtClean="0">
+                <a:latin typeface="Courier New" panose="02070309020205020404" pitchFamily="49" charset="0"/>
+                <a:cs typeface="Courier New" panose="02070309020205020404" pitchFamily="49" charset="0"/>
+              </a:rPr>
+              <a:t>dna.cend</a:t>
+            </a:r>
+            <a:r>
+              <a:rPr lang="fr-FR" dirty="0" smtClean="0">
+                <a:latin typeface="Courier New" panose="02070309020205020404" pitchFamily="49" charset="0"/>
+                <a:cs typeface="Courier New" panose="02070309020205020404" pitchFamily="49" charset="0"/>
+              </a:rPr>
+              <a:t>())</a:t>
+            </a:r>
+          </a:p>
+          <a:p>
+            <a:r>
+              <a:rPr lang="fr-FR" dirty="0">
+                <a:latin typeface="Courier New" panose="02070309020205020404" pitchFamily="49" charset="0"/>
+                <a:cs typeface="Courier New" panose="02070309020205020404" pitchFamily="49" charset="0"/>
+              </a:rPr>
+              <a:t> </a:t>
+            </a:r>
+            <a:r>
+              <a:rPr lang="fr-FR" dirty="0" smtClean="0">
+                <a:latin typeface="Courier New" panose="02070309020205020404" pitchFamily="49" charset="0"/>
+                <a:cs typeface="Courier New" panose="02070309020205020404" pitchFamily="49" charset="0"/>
+              </a:rPr>
+              <a:t>   cout &lt;&lt; "</a:t>
+            </a:r>
+            <a:r>
+              <a:rPr lang="fr-FR" dirty="0" err="1" smtClean="0">
+                <a:latin typeface="Courier New" panose="02070309020205020404" pitchFamily="49" charset="0"/>
+                <a:cs typeface="Courier New" panose="02070309020205020404" pitchFamily="49" charset="0"/>
+              </a:rPr>
+              <a:t>found</a:t>
+            </a:r>
+            <a:r>
+              <a:rPr lang="fr-FR" dirty="0" smtClean="0">
+                <a:latin typeface="Courier New" panose="02070309020205020404" pitchFamily="49" charset="0"/>
+                <a:cs typeface="Courier New" panose="02070309020205020404" pitchFamily="49" charset="0"/>
+              </a:rPr>
+              <a:t>!" &lt;&lt; </a:t>
+            </a:r>
+            <a:r>
+              <a:rPr lang="fr-FR" dirty="0" err="1" smtClean="0">
+                <a:latin typeface="Courier New" panose="02070309020205020404" pitchFamily="49" charset="0"/>
+                <a:cs typeface="Courier New" panose="02070309020205020404" pitchFamily="49" charset="0"/>
+              </a:rPr>
+              <a:t>endl</a:t>
+            </a:r>
+            <a:r>
+              <a:rPr lang="fr-FR" dirty="0" smtClean="0">
+                <a:latin typeface="Courier New" panose="02070309020205020404" pitchFamily="49" charset="0"/>
+                <a:cs typeface="Courier New" panose="02070309020205020404" pitchFamily="49" charset="0"/>
+              </a:rPr>
+              <a:t>;</a:t>
+            </a:r>
+            <a:endParaRPr lang="fr-FR" dirty="0" smtClean="0">
+              <a:latin typeface="Courier New" panose="02070309020205020404" pitchFamily="49" charset="0"/>
+              <a:cs typeface="Courier New" panose="02070309020205020404" pitchFamily="49" charset="0"/>
+            </a:endParaRPr>
+          </a:p>
+        </p:txBody>
+      </p:sp>
+      <p:sp>
+        <p:nvSpPr>
+          <p:cNvPr id="7" name="TextBox 6"/>
+          <p:cNvSpPr txBox="1"/>
+          <p:nvPr/>
+        </p:nvSpPr>
+        <p:spPr>
+          <a:xfrm>
+            <a:off x="5642264" y="4165982"/>
+            <a:ext cx="3181640" cy="369332"/>
+          </a:xfrm>
+          <a:prstGeom prst="rect">
+            <a:avLst/>
+          </a:prstGeom>
+          <a:solidFill>
+            <a:schemeClr val="bg1"/>
+          </a:solidFill>
+          <a:ln>
+            <a:solidFill>
+              <a:schemeClr val="tx1"/>
+            </a:solidFill>
+          </a:ln>
+        </p:spPr>
+        <p:txBody>
+          <a:bodyPr wrap="none" rtlCol="0">
+            <a:spAutoFit/>
+          </a:bodyPr>
+          <a:lstStyle/>
+          <a:p>
+            <a:r>
+              <a:rPr lang="en-US" dirty="0" smtClean="0"/>
+              <a:t>Can use Boyer-Moore algorithm</a:t>
+            </a:r>
+            <a:endParaRPr lang="en-US" dirty="0"/>
+          </a:p>
+        </p:txBody>
+      </p:sp>
+      <p:sp>
+        <p:nvSpPr>
+          <p:cNvPr id="8" name="TextBox 7"/>
+          <p:cNvSpPr txBox="1"/>
+          <p:nvPr/>
+        </p:nvSpPr>
+        <p:spPr>
+          <a:xfrm>
+            <a:off x="1932709" y="6257866"/>
+            <a:ext cx="4972836" cy="461665"/>
+          </a:xfrm>
+          <a:prstGeom prst="rect">
+            <a:avLst/>
+          </a:prstGeom>
+          <a:noFill/>
+          <a:ln>
+            <a:solidFill>
+              <a:schemeClr val="tx1"/>
+            </a:solidFill>
+          </a:ln>
+        </p:spPr>
+        <p:txBody>
+          <a:bodyPr wrap="none" rtlCol="0">
+            <a:spAutoFit/>
+          </a:bodyPr>
+          <a:lstStyle/>
+          <a:p>
+            <a:r>
+              <a:rPr lang="en-US" sz="2400" dirty="0"/>
+              <a:t>Similar: </a:t>
+            </a:r>
+            <a:r>
+              <a:rPr lang="en-US" sz="2400" dirty="0">
+                <a:latin typeface="Courier New" panose="02070309020205020404" pitchFamily="49" charset="0"/>
+                <a:cs typeface="Courier New" panose="02070309020205020404" pitchFamily="49" charset="0"/>
+              </a:rPr>
+              <a:t>find</a:t>
+            </a:r>
+            <a:r>
+              <a:rPr lang="en-US" sz="2400" dirty="0"/>
+              <a:t>, </a:t>
+            </a:r>
+            <a:r>
+              <a:rPr lang="en-US" sz="2400" dirty="0">
+                <a:latin typeface="Courier New" panose="02070309020205020404" pitchFamily="49" charset="0"/>
+                <a:cs typeface="Courier New" panose="02070309020205020404" pitchFamily="49" charset="0"/>
+              </a:rPr>
+              <a:t>count</a:t>
+            </a:r>
+            <a:r>
+              <a:rPr lang="en-US" sz="2400" dirty="0"/>
+              <a:t>, </a:t>
+            </a:r>
+            <a:r>
+              <a:rPr lang="en-US" sz="2400" dirty="0" err="1">
+                <a:latin typeface="Courier New" panose="02070309020205020404" pitchFamily="49" charset="0"/>
+                <a:cs typeface="Courier New" panose="02070309020205020404" pitchFamily="49" charset="0"/>
+              </a:rPr>
+              <a:t>count_if</a:t>
+            </a:r>
+            <a:r>
+              <a:rPr lang="en-US" sz="2400" dirty="0"/>
+              <a:t>, …</a:t>
+            </a:r>
           </a:p>
         </p:txBody>
       </p:sp>
@@ -6663,9 +7422,238 @@
   <p:timing>
     <p:tnLst>
       <p:par>
-        <p:cTn id="1" dur="indefinite" restart="never" nodeType="tmRoot"/>
+        <p:cTn id="1" dur="indefinite" restart="never" nodeType="tmRoot">
+          <p:childTnLst>
+            <p:seq concurrent="1" nextAc="seek">
+              <p:cTn id="2" dur="indefinite" nodeType="mainSeq">
+                <p:childTnLst>
+                  <p:par>
+                    <p:cTn id="3" fill="hold">
+                      <p:stCondLst>
+                        <p:cond delay="indefinite"/>
+                        <p:cond evt="onBegin" delay="0">
+                          <p:tn val="2"/>
+                        </p:cond>
+                      </p:stCondLst>
+                      <p:childTnLst>
+                        <p:par>
+                          <p:cTn id="4" fill="hold">
+                            <p:stCondLst>
+                              <p:cond delay="0"/>
+                            </p:stCondLst>
+                            <p:childTnLst>
+                              <p:par>
+                                <p:cTn id="5" presetID="1" presetClass="entr" presetSubtype="0" fill="hold" grpId="0" nodeType="withEffect">
+                                  <p:stCondLst>
+                                    <p:cond delay="0"/>
+                                  </p:stCondLst>
+                                  <p:childTnLst>
+                                    <p:set>
+                                      <p:cBhvr>
+                                        <p:cTn id="6" dur="1" fill="hold">
+                                          <p:stCondLst>
+                                            <p:cond delay="0"/>
+                                          </p:stCondLst>
+                                        </p:cTn>
+                                        <p:tgtEl>
+                                          <p:spTgt spid="3">
+                                            <p:txEl>
+                                              <p:pRg st="0" end="0"/>
+                                            </p:txEl>
+                                          </p:spTgt>
+                                        </p:tgtEl>
+                                        <p:attrNameLst>
+                                          <p:attrName>style.visibility</p:attrName>
+                                        </p:attrNameLst>
+                                      </p:cBhvr>
+                                      <p:to>
+                                        <p:strVal val="visible"/>
+                                      </p:to>
+                                    </p:set>
+                                  </p:childTnLst>
+                                </p:cTn>
+                              </p:par>
+                              <p:par>
+                                <p:cTn id="7" presetID="1" presetClass="entr" presetSubtype="0" fill="hold" grpId="0" nodeType="withEffect">
+                                  <p:stCondLst>
+                                    <p:cond delay="0"/>
+                                  </p:stCondLst>
+                                  <p:childTnLst>
+                                    <p:set>
+                                      <p:cBhvr>
+                                        <p:cTn id="8" dur="1" fill="hold">
+                                          <p:stCondLst>
+                                            <p:cond delay="0"/>
+                                          </p:stCondLst>
+                                        </p:cTn>
+                                        <p:tgtEl>
+                                          <p:spTgt spid="5"/>
+                                        </p:tgtEl>
+                                        <p:attrNameLst>
+                                          <p:attrName>style.visibility</p:attrName>
+                                        </p:attrNameLst>
+                                      </p:cBhvr>
+                                      <p:to>
+                                        <p:strVal val="visible"/>
+                                      </p:to>
+                                    </p:set>
+                                  </p:childTnLst>
+                                </p:cTn>
+                              </p:par>
+                            </p:childTnLst>
+                          </p:cTn>
+                        </p:par>
+                      </p:childTnLst>
+                    </p:cTn>
+                  </p:par>
+                  <p:par>
+                    <p:cTn id="9" fill="hold">
+                      <p:stCondLst>
+                        <p:cond delay="indefinite"/>
+                      </p:stCondLst>
+                      <p:childTnLst>
+                        <p:par>
+                          <p:cTn id="10" fill="hold">
+                            <p:stCondLst>
+                              <p:cond delay="0"/>
+                            </p:stCondLst>
+                            <p:childTnLst>
+                              <p:par>
+                                <p:cTn id="11" presetID="1" presetClass="entr" presetSubtype="0" fill="hold" grpId="0" nodeType="clickEffect">
+                                  <p:stCondLst>
+                                    <p:cond delay="0"/>
+                                  </p:stCondLst>
+                                  <p:childTnLst>
+                                    <p:set>
+                                      <p:cBhvr>
+                                        <p:cTn id="12" dur="1" fill="hold">
+                                          <p:stCondLst>
+                                            <p:cond delay="0"/>
+                                          </p:stCondLst>
+                                        </p:cTn>
+                                        <p:tgtEl>
+                                          <p:spTgt spid="3">
+                                            <p:txEl>
+                                              <p:pRg st="4" end="4"/>
+                                            </p:txEl>
+                                          </p:spTgt>
+                                        </p:tgtEl>
+                                        <p:attrNameLst>
+                                          <p:attrName>style.visibility</p:attrName>
+                                        </p:attrNameLst>
+                                      </p:cBhvr>
+                                      <p:to>
+                                        <p:strVal val="visible"/>
+                                      </p:to>
+                                    </p:set>
+                                  </p:childTnLst>
+                                </p:cTn>
+                              </p:par>
+                              <p:par>
+                                <p:cTn id="13" presetID="1" presetClass="entr" presetSubtype="0" fill="hold" grpId="0" nodeType="withEffect">
+                                  <p:stCondLst>
+                                    <p:cond delay="0"/>
+                                  </p:stCondLst>
+                                  <p:childTnLst>
+                                    <p:set>
+                                      <p:cBhvr>
+                                        <p:cTn id="14" dur="1" fill="hold">
+                                          <p:stCondLst>
+                                            <p:cond delay="0"/>
+                                          </p:stCondLst>
+                                        </p:cTn>
+                                        <p:tgtEl>
+                                          <p:spTgt spid="6"/>
+                                        </p:tgtEl>
+                                        <p:attrNameLst>
+                                          <p:attrName>style.visibility</p:attrName>
+                                        </p:attrNameLst>
+                                      </p:cBhvr>
+                                      <p:to>
+                                        <p:strVal val="visible"/>
+                                      </p:to>
+                                    </p:set>
+                                  </p:childTnLst>
+                                </p:cTn>
+                              </p:par>
+                            </p:childTnLst>
+                          </p:cTn>
+                        </p:par>
+                      </p:childTnLst>
+                    </p:cTn>
+                  </p:par>
+                  <p:par>
+                    <p:cTn id="15" fill="hold">
+                      <p:stCondLst>
+                        <p:cond delay="indefinite"/>
+                      </p:stCondLst>
+                      <p:childTnLst>
+                        <p:par>
+                          <p:cTn id="16" fill="hold">
+                            <p:stCondLst>
+                              <p:cond delay="0"/>
+                            </p:stCondLst>
+                            <p:childTnLst>
+                              <p:par>
+                                <p:cTn id="17" presetID="1" presetClass="entr" presetSubtype="0" fill="hold" grpId="0" nodeType="clickEffect">
+                                  <p:stCondLst>
+                                    <p:cond delay="0"/>
+                                  </p:stCondLst>
+                                  <p:childTnLst>
+                                    <p:set>
+                                      <p:cBhvr>
+                                        <p:cTn id="18" dur="1" fill="hold">
+                                          <p:stCondLst>
+                                            <p:cond delay="0"/>
+                                          </p:stCondLst>
+                                        </p:cTn>
+                                        <p:tgtEl>
+                                          <p:spTgt spid="7"/>
+                                        </p:tgtEl>
+                                        <p:attrNameLst>
+                                          <p:attrName>style.visibility</p:attrName>
+                                        </p:attrNameLst>
+                                      </p:cBhvr>
+                                      <p:to>
+                                        <p:strVal val="visible"/>
+                                      </p:to>
+                                    </p:set>
+                                  </p:childTnLst>
+                                </p:cTn>
+                              </p:par>
+                            </p:childTnLst>
+                          </p:cTn>
+                        </p:par>
+                      </p:childTnLst>
+                    </p:cTn>
+                  </p:par>
+                </p:childTnLst>
+              </p:cTn>
+              <p:prevCondLst>
+                <p:cond evt="onPrev" delay="0">
+                  <p:tgtEl>
+                    <p:sldTgt/>
+                  </p:tgtEl>
+                </p:cond>
+              </p:prevCondLst>
+              <p:nextCondLst>
+                <p:cond evt="onNext" delay="0">
+                  <p:tgtEl>
+                    <p:sldTgt/>
+                  </p:tgtEl>
+                </p:cond>
+              </p:nextCondLst>
+            </p:seq>
+          </p:childTnLst>
+        </p:cTn>
       </p:par>
     </p:tnLst>
+    <p:bldLst>
+      <p:bldP spid="3" grpId="0" uiExpand="1" build="p"/>
+      <p:bldP spid="5" grpId="0" animBg="1"/>
+      <p:bldP spid="6" grpId="0" animBg="1"/>
+      <p:bldP spid="7" grpId="0" animBg="1"/>
+    </p:bldLst>
   </p:timing>
 </p:sld>
 </file>
@@ -6704,7 +7692,7 @@
           <a:p>
             <a:r>
               <a:rPr lang="en-US" dirty="0" smtClean="0"/>
-              <a:t>What was left out/added?</a:t>
+              <a:t>Transformation</a:t>
             </a:r>
             <a:endParaRPr lang="en-US" dirty="0"/>
           </a:p>
@@ -6712,7 +7700,7 @@
       </p:sp>
       <p:sp>
         <p:nvSpPr>
-          <p:cNvPr id="4" name="Content Placeholder 3"/>
+          <p:cNvPr id="3" name="Content Placeholder 2"/>
           <p:cNvSpPr>
             <a:spLocks noGrp="1"/>
           </p:cNvSpPr>
@@ -6725,16 +7713,32 @@
           <a:bodyPr/>
           <a:lstStyle/>
           <a:p>
+            <a:r>
+              <a:rPr lang="en-US" dirty="0" smtClean="0"/>
+              <a:t>Single container</a:t>
+            </a:r>
+          </a:p>
+          <a:p>
+            <a:endParaRPr lang="en-US" dirty="0"/>
+          </a:p>
+          <a:p>
             <a:endParaRPr lang="en-US" dirty="0" smtClean="0"/>
           </a:p>
           <a:p>
+            <a:endParaRPr lang="en-US" dirty="0" smtClean="0"/>
+          </a:p>
+          <a:p>
+            <a:r>
+              <a:rPr lang="en-US" dirty="0" smtClean="0"/>
+              <a:t>Two containers (aka zip)</a:t>
+            </a:r>
             <a:endParaRPr lang="en-US" dirty="0"/>
           </a:p>
         </p:txBody>
       </p:sp>
       <p:sp>
         <p:nvSpPr>
-          <p:cNvPr id="3" name="Slide Number Placeholder 2"/>
+          <p:cNvPr id="4" name="Slide Number Placeholder 3"/>
           <p:cNvSpPr>
             <a:spLocks noGrp="1"/>
           </p:cNvSpPr>
@@ -6747,7 +7751,7 @@
           <a:bodyPr/>
           <a:lstStyle/>
           <a:p>
-            <a:fld id="{9CEF4966-5219-4577-B301-14467D565841}" type="slidenum">
+            <a:fld id="{11AD1F4E-1E51-402E-B221-310F004E7D3B}" type="slidenum">
               <a:rPr lang="en-US" smtClean="0"/>
               <a:t>7</a:t>
             </a:fld>
@@ -6755,10 +7759,393 @@
           </a:p>
         </p:txBody>
       </p:sp>
+      <p:sp>
+        <p:nvSpPr>
+          <p:cNvPr id="5" name="TextBox 4"/>
+          <p:cNvSpPr txBox="1"/>
+          <p:nvPr/>
+        </p:nvSpPr>
+        <p:spPr>
+          <a:xfrm>
+            <a:off x="628647" y="2347136"/>
+            <a:ext cx="7611343" cy="1200329"/>
+          </a:xfrm>
+          <a:prstGeom prst="rect">
+            <a:avLst/>
+          </a:prstGeom>
+          <a:solidFill>
+            <a:schemeClr val="bg1">
+              <a:lumMod val="75000"/>
+            </a:schemeClr>
+          </a:solidFill>
+          <a:ln>
+            <a:solidFill>
+              <a:schemeClr val="tx1"/>
+            </a:solidFill>
+          </a:ln>
+        </p:spPr>
+        <p:txBody>
+          <a:bodyPr wrap="square" rtlCol="0">
+            <a:spAutoFit/>
+          </a:bodyPr>
+          <a:lstStyle/>
+          <a:p>
+            <a:r>
+              <a:rPr lang="fr-FR" dirty="0" err="1" smtClean="0">
+                <a:latin typeface="Courier New" panose="02070309020205020404" pitchFamily="49" charset="0"/>
+                <a:cs typeface="Courier New" panose="02070309020205020404" pitchFamily="49" charset="0"/>
+              </a:rPr>
+              <a:t>array</a:t>
+            </a:r>
+            <a:r>
+              <a:rPr lang="fr-FR" dirty="0" smtClean="0">
+                <a:latin typeface="Courier New" panose="02070309020205020404" pitchFamily="49" charset="0"/>
+                <a:cs typeface="Courier New" panose="02070309020205020404" pitchFamily="49" charset="0"/>
+              </a:rPr>
+              <a:t>&lt;</a:t>
+            </a:r>
+            <a:r>
+              <a:rPr lang="fr-FR" dirty="0" err="1" smtClean="0">
+                <a:latin typeface="Courier New" panose="02070309020205020404" pitchFamily="49" charset="0"/>
+                <a:cs typeface="Courier New" panose="02070309020205020404" pitchFamily="49" charset="0"/>
+              </a:rPr>
+              <a:t>int</a:t>
+            </a:r>
+            <a:r>
+              <a:rPr lang="fr-FR" dirty="0" smtClean="0">
+                <a:latin typeface="Courier New" panose="02070309020205020404" pitchFamily="49" charset="0"/>
+                <a:cs typeface="Courier New" panose="02070309020205020404" pitchFamily="49" charset="0"/>
+              </a:rPr>
+              <a:t>, 10&gt; v1 {…};</a:t>
+            </a:r>
+          </a:p>
+          <a:p>
+            <a:r>
+              <a:rPr lang="fr-FR" dirty="0" err="1" smtClean="0">
+                <a:latin typeface="Courier New" panose="02070309020205020404" pitchFamily="49" charset="0"/>
+                <a:cs typeface="Courier New" panose="02070309020205020404" pitchFamily="49" charset="0"/>
+              </a:rPr>
+              <a:t>array</a:t>
+            </a:r>
+            <a:r>
+              <a:rPr lang="fr-FR" dirty="0" smtClean="0">
+                <a:latin typeface="Courier New" panose="02070309020205020404" pitchFamily="49" charset="0"/>
+                <a:cs typeface="Courier New" panose="02070309020205020404" pitchFamily="49" charset="0"/>
+              </a:rPr>
+              <a:t>&lt;</a:t>
+            </a:r>
+            <a:r>
+              <a:rPr lang="fr-FR" dirty="0" err="1" smtClean="0">
+                <a:latin typeface="Courier New" panose="02070309020205020404" pitchFamily="49" charset="0"/>
+                <a:cs typeface="Courier New" panose="02070309020205020404" pitchFamily="49" charset="0"/>
+              </a:rPr>
+              <a:t>int</a:t>
+            </a:r>
+            <a:r>
+              <a:rPr lang="fr-FR" dirty="0" smtClean="0">
+                <a:latin typeface="Courier New" panose="02070309020205020404" pitchFamily="49" charset="0"/>
+                <a:cs typeface="Courier New" panose="02070309020205020404" pitchFamily="49" charset="0"/>
+              </a:rPr>
+              <a:t>, 10&gt; v2;</a:t>
+            </a:r>
+          </a:p>
+          <a:p>
+            <a:r>
+              <a:rPr lang="fr-FR" dirty="0" err="1" smtClean="0">
+                <a:latin typeface="Courier New" panose="02070309020205020404" pitchFamily="49" charset="0"/>
+                <a:cs typeface="Courier New" panose="02070309020205020404" pitchFamily="49" charset="0"/>
+              </a:rPr>
+              <a:t>transform</a:t>
+            </a:r>
+            <a:r>
+              <a:rPr lang="fr-FR" dirty="0" smtClean="0">
+                <a:latin typeface="Courier New" panose="02070309020205020404" pitchFamily="49" charset="0"/>
+                <a:cs typeface="Courier New" panose="02070309020205020404" pitchFamily="49" charset="0"/>
+              </a:rPr>
+              <a:t>(v1a.cbegin(), v1.cend(), v2.begin(),</a:t>
+            </a:r>
+            <a:br>
+              <a:rPr lang="fr-FR" dirty="0" smtClean="0">
+                <a:latin typeface="Courier New" panose="02070309020205020404" pitchFamily="49" charset="0"/>
+                <a:cs typeface="Courier New" panose="02070309020205020404" pitchFamily="49" charset="0"/>
+              </a:rPr>
+            </a:br>
+            <a:r>
+              <a:rPr lang="fr-FR" dirty="0" smtClean="0">
+                <a:latin typeface="Courier New" panose="02070309020205020404" pitchFamily="49" charset="0"/>
+                <a:cs typeface="Courier New" panose="02070309020205020404" pitchFamily="49" charset="0"/>
+              </a:rPr>
+              <a:t>          [] (</a:t>
+            </a:r>
+            <a:r>
+              <a:rPr lang="fr-FR" dirty="0" err="1" smtClean="0">
+                <a:latin typeface="Courier New" panose="02070309020205020404" pitchFamily="49" charset="0"/>
+                <a:cs typeface="Courier New" panose="02070309020205020404" pitchFamily="49" charset="0"/>
+              </a:rPr>
+              <a:t>int</a:t>
+            </a:r>
+            <a:r>
+              <a:rPr lang="fr-FR" dirty="0" smtClean="0">
+                <a:latin typeface="Courier New" panose="02070309020205020404" pitchFamily="49" charset="0"/>
+                <a:cs typeface="Courier New" panose="02070309020205020404" pitchFamily="49" charset="0"/>
+              </a:rPr>
+              <a:t> x) { return x*x; });</a:t>
+            </a:r>
+            <a:endParaRPr lang="fr-FR" dirty="0" smtClean="0">
+              <a:latin typeface="Courier New" panose="02070309020205020404" pitchFamily="49" charset="0"/>
+              <a:cs typeface="Courier New" panose="02070309020205020404" pitchFamily="49" charset="0"/>
+            </a:endParaRPr>
+          </a:p>
+        </p:txBody>
+      </p:sp>
+      <p:sp>
+        <p:nvSpPr>
+          <p:cNvPr id="6" name="TextBox 5"/>
+          <p:cNvSpPr txBox="1"/>
+          <p:nvPr/>
+        </p:nvSpPr>
+        <p:spPr>
+          <a:xfrm>
+            <a:off x="628648" y="4410786"/>
+            <a:ext cx="7611343" cy="2308324"/>
+          </a:xfrm>
+          <a:prstGeom prst="rect">
+            <a:avLst/>
+          </a:prstGeom>
+          <a:solidFill>
+            <a:schemeClr val="bg1">
+              <a:lumMod val="75000"/>
+            </a:schemeClr>
+          </a:solidFill>
+          <a:ln>
+            <a:solidFill>
+              <a:schemeClr val="tx1"/>
+            </a:solidFill>
+          </a:ln>
+        </p:spPr>
+        <p:txBody>
+          <a:bodyPr wrap="square" rtlCol="0">
+            <a:spAutoFit/>
+          </a:bodyPr>
+          <a:lstStyle/>
+          <a:p>
+            <a:r>
+              <a:rPr lang="fr-FR" dirty="0" err="1" smtClean="0">
+                <a:latin typeface="Courier New" panose="02070309020205020404" pitchFamily="49" charset="0"/>
+                <a:cs typeface="Courier New" panose="02070309020205020404" pitchFamily="49" charset="0"/>
+              </a:rPr>
+              <a:t>array</a:t>
+            </a:r>
+            <a:r>
+              <a:rPr lang="fr-FR" dirty="0" smtClean="0">
+                <a:latin typeface="Courier New" panose="02070309020205020404" pitchFamily="49" charset="0"/>
+                <a:cs typeface="Courier New" panose="02070309020205020404" pitchFamily="49" charset="0"/>
+              </a:rPr>
+              <a:t>&lt;double, 10&gt; v1 {…};</a:t>
+            </a:r>
+          </a:p>
+          <a:p>
+            <a:r>
+              <a:rPr lang="fr-FR" dirty="0" err="1" smtClean="0">
+                <a:latin typeface="Courier New" panose="02070309020205020404" pitchFamily="49" charset="0"/>
+                <a:cs typeface="Courier New" panose="02070309020205020404" pitchFamily="49" charset="0"/>
+              </a:rPr>
+              <a:t>array</a:t>
+            </a:r>
+            <a:r>
+              <a:rPr lang="fr-FR" dirty="0" smtClean="0">
+                <a:latin typeface="Courier New" panose="02070309020205020404" pitchFamily="49" charset="0"/>
+                <a:cs typeface="Courier New" panose="02070309020205020404" pitchFamily="49" charset="0"/>
+              </a:rPr>
+              <a:t>&lt;double, 10&gt; v2 {…};</a:t>
+            </a:r>
+            <a:endParaRPr lang="fr-FR" dirty="0" smtClean="0">
+              <a:latin typeface="Courier New" panose="02070309020205020404" pitchFamily="49" charset="0"/>
+              <a:cs typeface="Courier New" panose="02070309020205020404" pitchFamily="49" charset="0"/>
+            </a:endParaRPr>
+          </a:p>
+          <a:p>
+            <a:r>
+              <a:rPr lang="fr-FR" dirty="0" err="1" smtClean="0">
+                <a:latin typeface="Courier New" panose="02070309020205020404" pitchFamily="49" charset="0"/>
+                <a:cs typeface="Courier New" panose="02070309020205020404" pitchFamily="49" charset="0"/>
+              </a:rPr>
+              <a:t>array</a:t>
+            </a:r>
+            <a:r>
+              <a:rPr lang="fr-FR" dirty="0" smtClean="0">
+                <a:latin typeface="Courier New" panose="02070309020205020404" pitchFamily="49" charset="0"/>
+                <a:cs typeface="Courier New" panose="02070309020205020404" pitchFamily="49" charset="0"/>
+              </a:rPr>
+              <a:t>&lt;double, 10&gt; v3;</a:t>
+            </a:r>
+          </a:p>
+          <a:p>
+            <a:r>
+              <a:rPr lang="fr-FR" dirty="0" err="1" smtClean="0">
+                <a:latin typeface="Courier New" panose="02070309020205020404" pitchFamily="49" charset="0"/>
+                <a:cs typeface="Courier New" panose="02070309020205020404" pitchFamily="49" charset="0"/>
+              </a:rPr>
+              <a:t>const</a:t>
+            </a:r>
+            <a:r>
+              <a:rPr lang="fr-FR" dirty="0" smtClean="0">
+                <a:latin typeface="Courier New" panose="02070309020205020404" pitchFamily="49" charset="0"/>
+                <a:cs typeface="Courier New" panose="02070309020205020404" pitchFamily="49" charset="0"/>
+              </a:rPr>
+              <a:t> double w1 {…};</a:t>
+            </a:r>
+          </a:p>
+          <a:p>
+            <a:r>
+              <a:rPr lang="fr-FR" dirty="0" err="1" smtClean="0">
+                <a:latin typeface="Courier New" panose="02070309020205020404" pitchFamily="49" charset="0"/>
+                <a:cs typeface="Courier New" panose="02070309020205020404" pitchFamily="49" charset="0"/>
+              </a:rPr>
+              <a:t>const</a:t>
+            </a:r>
+            <a:r>
+              <a:rPr lang="fr-FR" dirty="0" smtClean="0">
+                <a:latin typeface="Courier New" panose="02070309020205020404" pitchFamily="49" charset="0"/>
+                <a:cs typeface="Courier New" panose="02070309020205020404" pitchFamily="49" charset="0"/>
+              </a:rPr>
+              <a:t> double w2 {…};</a:t>
+            </a:r>
+          </a:p>
+          <a:p>
+            <a:r>
+              <a:rPr lang="fr-FR" dirty="0" err="1" smtClean="0">
+                <a:latin typeface="Courier New" panose="02070309020205020404" pitchFamily="49" charset="0"/>
+                <a:cs typeface="Courier New" panose="02070309020205020404" pitchFamily="49" charset="0"/>
+              </a:rPr>
+              <a:t>transform</a:t>
+            </a:r>
+            <a:r>
+              <a:rPr lang="fr-FR" dirty="0" smtClean="0">
+                <a:latin typeface="Courier New" panose="02070309020205020404" pitchFamily="49" charset="0"/>
+                <a:cs typeface="Courier New" panose="02070309020205020404" pitchFamily="49" charset="0"/>
+              </a:rPr>
+              <a:t>(v1.cbegin(), v1.cend(), v2.cbegin(),</a:t>
+            </a:r>
+            <a:br>
+              <a:rPr lang="fr-FR" dirty="0" smtClean="0">
+                <a:latin typeface="Courier New" panose="02070309020205020404" pitchFamily="49" charset="0"/>
+                <a:cs typeface="Courier New" panose="02070309020205020404" pitchFamily="49" charset="0"/>
+              </a:rPr>
+            </a:br>
+            <a:r>
+              <a:rPr lang="fr-FR" dirty="0" smtClean="0">
+                <a:latin typeface="Courier New" panose="02070309020205020404" pitchFamily="49" charset="0"/>
+                <a:cs typeface="Courier New" panose="02070309020205020404" pitchFamily="49" charset="0"/>
+              </a:rPr>
+              <a:t>    v3.begin(),</a:t>
+            </a:r>
+            <a:br>
+              <a:rPr lang="fr-FR" dirty="0" smtClean="0">
+                <a:latin typeface="Courier New" panose="02070309020205020404" pitchFamily="49" charset="0"/>
+                <a:cs typeface="Courier New" panose="02070309020205020404" pitchFamily="49" charset="0"/>
+              </a:rPr>
+            </a:br>
+            <a:r>
+              <a:rPr lang="fr-FR" dirty="0" smtClean="0">
+                <a:latin typeface="Courier New" panose="02070309020205020404" pitchFamily="49" charset="0"/>
+                <a:cs typeface="Courier New" panose="02070309020205020404" pitchFamily="49" charset="0"/>
+              </a:rPr>
+              <a:t>    [=] (double x, double y) { return w1*x + w2*y; });</a:t>
+            </a:r>
+            <a:endParaRPr lang="fr-FR" dirty="0" smtClean="0">
+              <a:latin typeface="Courier New" panose="02070309020205020404" pitchFamily="49" charset="0"/>
+              <a:cs typeface="Courier New" panose="02070309020205020404" pitchFamily="49" charset="0"/>
+            </a:endParaRPr>
+          </a:p>
+        </p:txBody>
+      </p:sp>
+      <p:sp>
+        <p:nvSpPr>
+          <p:cNvPr id="7" name="TextBox 6"/>
+          <p:cNvSpPr txBox="1"/>
+          <p:nvPr/>
+        </p:nvSpPr>
+        <p:spPr>
+          <a:xfrm>
+            <a:off x="4917800" y="4031216"/>
+            <a:ext cx="3991798" cy="830997"/>
+          </a:xfrm>
+          <a:prstGeom prst="rect">
+            <a:avLst/>
+          </a:prstGeom>
+          <a:solidFill>
+            <a:schemeClr val="bg1"/>
+          </a:solidFill>
+          <a:ln>
+            <a:solidFill>
+              <a:schemeClr val="tx1"/>
+            </a:solidFill>
+          </a:ln>
+        </p:spPr>
+        <p:txBody>
+          <a:bodyPr wrap="none" rtlCol="0">
+            <a:spAutoFit/>
+          </a:bodyPr>
+          <a:lstStyle/>
+          <a:p>
+            <a:r>
+              <a:rPr lang="en-US" sz="2400" dirty="0"/>
+              <a:t>Similar: </a:t>
+            </a:r>
+            <a:r>
+              <a:rPr lang="en-US" sz="2400" dirty="0" err="1" smtClean="0">
+                <a:latin typeface="Courier New" panose="02070309020205020404" pitchFamily="49" charset="0"/>
+                <a:cs typeface="Courier New" panose="02070309020205020404" pitchFamily="49" charset="0"/>
+              </a:rPr>
+              <a:t>foreach</a:t>
+            </a:r>
+            <a:r>
+              <a:rPr lang="en-US" sz="2400" dirty="0" smtClean="0"/>
+              <a:t>, </a:t>
+            </a:r>
+            <a:r>
+              <a:rPr lang="en-US" sz="2400" dirty="0" smtClean="0">
+                <a:latin typeface="Courier New" panose="02070309020205020404" pitchFamily="49" charset="0"/>
+                <a:cs typeface="Courier New" panose="02070309020205020404" pitchFamily="49" charset="0"/>
+              </a:rPr>
+              <a:t>replace</a:t>
+            </a:r>
+            <a:r>
+              <a:rPr lang="en-US" sz="2400" dirty="0" smtClean="0">
+                <a:cs typeface="Courier New" panose="02070309020205020404" pitchFamily="49" charset="0"/>
+              </a:rPr>
+              <a:t>,</a:t>
+            </a:r>
+            <a:br>
+              <a:rPr lang="en-US" sz="2400" dirty="0" smtClean="0">
+                <a:cs typeface="Courier New" panose="02070309020205020404" pitchFamily="49" charset="0"/>
+              </a:rPr>
+            </a:br>
+            <a:r>
+              <a:rPr lang="en-US" sz="2400" dirty="0" smtClean="0">
+                <a:cs typeface="Courier New" panose="02070309020205020404" pitchFamily="49" charset="0"/>
+              </a:rPr>
+              <a:t>               </a:t>
+            </a:r>
+            <a:r>
+              <a:rPr lang="en-US" sz="2400" dirty="0" err="1" smtClean="0">
+                <a:latin typeface="Courier New" panose="02070309020205020404" pitchFamily="49" charset="0"/>
+                <a:cs typeface="Courier New" panose="02070309020205020404" pitchFamily="49" charset="0"/>
+              </a:rPr>
+              <a:t>replace_if</a:t>
+            </a:r>
+            <a:r>
+              <a:rPr lang="en-US" sz="2400" dirty="0"/>
+              <a:t>, …</a:t>
+            </a:r>
+          </a:p>
+        </p:txBody>
+      </p:sp>
     </p:spTree>
     <p:extLst>
       <p:ext uri="{BB962C8B-B14F-4D97-AF65-F5344CB8AC3E}">
-        <p14:creationId xmlns:p14="http://schemas.microsoft.com/office/powerpoint/2010/main" val="3233369179"/>
+        <p14:creationId xmlns:p14="http://schemas.microsoft.com/office/powerpoint/2010/main" val="3262387312"/>
       </p:ext>
     </p:extLst>
   </p:cSld>
@@ -6768,9 +8155,238 @@
   <p:timing>
     <p:tnLst>
       <p:par>
-        <p:cTn id="1" dur="indefinite" restart="never" nodeType="tmRoot"/>
+        <p:cTn id="1" dur="indefinite" restart="never" nodeType="tmRoot">
+          <p:childTnLst>
+            <p:seq concurrent="1" nextAc="seek">
+              <p:cTn id="2" dur="indefinite" nodeType="mainSeq">
+                <p:childTnLst>
+                  <p:par>
+                    <p:cTn id="3" fill="hold">
+                      <p:stCondLst>
+                        <p:cond delay="indefinite"/>
+                        <p:cond evt="onBegin" delay="0">
+                          <p:tn val="2"/>
+                        </p:cond>
+                      </p:stCondLst>
+                      <p:childTnLst>
+                        <p:par>
+                          <p:cTn id="4" fill="hold">
+                            <p:stCondLst>
+                              <p:cond delay="0"/>
+                            </p:stCondLst>
+                            <p:childTnLst>
+                              <p:par>
+                                <p:cTn id="5" presetID="1" presetClass="entr" presetSubtype="0" fill="hold" grpId="0" nodeType="withEffect">
+                                  <p:stCondLst>
+                                    <p:cond delay="0"/>
+                                  </p:stCondLst>
+                                  <p:childTnLst>
+                                    <p:set>
+                                      <p:cBhvr>
+                                        <p:cTn id="6" dur="1" fill="hold">
+                                          <p:stCondLst>
+                                            <p:cond delay="0"/>
+                                          </p:stCondLst>
+                                        </p:cTn>
+                                        <p:tgtEl>
+                                          <p:spTgt spid="3">
+                                            <p:txEl>
+                                              <p:pRg st="0" end="0"/>
+                                            </p:txEl>
+                                          </p:spTgt>
+                                        </p:tgtEl>
+                                        <p:attrNameLst>
+                                          <p:attrName>style.visibility</p:attrName>
+                                        </p:attrNameLst>
+                                      </p:cBhvr>
+                                      <p:to>
+                                        <p:strVal val="visible"/>
+                                      </p:to>
+                                    </p:set>
+                                  </p:childTnLst>
+                                </p:cTn>
+                              </p:par>
+                              <p:par>
+                                <p:cTn id="7" presetID="1" presetClass="entr" presetSubtype="0" fill="hold" grpId="0" nodeType="withEffect">
+                                  <p:stCondLst>
+                                    <p:cond delay="0"/>
+                                  </p:stCondLst>
+                                  <p:childTnLst>
+                                    <p:set>
+                                      <p:cBhvr>
+                                        <p:cTn id="8" dur="1" fill="hold">
+                                          <p:stCondLst>
+                                            <p:cond delay="0"/>
+                                          </p:stCondLst>
+                                        </p:cTn>
+                                        <p:tgtEl>
+                                          <p:spTgt spid="5"/>
+                                        </p:tgtEl>
+                                        <p:attrNameLst>
+                                          <p:attrName>style.visibility</p:attrName>
+                                        </p:attrNameLst>
+                                      </p:cBhvr>
+                                      <p:to>
+                                        <p:strVal val="visible"/>
+                                      </p:to>
+                                    </p:set>
+                                  </p:childTnLst>
+                                </p:cTn>
+                              </p:par>
+                            </p:childTnLst>
+                          </p:cTn>
+                        </p:par>
+                      </p:childTnLst>
+                    </p:cTn>
+                  </p:par>
+                  <p:par>
+                    <p:cTn id="9" fill="hold">
+                      <p:stCondLst>
+                        <p:cond delay="indefinite"/>
+                      </p:stCondLst>
+                      <p:childTnLst>
+                        <p:par>
+                          <p:cTn id="10" fill="hold">
+                            <p:stCondLst>
+                              <p:cond delay="0"/>
+                            </p:stCondLst>
+                            <p:childTnLst>
+                              <p:par>
+                                <p:cTn id="11" presetID="1" presetClass="entr" presetSubtype="0" fill="hold" grpId="0" nodeType="clickEffect">
+                                  <p:stCondLst>
+                                    <p:cond delay="0"/>
+                                  </p:stCondLst>
+                                  <p:childTnLst>
+                                    <p:set>
+                                      <p:cBhvr>
+                                        <p:cTn id="12" dur="1" fill="hold">
+                                          <p:stCondLst>
+                                            <p:cond delay="0"/>
+                                          </p:stCondLst>
+                                        </p:cTn>
+                                        <p:tgtEl>
+                                          <p:spTgt spid="3">
+                                            <p:txEl>
+                                              <p:pRg st="4" end="4"/>
+                                            </p:txEl>
+                                          </p:spTgt>
+                                        </p:tgtEl>
+                                        <p:attrNameLst>
+                                          <p:attrName>style.visibility</p:attrName>
+                                        </p:attrNameLst>
+                                      </p:cBhvr>
+                                      <p:to>
+                                        <p:strVal val="visible"/>
+                                      </p:to>
+                                    </p:set>
+                                  </p:childTnLst>
+                                </p:cTn>
+                              </p:par>
+                              <p:par>
+                                <p:cTn id="13" presetID="1" presetClass="entr" presetSubtype="0" fill="hold" grpId="0" nodeType="withEffect">
+                                  <p:stCondLst>
+                                    <p:cond delay="0"/>
+                                  </p:stCondLst>
+                                  <p:childTnLst>
+                                    <p:set>
+                                      <p:cBhvr>
+                                        <p:cTn id="14" dur="1" fill="hold">
+                                          <p:stCondLst>
+                                            <p:cond delay="0"/>
+                                          </p:stCondLst>
+                                        </p:cTn>
+                                        <p:tgtEl>
+                                          <p:spTgt spid="6"/>
+                                        </p:tgtEl>
+                                        <p:attrNameLst>
+                                          <p:attrName>style.visibility</p:attrName>
+                                        </p:attrNameLst>
+                                      </p:cBhvr>
+                                      <p:to>
+                                        <p:strVal val="visible"/>
+                                      </p:to>
+                                    </p:set>
+                                  </p:childTnLst>
+                                </p:cTn>
+                              </p:par>
+                            </p:childTnLst>
+                          </p:cTn>
+                        </p:par>
+                      </p:childTnLst>
+                    </p:cTn>
+                  </p:par>
+                  <p:par>
+                    <p:cTn id="15" fill="hold">
+                      <p:stCondLst>
+                        <p:cond delay="indefinite"/>
+                      </p:stCondLst>
+                      <p:childTnLst>
+                        <p:par>
+                          <p:cTn id="16" fill="hold">
+                            <p:stCondLst>
+                              <p:cond delay="0"/>
+                            </p:stCondLst>
+                            <p:childTnLst>
+                              <p:par>
+                                <p:cTn id="17" presetID="1" presetClass="entr" presetSubtype="0" fill="hold" grpId="0" nodeType="clickEffect">
+                                  <p:stCondLst>
+                                    <p:cond delay="0"/>
+                                  </p:stCondLst>
+                                  <p:childTnLst>
+                                    <p:set>
+                                      <p:cBhvr>
+                                        <p:cTn id="18" dur="1" fill="hold">
+                                          <p:stCondLst>
+                                            <p:cond delay="0"/>
+                                          </p:stCondLst>
+                                        </p:cTn>
+                                        <p:tgtEl>
+                                          <p:spTgt spid="7"/>
+                                        </p:tgtEl>
+                                        <p:attrNameLst>
+                                          <p:attrName>style.visibility</p:attrName>
+                                        </p:attrNameLst>
+                                      </p:cBhvr>
+                                      <p:to>
+                                        <p:strVal val="visible"/>
+                                      </p:to>
+                                    </p:set>
+                                  </p:childTnLst>
+                                </p:cTn>
+                              </p:par>
+                            </p:childTnLst>
+                          </p:cTn>
+                        </p:par>
+                      </p:childTnLst>
+                    </p:cTn>
+                  </p:par>
+                </p:childTnLst>
+              </p:cTn>
+              <p:prevCondLst>
+                <p:cond evt="onPrev" delay="0">
+                  <p:tgtEl>
+                    <p:sldTgt/>
+                  </p:tgtEl>
+                </p:cond>
+              </p:prevCondLst>
+              <p:nextCondLst>
+                <p:cond evt="onNext" delay="0">
+                  <p:tgtEl>
+                    <p:sldTgt/>
+                  </p:tgtEl>
+                </p:cond>
+              </p:nextCondLst>
+            </p:seq>
+          </p:childTnLst>
+        </p:cTn>
       </p:par>
     </p:tnLst>
+    <p:bldLst>
+      <p:bldP spid="3" grpId="0" uiExpand="1" build="p"/>
+      <p:bldP spid="5" grpId="0" animBg="1"/>
+      <p:bldP spid="6" grpId="0" animBg="1"/>
+      <p:bldP spid="7" grpId="0" animBg="1"/>
+    </p:bldLst>
   </p:timing>
 </p:sld>
 </file>
@@ -6809,7 +8425,7 @@
           <a:p>
             <a:r>
               <a:rPr lang="en-US" dirty="0" smtClean="0"/>
-              <a:t>References</a:t>
+              <a:t>Other algorithms</a:t>
             </a:r>
             <a:endParaRPr lang="en-US" dirty="0"/>
           </a:p>
@@ -6828,80 +8444,165 @@
         <p:spPr/>
         <p:txBody>
           <a:bodyPr>
-            <a:normAutofit/>
+            <a:normAutofit fontScale="92500"/>
           </a:bodyPr>
           <a:lstStyle/>
           <a:p>
             <a:r>
-              <a:rPr lang="en-US" dirty="0"/>
-              <a:t>Introduction to </a:t>
+              <a:rPr lang="en-US" dirty="0" err="1" smtClean="0">
+                <a:latin typeface="Courier New" panose="02070309020205020404" pitchFamily="49" charset="0"/>
+                <a:cs typeface="Courier New" panose="02070309020205020404" pitchFamily="49" charset="0"/>
+              </a:rPr>
+              <a:t>all_of</a:t>
             </a:r>
             <a:r>
               <a:rPr lang="en-US" dirty="0" smtClean="0"/>
-              <a:t>algorithms</a:t>
-            </a:r>
-            <a:br>
+              <a:t>, </a:t>
+            </a:r>
+            <a:r>
+              <a:rPr lang="en-US" dirty="0" err="1" smtClean="0">
+                <a:latin typeface="Courier New" panose="02070309020205020404" pitchFamily="49" charset="0"/>
+                <a:cs typeface="Courier New" panose="02070309020205020404" pitchFamily="49" charset="0"/>
+              </a:rPr>
+              <a:t>any_of</a:t>
+            </a:r>
+            <a:r>
               <a:rPr lang="en-US" dirty="0" smtClean="0"/>
-            </a:br>
+              <a:t>, </a:t>
+            </a:r>
+            <a:r>
+              <a:rPr lang="en-US" dirty="0" err="1" smtClean="0">
+                <a:latin typeface="Courier New" panose="02070309020205020404" pitchFamily="49" charset="0"/>
+                <a:cs typeface="Courier New" panose="02070309020205020404" pitchFamily="49" charset="0"/>
+              </a:rPr>
+              <a:t>none_of</a:t>
+            </a:r>
             <a:r>
               <a:rPr lang="en-US" dirty="0" smtClean="0"/>
-              <a:t>Thomas </a:t>
-            </a:r>
-            <a:r>
-              <a:rPr lang="en-US" dirty="0"/>
-              <a:t>H. </a:t>
-            </a:r>
-            <a:r>
-              <a:rPr lang="en-US" dirty="0" err="1"/>
-              <a:t>Cromen</a:t>
-            </a:r>
-            <a:r>
-              <a:rPr lang="en-US" dirty="0"/>
-              <a:t>, Charles E. </a:t>
-            </a:r>
-            <a:r>
-              <a:rPr lang="en-US" dirty="0" err="1"/>
-              <a:t>Leiserson</a:t>
-            </a:r>
-            <a:r>
-              <a:rPr lang="en-US" dirty="0"/>
-              <a:t>, Ronald L. </a:t>
-            </a:r>
-            <a:r>
-              <a:rPr lang="en-US" dirty="0" err="1" smtClean="0"/>
-              <a:t>Rivest</a:t>
-            </a:r>
-            <a:r>
-              <a:rPr lang="en-US" dirty="0"/>
-              <a:t> </a:t>
+              <a:t>: check predicate on collection</a:t>
+            </a:r>
+          </a:p>
+          <a:p>
+            <a:r>
+              <a:rPr lang="en-US" dirty="0" smtClean="0">
+                <a:latin typeface="Courier New" panose="02070309020205020404" pitchFamily="49" charset="0"/>
+                <a:cs typeface="Courier New" panose="02070309020205020404" pitchFamily="49" charset="0"/>
+              </a:rPr>
+              <a:t>mismatch</a:t>
             </a:r>
             <a:r>
               <a:rPr lang="en-US" dirty="0" smtClean="0"/>
-              <a:t>and </a:t>
-            </a:r>
-            <a:r>
-              <a:rPr lang="en-US" dirty="0"/>
-              <a:t>Clifford </a:t>
+              <a:t>: find position where sequences differ</a:t>
+            </a:r>
+          </a:p>
+          <a:p>
+            <a:r>
+              <a:rPr lang="en-US" dirty="0" smtClean="0">
+                <a:latin typeface="Courier New" panose="02070309020205020404" pitchFamily="49" charset="0"/>
+                <a:cs typeface="Courier New" panose="02070309020205020404" pitchFamily="49" charset="0"/>
+              </a:rPr>
+              <a:t>equal</a:t>
             </a:r>
             <a:r>
               <a:rPr lang="en-US" dirty="0" smtClean="0"/>
-              <a:t>Stein</a:t>
-            </a:r>
-            <a:br>
+              <a:t>: check equality of sequences</a:t>
+            </a:r>
+          </a:p>
+          <a:p>
+            <a:r>
+              <a:rPr lang="en-US" dirty="0" smtClean="0">
+                <a:latin typeface="Courier New" panose="02070309020205020404" pitchFamily="49" charset="0"/>
+                <a:cs typeface="Courier New" panose="02070309020205020404" pitchFamily="49" charset="0"/>
+              </a:rPr>
+              <a:t>copy</a:t>
+            </a:r>
+            <a:r>
               <a:rPr lang="en-US" dirty="0" smtClean="0"/>
-            </a:br>
+              <a:t>, </a:t>
+            </a:r>
+            <a:r>
+              <a:rPr lang="en-US" dirty="0" smtClean="0">
+                <a:latin typeface="Courier New" panose="02070309020205020404" pitchFamily="49" charset="0"/>
+                <a:cs typeface="Courier New" panose="02070309020205020404" pitchFamily="49" charset="0"/>
+              </a:rPr>
+              <a:t>move</a:t>
+            </a:r>
             <a:r>
               <a:rPr lang="en-US" dirty="0" smtClean="0"/>
-              <a:t>MIT </a:t>
-            </a:r>
-            <a:r>
-              <a:rPr lang="en-US" dirty="0"/>
-              <a:t>Press, 2009 (3rd edition</a:t>
+              <a:t>: copy, move sequence to other sequence</a:t>
+            </a:r>
+          </a:p>
+          <a:p>
+            <a:r>
+              <a:rPr lang="en-US" dirty="0" smtClean="0">
+                <a:latin typeface="Courier New" panose="02070309020205020404" pitchFamily="49" charset="0"/>
+                <a:cs typeface="Courier New" panose="02070309020205020404" pitchFamily="49" charset="0"/>
+              </a:rPr>
+              <a:t>remove</a:t>
             </a:r>
             <a:r>
               <a:rPr lang="en-US" dirty="0" smtClean="0"/>
-              <a:t>)</a:t>
-            </a:r>
+              <a:t>, </a:t>
+            </a:r>
+            <a:r>
+              <a:rPr lang="en-US" dirty="0" err="1" smtClean="0">
+                <a:latin typeface="Courier New" panose="02070309020205020404" pitchFamily="49" charset="0"/>
+                <a:cs typeface="Courier New" panose="02070309020205020404" pitchFamily="49" charset="0"/>
+              </a:rPr>
+              <a:t>remove_if</a:t>
+            </a:r>
+            <a:r>
+              <a:rPr lang="en-US" dirty="0" smtClean="0"/>
+              <a:t>: remove elements</a:t>
+            </a:r>
+          </a:p>
+          <a:p>
+            <a:r>
+              <a:rPr lang="en-US" dirty="0" smtClean="0">
+                <a:latin typeface="Courier New" panose="02070309020205020404" pitchFamily="49" charset="0"/>
+                <a:cs typeface="Courier New" panose="02070309020205020404" pitchFamily="49" charset="0"/>
+              </a:rPr>
+              <a:t>shuffle</a:t>
+            </a:r>
+            <a:r>
+              <a:rPr lang="en-US" dirty="0" smtClean="0"/>
+              <a:t>: random shuffle sequence</a:t>
+            </a:r>
+          </a:p>
+          <a:p>
+            <a:r>
+              <a:rPr lang="en-US" dirty="0" smtClean="0">
+                <a:latin typeface="Courier New" panose="02070309020205020404" pitchFamily="49" charset="0"/>
+                <a:cs typeface="Courier New" panose="02070309020205020404" pitchFamily="49" charset="0"/>
+              </a:rPr>
+              <a:t>accumulate</a:t>
+            </a:r>
+            <a:r>
+              <a:rPr lang="en-US" dirty="0" smtClean="0"/>
+              <a:t>, </a:t>
+            </a:r>
+            <a:r>
+              <a:rPr lang="en-US" dirty="0" err="1" smtClean="0">
+                <a:latin typeface="Courier New" panose="02070309020205020404" pitchFamily="49" charset="0"/>
+                <a:cs typeface="Courier New" panose="02070309020205020404" pitchFamily="49" charset="0"/>
+              </a:rPr>
+              <a:t>inner_product</a:t>
+            </a:r>
+            <a:endParaRPr lang="en-US" dirty="0" smtClean="0">
+              <a:latin typeface="Courier New" panose="02070309020205020404" pitchFamily="49" charset="0"/>
+              <a:cs typeface="Courier New" panose="02070309020205020404" pitchFamily="49" charset="0"/>
+            </a:endParaRPr>
+          </a:p>
+          <a:p>
+            <a:r>
+              <a:rPr lang="en-US" dirty="0" smtClean="0">
+                <a:cs typeface="Courier New" panose="02070309020205020404" pitchFamily="49" charset="0"/>
+              </a:rPr>
+              <a:t>many more, even more in C++17!</a:t>
+            </a:r>
+            <a:endParaRPr lang="en-US" dirty="0">
+              <a:cs typeface="Courier New" panose="02070309020205020404" pitchFamily="49" charset="0"/>
+            </a:endParaRPr>
           </a:p>
         </p:txBody>
       </p:sp>
@@ -6931,7 +8632,564 @@
     </p:spTree>
     <p:extLst>
       <p:ext uri="{BB962C8B-B14F-4D97-AF65-F5344CB8AC3E}">
-        <p14:creationId xmlns:p14="http://schemas.microsoft.com/office/powerpoint/2010/main" val="1571435006"/>
+        <p14:creationId xmlns:p14="http://schemas.microsoft.com/office/powerpoint/2010/main" val="3281963081"/>
+      </p:ext>
+    </p:extLst>
+  </p:cSld>
+  <p:clrMapOvr>
+    <a:masterClrMapping/>
+  </p:clrMapOvr>
+  <p:timing>
+    <p:tnLst>
+      <p:par>
+        <p:cTn id="1" dur="indefinite" restart="never" nodeType="tmRoot">
+          <p:childTnLst>
+            <p:seq concurrent="1" nextAc="seek">
+              <p:cTn id="2" dur="indefinite" nodeType="mainSeq">
+                <p:childTnLst>
+                  <p:par>
+                    <p:cTn id="3" fill="hold">
+                      <p:stCondLst>
+                        <p:cond delay="indefinite"/>
+                        <p:cond evt="onBegin" delay="0">
+                          <p:tn val="2"/>
+                        </p:cond>
+                      </p:stCondLst>
+                      <p:childTnLst>
+                        <p:par>
+                          <p:cTn id="4" fill="hold">
+                            <p:stCondLst>
+                              <p:cond delay="0"/>
+                            </p:stCondLst>
+                            <p:childTnLst>
+                              <p:par>
+                                <p:cTn id="5" presetID="1" presetClass="entr" presetSubtype="0" fill="hold" grpId="0" nodeType="withEffect">
+                                  <p:stCondLst>
+                                    <p:cond delay="0"/>
+                                  </p:stCondLst>
+                                  <p:childTnLst>
+                                    <p:set>
+                                      <p:cBhvr>
+                                        <p:cTn id="6" dur="1" fill="hold">
+                                          <p:stCondLst>
+                                            <p:cond delay="0"/>
+                                          </p:stCondLst>
+                                        </p:cTn>
+                                        <p:tgtEl>
+                                          <p:spTgt spid="3">
+                                            <p:txEl>
+                                              <p:pRg st="0" end="0"/>
+                                            </p:txEl>
+                                          </p:spTgt>
+                                        </p:tgtEl>
+                                        <p:attrNameLst>
+                                          <p:attrName>style.visibility</p:attrName>
+                                        </p:attrNameLst>
+                                      </p:cBhvr>
+                                      <p:to>
+                                        <p:strVal val="visible"/>
+                                      </p:to>
+                                    </p:set>
+                                  </p:childTnLst>
+                                </p:cTn>
+                              </p:par>
+                            </p:childTnLst>
+                          </p:cTn>
+                        </p:par>
+                      </p:childTnLst>
+                    </p:cTn>
+                  </p:par>
+                  <p:par>
+                    <p:cTn id="7" fill="hold">
+                      <p:stCondLst>
+                        <p:cond delay="indefinite"/>
+                      </p:stCondLst>
+                      <p:childTnLst>
+                        <p:par>
+                          <p:cTn id="8" fill="hold">
+                            <p:stCondLst>
+                              <p:cond delay="0"/>
+                            </p:stCondLst>
+                            <p:childTnLst>
+                              <p:par>
+                                <p:cTn id="9" presetID="1" presetClass="entr" presetSubtype="0" fill="hold" grpId="0" nodeType="clickEffect">
+                                  <p:stCondLst>
+                                    <p:cond delay="0"/>
+                                  </p:stCondLst>
+                                  <p:childTnLst>
+                                    <p:set>
+                                      <p:cBhvr>
+                                        <p:cTn id="10" dur="1" fill="hold">
+                                          <p:stCondLst>
+                                            <p:cond delay="0"/>
+                                          </p:stCondLst>
+                                        </p:cTn>
+                                        <p:tgtEl>
+                                          <p:spTgt spid="3">
+                                            <p:txEl>
+                                              <p:pRg st="1" end="1"/>
+                                            </p:txEl>
+                                          </p:spTgt>
+                                        </p:tgtEl>
+                                        <p:attrNameLst>
+                                          <p:attrName>style.visibility</p:attrName>
+                                        </p:attrNameLst>
+                                      </p:cBhvr>
+                                      <p:to>
+                                        <p:strVal val="visible"/>
+                                      </p:to>
+                                    </p:set>
+                                  </p:childTnLst>
+                                </p:cTn>
+                              </p:par>
+                            </p:childTnLst>
+                          </p:cTn>
+                        </p:par>
+                      </p:childTnLst>
+                    </p:cTn>
+                  </p:par>
+                  <p:par>
+                    <p:cTn id="11" fill="hold">
+                      <p:stCondLst>
+                        <p:cond delay="indefinite"/>
+                      </p:stCondLst>
+                      <p:childTnLst>
+                        <p:par>
+                          <p:cTn id="12" fill="hold">
+                            <p:stCondLst>
+                              <p:cond delay="0"/>
+                            </p:stCondLst>
+                            <p:childTnLst>
+                              <p:par>
+                                <p:cTn id="13" presetID="1" presetClass="entr" presetSubtype="0" fill="hold" grpId="0" nodeType="clickEffect">
+                                  <p:stCondLst>
+                                    <p:cond delay="0"/>
+                                  </p:stCondLst>
+                                  <p:childTnLst>
+                                    <p:set>
+                                      <p:cBhvr>
+                                        <p:cTn id="14" dur="1" fill="hold">
+                                          <p:stCondLst>
+                                            <p:cond delay="0"/>
+                                          </p:stCondLst>
+                                        </p:cTn>
+                                        <p:tgtEl>
+                                          <p:spTgt spid="3">
+                                            <p:txEl>
+                                              <p:pRg st="2" end="2"/>
+                                            </p:txEl>
+                                          </p:spTgt>
+                                        </p:tgtEl>
+                                        <p:attrNameLst>
+                                          <p:attrName>style.visibility</p:attrName>
+                                        </p:attrNameLst>
+                                      </p:cBhvr>
+                                      <p:to>
+                                        <p:strVal val="visible"/>
+                                      </p:to>
+                                    </p:set>
+                                  </p:childTnLst>
+                                </p:cTn>
+                              </p:par>
+                            </p:childTnLst>
+                          </p:cTn>
+                        </p:par>
+                      </p:childTnLst>
+                    </p:cTn>
+                  </p:par>
+                  <p:par>
+                    <p:cTn id="15" fill="hold">
+                      <p:stCondLst>
+                        <p:cond delay="indefinite"/>
+                      </p:stCondLst>
+                      <p:childTnLst>
+                        <p:par>
+                          <p:cTn id="16" fill="hold">
+                            <p:stCondLst>
+                              <p:cond delay="0"/>
+                            </p:stCondLst>
+                            <p:childTnLst>
+                              <p:par>
+                                <p:cTn id="17" presetID="1" presetClass="entr" presetSubtype="0" fill="hold" grpId="0" nodeType="clickEffect">
+                                  <p:stCondLst>
+                                    <p:cond delay="0"/>
+                                  </p:stCondLst>
+                                  <p:childTnLst>
+                                    <p:set>
+                                      <p:cBhvr>
+                                        <p:cTn id="18" dur="1" fill="hold">
+                                          <p:stCondLst>
+                                            <p:cond delay="0"/>
+                                          </p:stCondLst>
+                                        </p:cTn>
+                                        <p:tgtEl>
+                                          <p:spTgt spid="3">
+                                            <p:txEl>
+                                              <p:pRg st="3" end="3"/>
+                                            </p:txEl>
+                                          </p:spTgt>
+                                        </p:tgtEl>
+                                        <p:attrNameLst>
+                                          <p:attrName>style.visibility</p:attrName>
+                                        </p:attrNameLst>
+                                      </p:cBhvr>
+                                      <p:to>
+                                        <p:strVal val="visible"/>
+                                      </p:to>
+                                    </p:set>
+                                  </p:childTnLst>
+                                </p:cTn>
+                              </p:par>
+                            </p:childTnLst>
+                          </p:cTn>
+                        </p:par>
+                      </p:childTnLst>
+                    </p:cTn>
+                  </p:par>
+                  <p:par>
+                    <p:cTn id="19" fill="hold">
+                      <p:stCondLst>
+                        <p:cond delay="indefinite"/>
+                      </p:stCondLst>
+                      <p:childTnLst>
+                        <p:par>
+                          <p:cTn id="20" fill="hold">
+                            <p:stCondLst>
+                              <p:cond delay="0"/>
+                            </p:stCondLst>
+                            <p:childTnLst>
+                              <p:par>
+                                <p:cTn id="21" presetID="1" presetClass="entr" presetSubtype="0" fill="hold" grpId="0" nodeType="clickEffect">
+                                  <p:stCondLst>
+                                    <p:cond delay="0"/>
+                                  </p:stCondLst>
+                                  <p:childTnLst>
+                                    <p:set>
+                                      <p:cBhvr>
+                                        <p:cTn id="22" dur="1" fill="hold">
+                                          <p:stCondLst>
+                                            <p:cond delay="0"/>
+                                          </p:stCondLst>
+                                        </p:cTn>
+                                        <p:tgtEl>
+                                          <p:spTgt spid="3">
+                                            <p:txEl>
+                                              <p:pRg st="4" end="4"/>
+                                            </p:txEl>
+                                          </p:spTgt>
+                                        </p:tgtEl>
+                                        <p:attrNameLst>
+                                          <p:attrName>style.visibility</p:attrName>
+                                        </p:attrNameLst>
+                                      </p:cBhvr>
+                                      <p:to>
+                                        <p:strVal val="visible"/>
+                                      </p:to>
+                                    </p:set>
+                                  </p:childTnLst>
+                                </p:cTn>
+                              </p:par>
+                            </p:childTnLst>
+                          </p:cTn>
+                        </p:par>
+                      </p:childTnLst>
+                    </p:cTn>
+                  </p:par>
+                  <p:par>
+                    <p:cTn id="23" fill="hold">
+                      <p:stCondLst>
+                        <p:cond delay="indefinite"/>
+                      </p:stCondLst>
+                      <p:childTnLst>
+                        <p:par>
+                          <p:cTn id="24" fill="hold">
+                            <p:stCondLst>
+                              <p:cond delay="0"/>
+                            </p:stCondLst>
+                            <p:childTnLst>
+                              <p:par>
+                                <p:cTn id="25" presetID="1" presetClass="entr" presetSubtype="0" fill="hold" grpId="0" nodeType="clickEffect">
+                                  <p:stCondLst>
+                                    <p:cond delay="0"/>
+                                  </p:stCondLst>
+                                  <p:childTnLst>
+                                    <p:set>
+                                      <p:cBhvr>
+                                        <p:cTn id="26" dur="1" fill="hold">
+                                          <p:stCondLst>
+                                            <p:cond delay="0"/>
+                                          </p:stCondLst>
+                                        </p:cTn>
+                                        <p:tgtEl>
+                                          <p:spTgt spid="3">
+                                            <p:txEl>
+                                              <p:pRg st="5" end="5"/>
+                                            </p:txEl>
+                                          </p:spTgt>
+                                        </p:tgtEl>
+                                        <p:attrNameLst>
+                                          <p:attrName>style.visibility</p:attrName>
+                                        </p:attrNameLst>
+                                      </p:cBhvr>
+                                      <p:to>
+                                        <p:strVal val="visible"/>
+                                      </p:to>
+                                    </p:set>
+                                  </p:childTnLst>
+                                </p:cTn>
+                              </p:par>
+                            </p:childTnLst>
+                          </p:cTn>
+                        </p:par>
+                      </p:childTnLst>
+                    </p:cTn>
+                  </p:par>
+                  <p:par>
+                    <p:cTn id="27" fill="hold">
+                      <p:stCondLst>
+                        <p:cond delay="indefinite"/>
+                      </p:stCondLst>
+                      <p:childTnLst>
+                        <p:par>
+                          <p:cTn id="28" fill="hold">
+                            <p:stCondLst>
+                              <p:cond delay="0"/>
+                            </p:stCondLst>
+                            <p:childTnLst>
+                              <p:par>
+                                <p:cTn id="29" presetID="1" presetClass="entr" presetSubtype="0" fill="hold" grpId="0" nodeType="clickEffect">
+                                  <p:stCondLst>
+                                    <p:cond delay="0"/>
+                                  </p:stCondLst>
+                                  <p:childTnLst>
+                                    <p:set>
+                                      <p:cBhvr>
+                                        <p:cTn id="30" dur="1" fill="hold">
+                                          <p:stCondLst>
+                                            <p:cond delay="0"/>
+                                          </p:stCondLst>
+                                        </p:cTn>
+                                        <p:tgtEl>
+                                          <p:spTgt spid="3">
+                                            <p:txEl>
+                                              <p:pRg st="6" end="6"/>
+                                            </p:txEl>
+                                          </p:spTgt>
+                                        </p:tgtEl>
+                                        <p:attrNameLst>
+                                          <p:attrName>style.visibility</p:attrName>
+                                        </p:attrNameLst>
+                                      </p:cBhvr>
+                                      <p:to>
+                                        <p:strVal val="visible"/>
+                                      </p:to>
+                                    </p:set>
+                                  </p:childTnLst>
+                                </p:cTn>
+                              </p:par>
+                            </p:childTnLst>
+                          </p:cTn>
+                        </p:par>
+                      </p:childTnLst>
+                    </p:cTn>
+                  </p:par>
+                  <p:par>
+                    <p:cTn id="31" fill="hold">
+                      <p:stCondLst>
+                        <p:cond delay="indefinite"/>
+                      </p:stCondLst>
+                      <p:childTnLst>
+                        <p:par>
+                          <p:cTn id="32" fill="hold">
+                            <p:stCondLst>
+                              <p:cond delay="0"/>
+                            </p:stCondLst>
+                            <p:childTnLst>
+                              <p:par>
+                                <p:cTn id="33" presetID="1" presetClass="entr" presetSubtype="0" fill="hold" grpId="0" nodeType="clickEffect">
+                                  <p:stCondLst>
+                                    <p:cond delay="0"/>
+                                  </p:stCondLst>
+                                  <p:childTnLst>
+                                    <p:set>
+                                      <p:cBhvr>
+                                        <p:cTn id="34" dur="1" fill="hold">
+                                          <p:stCondLst>
+                                            <p:cond delay="0"/>
+                                          </p:stCondLst>
+                                        </p:cTn>
+                                        <p:tgtEl>
+                                          <p:spTgt spid="3">
+                                            <p:txEl>
+                                              <p:pRg st="7" end="7"/>
+                                            </p:txEl>
+                                          </p:spTgt>
+                                        </p:tgtEl>
+                                        <p:attrNameLst>
+                                          <p:attrName>style.visibility</p:attrName>
+                                        </p:attrNameLst>
+                                      </p:cBhvr>
+                                      <p:to>
+                                        <p:strVal val="visible"/>
+                                      </p:to>
+                                    </p:set>
+                                  </p:childTnLst>
+                                </p:cTn>
+                              </p:par>
+                            </p:childTnLst>
+                          </p:cTn>
+                        </p:par>
+                      </p:childTnLst>
+                    </p:cTn>
+                  </p:par>
+                </p:childTnLst>
+              </p:cTn>
+              <p:prevCondLst>
+                <p:cond evt="onPrev" delay="0">
+                  <p:tgtEl>
+                    <p:sldTgt/>
+                  </p:tgtEl>
+                </p:cond>
+              </p:prevCondLst>
+              <p:nextCondLst>
+                <p:cond evt="onNext" delay="0">
+                  <p:tgtEl>
+                    <p:sldTgt/>
+                  </p:tgtEl>
+                </p:cond>
+              </p:nextCondLst>
+            </p:seq>
+          </p:childTnLst>
+        </p:cTn>
+      </p:par>
+    </p:tnLst>
+    <p:bldLst>
+      <p:bldP spid="3" grpId="0" uiExpand="1" build="p"/>
+    </p:bldLst>
+  </p:timing>
+</p:sld>
+</file>
+
+<file path=ppt/slides/slide9.xml><?xml version="1.0" encoding="utf-8"?>
+<p:sld xmlns:a="http://schemas.openxmlformats.org/drawingml/2006/main" xmlns:r="http://schemas.openxmlformats.org/officeDocument/2006/relationships" xmlns:p="http://schemas.openxmlformats.org/presentationml/2006/main">
+  <p:cSld>
+    <p:spTree>
+      <p:nvGrpSpPr>
+        <p:cNvPr id="1" name=""/>
+        <p:cNvGrpSpPr/>
+        <p:nvPr/>
+      </p:nvGrpSpPr>
+      <p:grpSpPr>
+        <a:xfrm>
+          <a:off x="0" y="0"/>
+          <a:ext cx="0" cy="0"/>
+          <a:chOff x="0" y="0"/>
+          <a:chExt cx="0" cy="0"/>
+        </a:xfrm>
+      </p:grpSpPr>
+      <p:sp>
+        <p:nvSpPr>
+          <p:cNvPr id="2" name="Title 1"/>
+          <p:cNvSpPr>
+            <a:spLocks noGrp="1"/>
+          </p:cNvSpPr>
+          <p:nvPr>
+            <p:ph type="title"/>
+          </p:nvPr>
+        </p:nvSpPr>
+        <p:spPr/>
+        <p:txBody>
+          <a:bodyPr/>
+          <a:lstStyle/>
+          <a:p>
+            <a:r>
+              <a:rPr lang="en-US" dirty="0" smtClean="0"/>
+              <a:t>What was left out/added?</a:t>
+            </a:r>
+            <a:endParaRPr lang="en-US" dirty="0"/>
+          </a:p>
+        </p:txBody>
+      </p:sp>
+      <p:sp>
+        <p:nvSpPr>
+          <p:cNvPr id="4" name="Content Placeholder 3"/>
+          <p:cNvSpPr>
+            <a:spLocks noGrp="1"/>
+          </p:cNvSpPr>
+          <p:nvPr>
+            <p:ph idx="1"/>
+          </p:nvPr>
+        </p:nvSpPr>
+        <p:spPr/>
+        <p:txBody>
+          <a:bodyPr/>
+          <a:lstStyle/>
+          <a:p>
+            <a:r>
+              <a:rPr lang="en-US" dirty="0" smtClean="0"/>
+              <a:t>Left out</a:t>
+            </a:r>
+          </a:p>
+          <a:p>
+            <a:pPr lvl="1"/>
+            <a:r>
+              <a:rPr lang="en-US" dirty="0" smtClean="0"/>
+              <a:t>stream iterators</a:t>
+            </a:r>
+          </a:p>
+          <a:p>
+            <a:pPr lvl="1"/>
+            <a:r>
+              <a:rPr lang="en-US" dirty="0" smtClean="0"/>
+              <a:t>discussion of iterator types</a:t>
+            </a:r>
+          </a:p>
+          <a:p>
+            <a:r>
+              <a:rPr lang="en-US" dirty="0" smtClean="0"/>
+              <a:t>Added</a:t>
+            </a:r>
+          </a:p>
+          <a:p>
+            <a:pPr lvl="1"/>
+            <a:r>
+              <a:rPr lang="en-US" dirty="0" smtClean="0"/>
+              <a:t>extra examples</a:t>
+            </a:r>
+            <a:endParaRPr lang="en-US" dirty="0" smtClean="0"/>
+          </a:p>
+          <a:p>
+            <a:endParaRPr lang="en-US" dirty="0"/>
+          </a:p>
+        </p:txBody>
+      </p:sp>
+      <p:sp>
+        <p:nvSpPr>
+          <p:cNvPr id="3" name="Slide Number Placeholder 2"/>
+          <p:cNvSpPr>
+            <a:spLocks noGrp="1"/>
+          </p:cNvSpPr>
+          <p:nvPr>
+            <p:ph type="sldNum" sz="quarter" idx="12"/>
+          </p:nvPr>
+        </p:nvSpPr>
+        <p:spPr/>
+        <p:txBody>
+          <a:bodyPr/>
+          <a:lstStyle/>
+          <a:p>
+            <a:fld id="{9CEF4966-5219-4577-B301-14467D565841}" type="slidenum">
+              <a:rPr lang="en-US" smtClean="0"/>
+              <a:t>9</a:t>
+            </a:fld>
+            <a:endParaRPr lang="en-US"/>
+          </a:p>
+        </p:txBody>
+      </p:sp>
+    </p:spTree>
+    <p:extLst>
+      <p:ext uri="{BB962C8B-B14F-4D97-AF65-F5344CB8AC3E}">
+        <p14:creationId xmlns:p14="http://schemas.microsoft.com/office/powerpoint/2010/main" val="3233369179"/>
       </p:ext>
     </p:extLst>
   </p:cSld>

</xml_diff>